<commit_message>
15_04_28_16_44 //changed android icon //added some JavaDoc
</commit_message>
<xml_diff>
--- a/Samsung/Presentation/Андрющенко Андрей - 'Гравитационные частицы'.pptx
+++ b/Samsung/Presentation/Андрющенко Андрей - 'Гравитационные частицы'.pptx
@@ -11,7 +11,8 @@
     <p:sldId id="260" r:id="rId5"/>
     <p:sldId id="261" r:id="rId6"/>
     <p:sldId id="262" r:id="rId7"/>
-    <p:sldId id="263" r:id="rId8"/>
+    <p:sldId id="264" r:id="rId8"/>
+    <p:sldId id="263" r:id="rId9"/>
   </p:sldIdLst>
   <p:sldSz cx="9224963" cy="5230813"/>
   <p:notesSz cx="6858000" cy="9144000"/>
@@ -112,7 +113,7 @@
   </p:defaultTextStyle>
   <p:extLst>
     <p:ext uri="{EFAFB233-063F-42B5-8137-9DF3F51BA10A}">
-      <p15:sldGuideLst xmlns:p15="http://schemas.microsoft.com/office/powerpoint/2012/main">
+      <p15:sldGuideLst xmlns:p15="http://schemas.microsoft.com/office/powerpoint/2012/main" xmlns="">
         <p15:guide id="1" orient="horz" pos="1648">
           <p15:clr>
             <a:srgbClr val="A4A3A4"/>
@@ -3469,21 +3470,6 @@
               </a:rPr>
               <a:t>Преподаватели:</a:t>
             </a:r>
-            <a:endParaRPr kumimoji="0" lang="ru-RU" sz="1400" b="1" i="0" u="none" strike="noStrike" kern="1200" cap="none" spc="0" normalizeH="0" baseline="0" noProof="0" dirty="0" smtClean="0">
-              <a:ln>
-                <a:noFill/>
-              </a:ln>
-              <a:solidFill>
-                <a:schemeClr val="tx2">
-                  <a:lumMod val="75000"/>
-                </a:schemeClr>
-              </a:solidFill>
-              <a:effectLst/>
-              <a:uLnTx/>
-              <a:uFillTx/>
-              <a:ea typeface="+mn-ea"/>
-              <a:cs typeface="+mn-cs"/>
-            </a:endParaRPr>
           </a:p>
           <a:p>
             <a:pPr marL="342900" marR="0" lvl="0" indent="-342900" algn="r" defTabSz="914400" rtl="0" eaLnBrk="1" fontAlgn="auto" latinLnBrk="0" hangingPunct="1">
@@ -3549,25 +3535,7 @@
                 <a:ea typeface="+mn-ea"/>
                 <a:cs typeface="+mn-cs"/>
               </a:rPr>
-              <a:t>Дата</a:t>
-            </a:r>
-            <a:r>
-              <a:rPr kumimoji="0" lang="ru-RU" sz="1400" b="1" i="0" u="none" strike="noStrike" kern="1200" cap="none" spc="0" normalizeH="0" baseline="0" noProof="0" dirty="0" smtClean="0">
-                <a:ln>
-                  <a:noFill/>
-                </a:ln>
-                <a:solidFill>
-                  <a:schemeClr val="tx2">
-                    <a:lumMod val="75000"/>
-                  </a:schemeClr>
-                </a:solidFill>
-                <a:effectLst/>
-                <a:uLnTx/>
-                <a:uFillTx/>
-                <a:ea typeface="+mn-ea"/>
-                <a:cs typeface="+mn-cs"/>
-              </a:rPr>
-              <a:t>:</a:t>
+              <a:t>Дата:</a:t>
             </a:r>
             <a:endParaRPr kumimoji="0" lang="en-US" sz="1400" b="1" i="0" u="none" strike="noStrike" kern="1200" cap="none" spc="0" normalizeH="0" baseline="0" noProof="0" dirty="0">
               <a:ln>
@@ -3663,21 +3631,6 @@
               </a:rPr>
               <a:t>Хабаровск</a:t>
             </a:r>
-            <a:endParaRPr kumimoji="0" lang="ru-RU" sz="1400" b="1" i="0" u="none" strike="noStrike" kern="1200" cap="none" spc="0" normalizeH="0" baseline="0" noProof="0" dirty="0" smtClean="0">
-              <a:ln>
-                <a:noFill/>
-              </a:ln>
-              <a:solidFill>
-                <a:schemeClr val="tx2">
-                  <a:lumMod val="75000"/>
-                </a:schemeClr>
-              </a:solidFill>
-              <a:effectLst/>
-              <a:uLnTx/>
-              <a:uFillTx/>
-              <a:ea typeface="+mn-ea"/>
-              <a:cs typeface="+mn-cs"/>
-            </a:endParaRPr>
           </a:p>
           <a:p>
             <a:pPr lvl="0">
@@ -3694,7 +3647,7 @@
                   </a:schemeClr>
                 </a:solidFill>
               </a:rPr>
-              <a:t>МАОУ ЛИТ</a:t>
+              <a:t>Математический Лицей</a:t>
             </a:r>
             <a:endParaRPr lang="ru-RU" sz="1400" b="1" dirty="0" smtClean="0">
               <a:solidFill>
@@ -3861,25 +3814,7 @@
                 <a:ea typeface="+mn-ea"/>
                 <a:cs typeface="+mn-cs"/>
               </a:rPr>
-              <a:t>30 апреля 2015г</a:t>
-            </a:r>
-            <a:r>
-              <a:rPr kumimoji="0" lang="ru-RU" sz="1400" b="1" i="0" u="none" strike="noStrike" kern="1200" cap="none" spc="0" normalizeH="0" baseline="0" noProof="0" dirty="0" smtClean="0">
-                <a:ln>
-                  <a:noFill/>
-                </a:ln>
-                <a:solidFill>
-                  <a:schemeClr val="tx2">
-                    <a:lumMod val="75000"/>
-                  </a:schemeClr>
-                </a:solidFill>
-                <a:effectLst/>
-                <a:uLnTx/>
-                <a:uFillTx/>
-                <a:ea typeface="+mn-ea"/>
-                <a:cs typeface="+mn-cs"/>
-              </a:rPr>
-              <a:t>.</a:t>
+              <a:t>30 апреля 2015г.</a:t>
             </a:r>
             <a:endParaRPr kumimoji="0" lang="en-US" sz="1400" b="1" i="0" u="none" strike="noStrike" kern="1200" cap="none" spc="0" normalizeH="0" baseline="0" noProof="0" dirty="0">
               <a:ln>
@@ -3902,13 +3837,20 @@
     </p:spTree>
     <p:extLst>
       <p:ext uri="{BB962C8B-B14F-4D97-AF65-F5344CB8AC3E}">
-        <p14:creationId xmlns:p14="http://schemas.microsoft.com/office/powerpoint/2010/main" val="267235647"/>
+        <p14:creationId xmlns:p14="http://schemas.microsoft.com/office/powerpoint/2010/main" xmlns="" val="267235647"/>
       </p:ext>
     </p:extLst>
   </p:cSld>
   <p:clrMapOvr>
     <a:masterClrMapping/>
   </p:clrMapOvr>
+  <p:timing>
+    <p:tnLst>
+      <p:par>
+        <p:cTn id="1" dur="indefinite" restart="never" nodeType="tmRoot"/>
+      </p:par>
+    </p:tnLst>
+  </p:timing>
 </p:sld>
 </file>
 
@@ -4008,13 +3950,20 @@
     </p:spTree>
     <p:extLst>
       <p:ext uri="{BB962C8B-B14F-4D97-AF65-F5344CB8AC3E}">
-        <p14:creationId xmlns:p14="http://schemas.microsoft.com/office/powerpoint/2010/main" val="2673980021"/>
+        <p14:creationId xmlns:p14="http://schemas.microsoft.com/office/powerpoint/2010/main" xmlns="" val="2673980021"/>
       </p:ext>
     </p:extLst>
   </p:cSld>
   <p:clrMapOvr>
     <a:masterClrMapping/>
   </p:clrMapOvr>
+  <p:timing>
+    <p:tnLst>
+      <p:par>
+        <p:cTn id="1" dur="indefinite" restart="never" nodeType="tmRoot"/>
+      </p:par>
+    </p:tnLst>
+  </p:timing>
 </p:sld>
 </file>
 
@@ -4101,163 +4050,49 @@
         </p:style>
         <p:txBody>
           <a:bodyPr>
-            <a:normAutofit fontScale="47500" lnSpcReduction="20000"/>
+            <a:normAutofit fontScale="92500" lnSpcReduction="20000"/>
           </a:bodyPr>
           <a:lstStyle/>
           <a:p>
             <a:r>
-              <a:rPr lang="ru-RU" dirty="0"/>
-              <a:t>- </a:t>
-            </a:r>
-            <a:r>
               <a:rPr lang="ru-RU" dirty="0" smtClean="0"/>
-              <a:t>Создание игрового поля, </a:t>
-            </a:r>
-            <a:r>
-              <a:rPr lang="ru-RU" dirty="0"/>
-              <a:t>которое представляет прямоугольный контур, за который не могут вылетать </a:t>
-            </a:r>
+              <a:t>- Создание игрового поля, которое представляет прямоугольный контур, за который не могут вылетать частицы</a:t>
+            </a:r>
+          </a:p>
+          <a:p>
             <a:r>
               <a:rPr lang="ru-RU" dirty="0" smtClean="0"/>
-              <a:t>частицы</a:t>
-            </a:r>
+              <a:t>- Описание и создание гравитационных частиц, которые могут притягиваться друг к другу или отталкиваться друг от друга, в зависимости от заряда частиц и заряда поля</a:t>
+            </a:r>
+          </a:p>
+          <a:p>
+            <a:r>
+              <a:rPr lang="ru-RU" dirty="0" smtClean="0"/>
+              <a:t>- Вычисление траектории движения частиц</a:t>
+            </a:r>
+          </a:p>
+          <a:p>
             <a:endParaRPr lang="ru-RU" dirty="0"/>
-          </a:p>
-          <a:p>
-            <a:r>
-              <a:rPr lang="ru-RU" dirty="0"/>
-              <a:t>- </a:t>
-            </a:r>
-            <a:r>
-              <a:rPr lang="ru-RU" dirty="0" smtClean="0"/>
-              <a:t>Описание и создание гравитационных частиц, </a:t>
-            </a:r>
-            <a:r>
-              <a:rPr lang="ru-RU" dirty="0"/>
-              <a:t>которые </a:t>
-            </a:r>
-            <a:r>
-              <a:rPr lang="ru-RU" dirty="0" smtClean="0"/>
-              <a:t>могут притягиваться </a:t>
-            </a:r>
-            <a:r>
-              <a:rPr lang="ru-RU" dirty="0"/>
-              <a:t>друг к другу или </a:t>
-            </a:r>
-            <a:r>
-              <a:rPr lang="ru-RU" dirty="0" smtClean="0"/>
-              <a:t>отталкиваться </a:t>
-            </a:r>
-            <a:r>
-              <a:rPr lang="ru-RU" dirty="0"/>
-              <a:t>друг от друга, в зависимости от заряда частиц и заряда </a:t>
-            </a:r>
-            <a:r>
-              <a:rPr lang="ru-RU" dirty="0" smtClean="0"/>
-              <a:t>поля</a:t>
-            </a:r>
-            <a:endParaRPr lang="ru-RU" dirty="0"/>
-          </a:p>
-          <a:p>
-            <a:r>
-              <a:rPr lang="ru-RU" dirty="0"/>
-              <a:t>- Вычисление траектории движения </a:t>
-            </a:r>
-            <a:r>
-              <a:rPr lang="ru-RU" dirty="0" smtClean="0"/>
-              <a:t>частиц</a:t>
-            </a:r>
-            <a:endParaRPr lang="ru-RU" dirty="0"/>
-          </a:p>
-          <a:p>
-            <a:r>
-              <a:rPr lang="ru-RU" dirty="0"/>
-              <a:t>- Обеспечение возможности увеличения и уменьшения масштаба </a:t>
-            </a:r>
-            <a:r>
-              <a:rPr lang="ru-RU" dirty="0" smtClean="0"/>
-              <a:t>поля</a:t>
-            </a:r>
-            <a:endParaRPr lang="ru-RU" dirty="0"/>
-          </a:p>
-          <a:p>
-            <a:r>
-              <a:rPr lang="ru-RU" dirty="0"/>
-              <a:t>- Обеспечение взаимодействия с </a:t>
-            </a:r>
-            <a:r>
-              <a:rPr lang="ru-RU" dirty="0" smtClean="0"/>
-              <a:t>пользователем</a:t>
-            </a:r>
-            <a:endParaRPr lang="ru-RU" dirty="0"/>
-          </a:p>
-          <a:p>
-            <a:r>
-              <a:rPr lang="ru-RU" dirty="0"/>
-              <a:t>- Обеспечение взаимодействия частиц между </a:t>
-            </a:r>
-            <a:r>
-              <a:rPr lang="ru-RU" dirty="0" smtClean="0"/>
-              <a:t>собой</a:t>
-            </a:r>
-            <a:endParaRPr lang="ru-RU" dirty="0"/>
-          </a:p>
-          <a:p>
-            <a:r>
-              <a:rPr lang="ru-RU" dirty="0"/>
-              <a:t>- Обеспечение возможности выбора </a:t>
-            </a:r>
-            <a:r>
-              <a:rPr lang="ru-RU" dirty="0" smtClean="0"/>
-              <a:t>уровня</a:t>
-            </a:r>
-            <a:endParaRPr lang="ru-RU" dirty="0"/>
-          </a:p>
-          <a:p>
-            <a:r>
-              <a:rPr lang="ru-RU" dirty="0"/>
-              <a:t>- </a:t>
-            </a:r>
-            <a:r>
-              <a:rPr lang="ru-RU" dirty="0" smtClean="0"/>
-              <a:t>Реализация возможности установки игры на паузу при сворачивании приложения и возобновления игры при возвращении в приостановленное приложение</a:t>
-            </a:r>
-            <a:endParaRPr lang="ru-RU" dirty="0"/>
-          </a:p>
-          <a:p>
-            <a:r>
-              <a:rPr lang="ru-RU" dirty="0"/>
-              <a:t>- </a:t>
-            </a:r>
-            <a:r>
-              <a:rPr lang="ru-RU" dirty="0" smtClean="0"/>
-              <a:t>Создание технологии при которой </a:t>
-            </a:r>
-            <a:r>
-              <a:rPr lang="ru-RU" dirty="0"/>
-              <a:t>путём наследования </a:t>
-            </a:r>
-            <a:r>
-              <a:rPr lang="ru-RU" dirty="0" smtClean="0"/>
-              <a:t>устанавливается возможность создания уровней, каждый из которых </a:t>
-            </a:r>
-            <a:r>
-              <a:rPr lang="ru-RU" dirty="0"/>
-              <a:t>содержит определенный набор заданий, которые нужно выполнить, например задание набрать определённый заряд или зарядить все окружающие частицы</a:t>
-            </a:r>
           </a:p>
         </p:txBody>
       </p:sp>
     </p:spTree>
     <p:extLst>
       <p:ext uri="{BB962C8B-B14F-4D97-AF65-F5344CB8AC3E}">
-        <p14:creationId xmlns:p14="http://schemas.microsoft.com/office/powerpoint/2010/main" val="4226990272"/>
+        <p14:creationId xmlns:p14="http://schemas.microsoft.com/office/powerpoint/2010/main" xmlns="" val="4226990272"/>
       </p:ext>
     </p:extLst>
   </p:cSld>
   <p:clrMapOvr>
     <a:masterClrMapping/>
   </p:clrMapOvr>
+  <p:timing>
+    <p:tnLst>
+      <p:par>
+        <p:cTn id="1" dur="indefinite" restart="never" nodeType="tmRoot"/>
+      </p:par>
+    </p:tnLst>
+  </p:timing>
 </p:sld>
 </file>
 
@@ -4381,13 +4216,20 @@
     </p:spTree>
     <p:extLst>
       <p:ext uri="{BB962C8B-B14F-4D97-AF65-F5344CB8AC3E}">
-        <p14:creationId xmlns:p14="http://schemas.microsoft.com/office/powerpoint/2010/main" val="3450916455"/>
+        <p14:creationId xmlns:p14="http://schemas.microsoft.com/office/powerpoint/2010/main" xmlns="" val="3450916455"/>
       </p:ext>
     </p:extLst>
   </p:cSld>
   <p:clrMapOvr>
     <a:masterClrMapping/>
   </p:clrMapOvr>
+  <p:timing>
+    <p:tnLst>
+      <p:par>
+        <p:cTn id="1" dur="indefinite" restart="never" nodeType="tmRoot"/>
+      </p:par>
+    </p:tnLst>
+  </p:timing>
 </p:sld>
 </file>
 
@@ -4673,13 +4515,20 @@
     </p:spTree>
     <p:extLst>
       <p:ext uri="{BB962C8B-B14F-4D97-AF65-F5344CB8AC3E}">
-        <p14:creationId xmlns:p14="http://schemas.microsoft.com/office/powerpoint/2010/main" val="1483474005"/>
+        <p14:creationId xmlns:p14="http://schemas.microsoft.com/office/powerpoint/2010/main" xmlns="" val="1483474005"/>
       </p:ext>
     </p:extLst>
   </p:cSld>
   <p:clrMapOvr>
     <a:masterClrMapping/>
   </p:clrMapOvr>
+  <p:timing>
+    <p:tnLst>
+      <p:par>
+        <p:cTn id="1" dur="indefinite" restart="never" nodeType="tmRoot"/>
+      </p:par>
+    </p:tnLst>
+  </p:timing>
 </p:sld>
 </file>
 
@@ -5266,13 +5115,20 @@
     </p:spTree>
     <p:extLst>
       <p:ext uri="{BB962C8B-B14F-4D97-AF65-F5344CB8AC3E}">
-        <p14:creationId xmlns:p14="http://schemas.microsoft.com/office/powerpoint/2010/main" val="1473186529"/>
+        <p14:creationId xmlns:p14="http://schemas.microsoft.com/office/powerpoint/2010/main" xmlns="" val="1473186529"/>
       </p:ext>
     </p:extLst>
   </p:cSld>
   <p:clrMapOvr>
     <a:masterClrMapping/>
   </p:clrMapOvr>
+  <p:timing>
+    <p:tnLst>
+      <p:par>
+        <p:cTn id="1" dur="indefinite" restart="never" nodeType="tmRoot"/>
+      </p:par>
+    </p:tnLst>
+  </p:timing>
 </p:sld>
 </file>
 
@@ -5306,6 +5162,89 @@
         <p:spPr/>
         <p:style>
           <a:lnRef idx="2">
+            <a:schemeClr val="accent1">
+              <a:shade val="50000"/>
+            </a:schemeClr>
+          </a:lnRef>
+          <a:fillRef idx="1">
+            <a:schemeClr val="accent1"/>
+          </a:fillRef>
+          <a:effectRef idx="0">
+            <a:schemeClr val="accent1"/>
+          </a:effectRef>
+          <a:fontRef idx="minor">
+            <a:schemeClr val="lt1"/>
+          </a:fontRef>
+        </p:style>
+        <p:txBody>
+          <a:bodyPr/>
+          <a:lstStyle/>
+          <a:p>
+            <a:r>
+              <a:rPr lang="ru-RU" dirty="0" smtClean="0"/>
+              <a:t>Класс уровня</a:t>
+            </a:r>
+            <a:endParaRPr lang="ru-RU" dirty="0"/>
+          </a:p>
+        </p:txBody>
+      </p:sp>
+      <p:sp>
+        <p:nvSpPr>
+          <p:cNvPr id="3" name="Содержимое 2"/>
+          <p:cNvSpPr>
+            <a:spLocks noGrp="1"/>
+          </p:cNvSpPr>
+          <p:nvPr>
+            <p:ph idx="1"/>
+          </p:nvPr>
+        </p:nvSpPr>
+        <p:spPr/>
+        <p:txBody>
+          <a:bodyPr/>
+          <a:lstStyle/>
+          <a:p>
+            <a:endParaRPr lang="ru-RU"/>
+          </a:p>
+        </p:txBody>
+      </p:sp>
+    </p:spTree>
+  </p:cSld>
+  <p:clrMapOvr>
+    <a:masterClrMapping/>
+  </p:clrMapOvr>
+</p:sld>
+</file>
+
+<file path=ppt/slides/slide8.xml><?xml version="1.0" encoding="utf-8"?>
+<p:sld xmlns:a="http://schemas.openxmlformats.org/drawingml/2006/main" xmlns:r="http://schemas.openxmlformats.org/officeDocument/2006/relationships" xmlns:p="http://schemas.openxmlformats.org/presentationml/2006/main">
+  <p:cSld>
+    <p:spTree>
+      <p:nvGrpSpPr>
+        <p:cNvPr id="1" name=""/>
+        <p:cNvGrpSpPr/>
+        <p:nvPr/>
+      </p:nvGrpSpPr>
+      <p:grpSpPr>
+        <a:xfrm>
+          <a:off x="0" y="0"/>
+          <a:ext cx="0" cy="0"/>
+          <a:chOff x="0" y="0"/>
+          <a:chExt cx="0" cy="0"/>
+        </a:xfrm>
+      </p:grpSpPr>
+      <p:sp>
+        <p:nvSpPr>
+          <p:cNvPr id="2" name="Заголовок 1"/>
+          <p:cNvSpPr>
+            <a:spLocks noGrp="1"/>
+          </p:cNvSpPr>
+          <p:nvPr>
+            <p:ph type="title"/>
+          </p:nvPr>
+        </p:nvSpPr>
+        <p:spPr/>
+        <p:style>
+          <a:lnRef idx="2">
             <a:schemeClr val="accent3">
               <a:shade val="50000"/>
             </a:schemeClr>
@@ -5354,13 +5293,20 @@
     </p:spTree>
     <p:extLst>
       <p:ext uri="{BB962C8B-B14F-4D97-AF65-F5344CB8AC3E}">
-        <p14:creationId xmlns:p14="http://schemas.microsoft.com/office/powerpoint/2010/main" val="3724832604"/>
+        <p14:creationId xmlns:p14="http://schemas.microsoft.com/office/powerpoint/2010/main" xmlns="" val="3724832604"/>
       </p:ext>
     </p:extLst>
   </p:cSld>
   <p:clrMapOvr>
     <a:masterClrMapping/>
   </p:clrMapOvr>
+  <p:timing>
+    <p:tnLst>
+      <p:par>
+        <p:cTn id="1" dur="indefinite" restart="never" nodeType="tmRoot"/>
+      </p:par>
+    </p:tnLst>
+  </p:timing>
 </p:sld>
 </file>
 

</xml_diff>

<commit_message>
15_04_28_18_01 //regenerated javDoc //presentation //android background
</commit_message>
<xml_diff>
--- a/Samsung/Presentation/Андрющенко Андрей - 'Гравитационные частицы'.pptx
+++ b/Samsung/Presentation/Андрющенко Андрей - 'Гравитационные частицы'.pptx
@@ -11,8 +11,11 @@
     <p:sldId id="260" r:id="rId5"/>
     <p:sldId id="261" r:id="rId6"/>
     <p:sldId id="262" r:id="rId7"/>
-    <p:sldId id="264" r:id="rId8"/>
-    <p:sldId id="263" r:id="rId9"/>
+    <p:sldId id="265" r:id="rId8"/>
+    <p:sldId id="267" r:id="rId9"/>
+    <p:sldId id="264" r:id="rId10"/>
+    <p:sldId id="266" r:id="rId11"/>
+    <p:sldId id="263" r:id="rId12"/>
   </p:sldIdLst>
   <p:sldSz cx="9224963" cy="5230813"/>
   <p:notesSz cx="6858000" cy="9144000"/>
@@ -366,6 +369,9 @@
   <p:clrMapOvr>
     <a:masterClrMapping/>
   </p:clrMapOvr>
+  <p:transition>
+    <p:wipe dir="d"/>
+  </p:transition>
 </p:sldLayout>
 </file>
 
@@ -533,6 +539,9 @@
   <p:clrMapOvr>
     <a:masterClrMapping/>
   </p:clrMapOvr>
+  <p:transition>
+    <p:wipe dir="d"/>
+  </p:transition>
 </p:sldLayout>
 </file>
 
@@ -710,6 +719,9 @@
   <p:clrMapOvr>
     <a:masterClrMapping/>
   </p:clrMapOvr>
+  <p:transition>
+    <p:wipe dir="d"/>
+  </p:transition>
 </p:sldLayout>
 </file>
 
@@ -877,6 +889,9 @@
   <p:clrMapOvr>
     <a:masterClrMapping/>
   </p:clrMapOvr>
+  <p:transition>
+    <p:wipe dir="d"/>
+  </p:transition>
 </p:sldLayout>
 </file>
 
@@ -1120,6 +1135,9 @@
   <p:clrMapOvr>
     <a:masterClrMapping/>
   </p:clrMapOvr>
+  <p:transition>
+    <p:wipe dir="d"/>
+  </p:transition>
 </p:sldLayout>
 </file>
 
@@ -1405,6 +1423,9 @@
   <p:clrMapOvr>
     <a:masterClrMapping/>
   </p:clrMapOvr>
+  <p:transition>
+    <p:wipe dir="d"/>
+  </p:transition>
 </p:sldLayout>
 </file>
 
@@ -1824,6 +1845,9 @@
   <p:clrMapOvr>
     <a:masterClrMapping/>
   </p:clrMapOvr>
+  <p:transition>
+    <p:wipe dir="d"/>
+  </p:transition>
 </p:sldLayout>
 </file>
 
@@ -1939,6 +1963,9 @@
   <p:clrMapOvr>
     <a:masterClrMapping/>
   </p:clrMapOvr>
+  <p:transition>
+    <p:wipe dir="d"/>
+  </p:transition>
 </p:sldLayout>
 </file>
 
@@ -2031,6 +2058,9 @@
   <p:clrMapOvr>
     <a:masterClrMapping/>
   </p:clrMapOvr>
+  <p:transition>
+    <p:wipe dir="d"/>
+  </p:transition>
 </p:sldLayout>
 </file>
 
@@ -2305,6 +2335,9 @@
   <p:clrMapOvr>
     <a:masterClrMapping/>
   </p:clrMapOvr>
+  <p:transition>
+    <p:wipe dir="d"/>
+  </p:transition>
 </p:sldLayout>
 </file>
 
@@ -2555,6 +2588,9 @@
   <p:clrMapOvr>
     <a:masterClrMapping/>
   </p:clrMapOvr>
+  <p:transition>
+    <p:wipe dir="d"/>
+  </p:transition>
 </p:sldLayout>
 </file>
 
@@ -2821,6 +2857,9 @@
     <p:sldLayoutId id="2147483658" r:id="rId10"/>
     <p:sldLayoutId id="2147483659" r:id="rId11"/>
   </p:sldLayoutIdLst>
+  <p:transition>
+    <p:wipe dir="d"/>
+  </p:transition>
   <p:txStyles>
     <p:titleStyle>
       <a:lvl1pPr algn="ctr" defTabSz="914400" rtl="0" eaLnBrk="1" latinLnBrk="0" hangingPunct="1">
@@ -3844,6 +3883,207 @@
   <p:clrMapOvr>
     <a:masterClrMapping/>
   </p:clrMapOvr>
+  <p:transition>
+    <p:wipe dir="d"/>
+  </p:transition>
+  <p:timing>
+    <p:tnLst>
+      <p:par>
+        <p:cTn id="1" dur="indefinite" restart="never" nodeType="tmRoot"/>
+      </p:par>
+    </p:tnLst>
+  </p:timing>
+</p:sld>
+</file>
+
+<file path=ppt/slides/slide10.xml><?xml version="1.0" encoding="utf-8"?>
+<p:sld xmlns:a="http://schemas.openxmlformats.org/drawingml/2006/main" xmlns:r="http://schemas.openxmlformats.org/officeDocument/2006/relationships" xmlns:p="http://schemas.openxmlformats.org/presentationml/2006/main">
+  <p:cSld>
+    <p:spTree>
+      <p:nvGrpSpPr>
+        <p:cNvPr id="1" name=""/>
+        <p:cNvGrpSpPr/>
+        <p:nvPr/>
+      </p:nvGrpSpPr>
+      <p:grpSpPr>
+        <a:xfrm>
+          <a:off x="0" y="0"/>
+          <a:ext cx="0" cy="0"/>
+          <a:chOff x="0" y="0"/>
+          <a:chExt cx="0" cy="0"/>
+        </a:xfrm>
+      </p:grpSpPr>
+      <p:sp>
+        <p:nvSpPr>
+          <p:cNvPr id="2" name="Заголовок 1"/>
+          <p:cNvSpPr>
+            <a:spLocks noGrp="1"/>
+          </p:cNvSpPr>
+          <p:nvPr>
+            <p:ph type="title"/>
+          </p:nvPr>
+        </p:nvSpPr>
+        <p:spPr/>
+        <p:style>
+          <a:lnRef idx="2">
+            <a:schemeClr val="accent3">
+              <a:shade val="50000"/>
+            </a:schemeClr>
+          </a:lnRef>
+          <a:fillRef idx="1">
+            <a:schemeClr val="accent3"/>
+          </a:fillRef>
+          <a:effectRef idx="0">
+            <a:schemeClr val="accent3"/>
+          </a:effectRef>
+          <a:fontRef idx="minor">
+            <a:schemeClr val="lt1"/>
+          </a:fontRef>
+        </p:style>
+        <p:txBody>
+          <a:bodyPr/>
+          <a:lstStyle/>
+          <a:p>
+            <a:r>
+              <a:rPr lang="ru-RU" dirty="0" smtClean="0"/>
+              <a:t>Планы на будущее</a:t>
+            </a:r>
+            <a:endParaRPr lang="ru-RU" dirty="0"/>
+          </a:p>
+        </p:txBody>
+      </p:sp>
+      <p:pic>
+        <p:nvPicPr>
+          <p:cNvPr id="2050" name="Picture 2" descr="http://blog.brettalton.com/wp-content/uploads/osmos-running-on-linux.png"/>
+          <p:cNvPicPr>
+            <a:picLocks noChangeAspect="1" noChangeArrowheads="1"/>
+          </p:cNvPicPr>
+          <p:nvPr/>
+        </p:nvPicPr>
+        <p:blipFill>
+          <a:blip r:embed="rId2" cstate="print"/>
+          <a:srcRect/>
+          <a:stretch>
+            <a:fillRect/>
+          </a:stretch>
+        </p:blipFill>
+        <p:spPr bwMode="auto">
+          <a:xfrm>
+            <a:off x="1372121" y="1175246"/>
+            <a:ext cx="6624736" cy="3881681"/>
+          </a:xfrm>
+          <a:prstGeom prst="rect">
+            <a:avLst/>
+          </a:prstGeom>
+          <a:noFill/>
+        </p:spPr>
+      </p:pic>
+    </p:spTree>
+  </p:cSld>
+  <p:clrMapOvr>
+    <a:masterClrMapping/>
+  </p:clrMapOvr>
+  <p:transition>
+    <p:wipe dir="d"/>
+  </p:transition>
+  <p:timing>
+    <p:tnLst>
+      <p:par>
+        <p:cTn id="1" dur="indefinite" restart="never" nodeType="tmRoot"/>
+      </p:par>
+    </p:tnLst>
+  </p:timing>
+</p:sld>
+</file>
+
+<file path=ppt/slides/slide11.xml><?xml version="1.0" encoding="utf-8"?>
+<p:sld xmlns:a="http://schemas.openxmlformats.org/drawingml/2006/main" xmlns:r="http://schemas.openxmlformats.org/officeDocument/2006/relationships" xmlns:p="http://schemas.openxmlformats.org/presentationml/2006/main">
+  <p:cSld>
+    <p:spTree>
+      <p:nvGrpSpPr>
+        <p:cNvPr id="1" name=""/>
+        <p:cNvGrpSpPr/>
+        <p:nvPr/>
+      </p:nvGrpSpPr>
+      <p:grpSpPr>
+        <a:xfrm>
+          <a:off x="0" y="0"/>
+          <a:ext cx="0" cy="0"/>
+          <a:chOff x="0" y="0"/>
+          <a:chExt cx="0" cy="0"/>
+        </a:xfrm>
+      </p:grpSpPr>
+      <p:sp>
+        <p:nvSpPr>
+          <p:cNvPr id="2" name="Заголовок 1"/>
+          <p:cNvSpPr>
+            <a:spLocks noGrp="1"/>
+          </p:cNvSpPr>
+          <p:nvPr>
+            <p:ph type="title"/>
+          </p:nvPr>
+        </p:nvSpPr>
+        <p:spPr/>
+        <p:style>
+          <a:lnRef idx="2">
+            <a:schemeClr val="accent3">
+              <a:shade val="50000"/>
+            </a:schemeClr>
+          </a:lnRef>
+          <a:fillRef idx="1">
+            <a:schemeClr val="accent3"/>
+          </a:fillRef>
+          <a:effectRef idx="0">
+            <a:schemeClr val="accent3"/>
+          </a:effectRef>
+          <a:fontRef idx="minor">
+            <a:schemeClr val="lt1"/>
+          </a:fontRef>
+        </p:style>
+        <p:txBody>
+          <a:bodyPr/>
+          <a:lstStyle/>
+          <a:p>
+            <a:r>
+              <a:rPr lang="ru-RU" dirty="0" smtClean="0"/>
+              <a:t>Спасибо за внимание!!!</a:t>
+            </a:r>
+            <a:endParaRPr lang="ru-RU" dirty="0"/>
+          </a:p>
+        </p:txBody>
+      </p:sp>
+      <p:sp>
+        <p:nvSpPr>
+          <p:cNvPr id="3" name="Объект 2"/>
+          <p:cNvSpPr>
+            <a:spLocks noGrp="1"/>
+          </p:cNvSpPr>
+          <p:nvPr>
+            <p:ph idx="1"/>
+          </p:nvPr>
+        </p:nvSpPr>
+        <p:spPr/>
+        <p:txBody>
+          <a:bodyPr/>
+          <a:lstStyle/>
+          <a:p>
+            <a:endParaRPr lang="ru-RU"/>
+          </a:p>
+        </p:txBody>
+      </p:sp>
+    </p:spTree>
+    <p:extLst>
+      <p:ext uri="{BB962C8B-B14F-4D97-AF65-F5344CB8AC3E}">
+        <p14:creationId xmlns:p14="http://schemas.microsoft.com/office/powerpoint/2010/main" xmlns="" val="3724832604"/>
+      </p:ext>
+    </p:extLst>
+  </p:cSld>
+  <p:clrMapOvr>
+    <a:masterClrMapping/>
+  </p:clrMapOvr>
+  <p:transition>
+    <p:wipe dir="d"/>
+  </p:transition>
   <p:timing>
     <p:tnLst>
       <p:par>
@@ -3957,6 +4197,9 @@
   <p:clrMapOvr>
     <a:masterClrMapping/>
   </p:clrMapOvr>
+  <p:transition>
+    <p:wipe dir="d"/>
+  </p:transition>
   <p:timing>
     <p:tnLst>
       <p:par>
@@ -4086,6 +4329,9 @@
   <p:clrMapOvr>
     <a:masterClrMapping/>
   </p:clrMapOvr>
+  <p:transition>
+    <p:wipe dir="d"/>
+  </p:transition>
   <p:timing>
     <p:tnLst>
       <p:par>
@@ -4223,6 +4469,9 @@
   <p:clrMapOvr>
     <a:masterClrMapping/>
   </p:clrMapOvr>
+  <p:transition>
+    <p:wipe dir="d"/>
+  </p:transition>
   <p:timing>
     <p:tnLst>
       <p:par>
@@ -4522,6 +4771,9 @@
   <p:clrMapOvr>
     <a:masterClrMapping/>
   </p:clrMapOvr>
+  <p:transition>
+    <p:wipe dir="d"/>
+  </p:transition>
   <p:timing>
     <p:tnLst>
       <p:par>
@@ -5122,6 +5374,9 @@
   <p:clrMapOvr>
     <a:masterClrMapping/>
   </p:clrMapOvr>
+  <p:transition>
+    <p:wipe dir="d"/>
+  </p:transition>
   <p:timing>
     <p:tnLst>
       <p:par>
@@ -5162,15 +5417,15 @@
         <p:spPr/>
         <p:style>
           <a:lnRef idx="2">
-            <a:schemeClr val="accent1">
+            <a:schemeClr val="accent2">
               <a:shade val="50000"/>
             </a:schemeClr>
           </a:lnRef>
           <a:fillRef idx="1">
-            <a:schemeClr val="accent1"/>
+            <a:schemeClr val="accent2"/>
           </a:fillRef>
           <a:effectRef idx="0">
-            <a:schemeClr val="accent1"/>
+            <a:schemeClr val="accent2"/>
           </a:effectRef>
           <a:fontRef idx="minor">
             <a:schemeClr val="lt1"/>
@@ -5182,7 +5437,7 @@
           <a:p>
             <a:r>
               <a:rPr lang="ru-RU" dirty="0" smtClean="0"/>
-              <a:t>Класс уровня</a:t>
+              <a:t>Работа с приложением</a:t>
             </a:r>
             <a:endParaRPr lang="ru-RU" dirty="0"/>
           </a:p>
@@ -5203,15 +5458,454 @@
           <a:bodyPr/>
           <a:lstStyle/>
           <a:p>
-            <a:endParaRPr lang="ru-RU"/>
-          </a:p>
-        </p:txBody>
-      </p:sp>
+            <a:endParaRPr lang="ru-RU" dirty="0"/>
+          </a:p>
+        </p:txBody>
+      </p:sp>
+      <p:pic>
+        <p:nvPicPr>
+          <p:cNvPr id="1027" name="Picture 3" descr="C:\Programming\versions\libgdxGP_15_04_28\Samsung\Presentation\GP\Screenshot_2015-04-28-16-51-50.png"/>
+          <p:cNvPicPr>
+            <a:picLocks noChangeAspect="1" noChangeArrowheads="1"/>
+          </p:cNvPicPr>
+          <p:nvPr/>
+        </p:nvPicPr>
+        <p:blipFill>
+          <a:blip r:embed="rId2" cstate="print"/>
+          <a:srcRect/>
+          <a:stretch>
+            <a:fillRect/>
+          </a:stretch>
+        </p:blipFill>
+        <p:spPr bwMode="auto">
+          <a:xfrm>
+            <a:off x="1300113" y="1175246"/>
+            <a:ext cx="6912000" cy="4320000"/>
+          </a:xfrm>
+          <a:prstGeom prst="rect">
+            <a:avLst/>
+          </a:prstGeom>
+          <a:noFill/>
+        </p:spPr>
+      </p:pic>
+      <p:pic>
+        <p:nvPicPr>
+          <p:cNvPr id="1028" name="Picture 4" descr="C:\Programming\versions\libgdxGP_15_04_28\Samsung\Presentation\GP\Screenshot_2015-04-28-17-19-29.png"/>
+          <p:cNvPicPr>
+            <a:picLocks noChangeAspect="1" noChangeArrowheads="1"/>
+          </p:cNvPicPr>
+          <p:nvPr/>
+        </p:nvPicPr>
+        <p:blipFill>
+          <a:blip r:embed="rId3" cstate="print"/>
+          <a:srcRect/>
+          <a:stretch>
+            <a:fillRect/>
+          </a:stretch>
+        </p:blipFill>
+        <p:spPr bwMode="auto">
+          <a:xfrm>
+            <a:off x="1300113" y="1175246"/>
+            <a:ext cx="6912000" cy="4320000"/>
+          </a:xfrm>
+          <a:prstGeom prst="rect">
+            <a:avLst/>
+          </a:prstGeom>
+          <a:noFill/>
+        </p:spPr>
+      </p:pic>
+      <p:pic>
+        <p:nvPicPr>
+          <p:cNvPr id="1026" name="Picture 2" descr="C:\Programming\versions\libgdxGP_15_04_28\Samsung\Presentation\GP\Screenshot_2015-04-28-16-49-10.png"/>
+          <p:cNvPicPr>
+            <a:picLocks noChangeAspect="1" noChangeArrowheads="1"/>
+          </p:cNvPicPr>
+          <p:nvPr/>
+        </p:nvPicPr>
+        <p:blipFill>
+          <a:blip r:embed="rId4" cstate="print"/>
+          <a:srcRect/>
+          <a:stretch>
+            <a:fillRect/>
+          </a:stretch>
+        </p:blipFill>
+        <p:spPr bwMode="auto">
+          <a:xfrm>
+            <a:off x="1300113" y="1175246"/>
+            <a:ext cx="6912000" cy="4320000"/>
+          </a:xfrm>
+          <a:prstGeom prst="rect">
+            <a:avLst/>
+          </a:prstGeom>
+          <a:noFill/>
+        </p:spPr>
+      </p:pic>
     </p:spTree>
   </p:cSld>
   <p:clrMapOvr>
     <a:masterClrMapping/>
   </p:clrMapOvr>
+  <p:transition>
+    <p:wipe dir="d"/>
+  </p:transition>
+  <p:timing>
+    <p:tnLst>
+      <p:par>
+        <p:cTn id="1" dur="indefinite" restart="never" nodeType="tmRoot">
+          <p:childTnLst>
+            <p:seq concurrent="1" nextAc="seek">
+              <p:cTn id="2" dur="indefinite" nodeType="mainSeq">
+                <p:childTnLst>
+                  <p:par>
+                    <p:cTn id="3" fill="hold">
+                      <p:stCondLst>
+                        <p:cond delay="indefinite"/>
+                      </p:stCondLst>
+                      <p:childTnLst>
+                        <p:par>
+                          <p:cTn id="4" fill="hold">
+                            <p:stCondLst>
+                              <p:cond delay="0"/>
+                            </p:stCondLst>
+                            <p:childTnLst>
+                              <p:par>
+                                <p:cTn id="5" presetID="2" presetClass="exit" presetSubtype="4" fill="hold" nodeType="clickEffect">
+                                  <p:stCondLst>
+                                    <p:cond delay="0"/>
+                                  </p:stCondLst>
+                                  <p:childTnLst>
+                                    <p:anim calcmode="lin" valueType="num">
+                                      <p:cBhvr additive="base">
+                                        <p:cTn id="6" dur="500"/>
+                                        <p:tgtEl>
+                                          <p:spTgt spid="1026"/>
+                                        </p:tgtEl>
+                                        <p:attrNameLst>
+                                          <p:attrName>ppt_x</p:attrName>
+                                        </p:attrNameLst>
+                                      </p:cBhvr>
+                                      <p:tavLst>
+                                        <p:tav tm="0">
+                                          <p:val>
+                                            <p:strVal val="ppt_x"/>
+                                          </p:val>
+                                        </p:tav>
+                                        <p:tav tm="100000">
+                                          <p:val>
+                                            <p:strVal val="ppt_x"/>
+                                          </p:val>
+                                        </p:tav>
+                                      </p:tavLst>
+                                    </p:anim>
+                                    <p:anim calcmode="lin" valueType="num">
+                                      <p:cBhvr additive="base">
+                                        <p:cTn id="7" dur="500"/>
+                                        <p:tgtEl>
+                                          <p:spTgt spid="1026"/>
+                                        </p:tgtEl>
+                                        <p:attrNameLst>
+                                          <p:attrName>ppt_y</p:attrName>
+                                        </p:attrNameLst>
+                                      </p:cBhvr>
+                                      <p:tavLst>
+                                        <p:tav tm="0">
+                                          <p:val>
+                                            <p:strVal val="ppt_y"/>
+                                          </p:val>
+                                        </p:tav>
+                                        <p:tav tm="100000">
+                                          <p:val>
+                                            <p:strVal val="1+ppt_h/2"/>
+                                          </p:val>
+                                        </p:tav>
+                                      </p:tavLst>
+                                    </p:anim>
+                                    <p:set>
+                                      <p:cBhvr>
+                                        <p:cTn id="8" dur="1" fill="hold">
+                                          <p:stCondLst>
+                                            <p:cond delay="499"/>
+                                          </p:stCondLst>
+                                        </p:cTn>
+                                        <p:tgtEl>
+                                          <p:spTgt spid="1026"/>
+                                        </p:tgtEl>
+                                        <p:attrNameLst>
+                                          <p:attrName>style.visibility</p:attrName>
+                                        </p:attrNameLst>
+                                      </p:cBhvr>
+                                      <p:to>
+                                        <p:strVal val="hidden"/>
+                                      </p:to>
+                                    </p:set>
+                                  </p:childTnLst>
+                                </p:cTn>
+                              </p:par>
+                              <p:par>
+                                <p:cTn id="9" presetID="2" presetClass="entr" presetSubtype="4" fill="hold" nodeType="withEffect">
+                                  <p:stCondLst>
+                                    <p:cond delay="0"/>
+                                  </p:stCondLst>
+                                  <p:childTnLst>
+                                    <p:set>
+                                      <p:cBhvr>
+                                        <p:cTn id="10" dur="1" fill="hold">
+                                          <p:stCondLst>
+                                            <p:cond delay="0"/>
+                                          </p:stCondLst>
+                                        </p:cTn>
+                                        <p:tgtEl>
+                                          <p:spTgt spid="1028"/>
+                                        </p:tgtEl>
+                                        <p:attrNameLst>
+                                          <p:attrName>style.visibility</p:attrName>
+                                        </p:attrNameLst>
+                                      </p:cBhvr>
+                                      <p:to>
+                                        <p:strVal val="visible"/>
+                                      </p:to>
+                                    </p:set>
+                                    <p:anim calcmode="lin" valueType="num">
+                                      <p:cBhvr additive="base">
+                                        <p:cTn id="11" dur="500" fill="hold"/>
+                                        <p:tgtEl>
+                                          <p:spTgt spid="1028"/>
+                                        </p:tgtEl>
+                                        <p:attrNameLst>
+                                          <p:attrName>ppt_x</p:attrName>
+                                        </p:attrNameLst>
+                                      </p:cBhvr>
+                                      <p:tavLst>
+                                        <p:tav tm="0">
+                                          <p:val>
+                                            <p:strVal val="#ppt_x"/>
+                                          </p:val>
+                                        </p:tav>
+                                        <p:tav tm="100000">
+                                          <p:val>
+                                            <p:strVal val="#ppt_x"/>
+                                          </p:val>
+                                        </p:tav>
+                                      </p:tavLst>
+                                    </p:anim>
+                                    <p:anim calcmode="lin" valueType="num">
+                                      <p:cBhvr additive="base">
+                                        <p:cTn id="12" dur="500" fill="hold"/>
+                                        <p:tgtEl>
+                                          <p:spTgt spid="1028"/>
+                                        </p:tgtEl>
+                                        <p:attrNameLst>
+                                          <p:attrName>ppt_y</p:attrName>
+                                        </p:attrNameLst>
+                                      </p:cBhvr>
+                                      <p:tavLst>
+                                        <p:tav tm="0">
+                                          <p:val>
+                                            <p:strVal val="1+#ppt_h/2"/>
+                                          </p:val>
+                                        </p:tav>
+                                        <p:tav tm="100000">
+                                          <p:val>
+                                            <p:strVal val="#ppt_y"/>
+                                          </p:val>
+                                        </p:tav>
+                                      </p:tavLst>
+                                    </p:anim>
+                                  </p:childTnLst>
+                                </p:cTn>
+                              </p:par>
+                            </p:childTnLst>
+                          </p:cTn>
+                        </p:par>
+                      </p:childTnLst>
+                    </p:cTn>
+                  </p:par>
+                  <p:par>
+                    <p:cTn id="13" fill="hold">
+                      <p:stCondLst>
+                        <p:cond delay="indefinite"/>
+                      </p:stCondLst>
+                      <p:childTnLst>
+                        <p:par>
+                          <p:cTn id="14" fill="hold">
+                            <p:stCondLst>
+                              <p:cond delay="0"/>
+                            </p:stCondLst>
+                            <p:childTnLst>
+                              <p:par>
+                                <p:cTn id="15" presetID="2" presetClass="exit" presetSubtype="4" fill="hold" nodeType="clickEffect">
+                                  <p:stCondLst>
+                                    <p:cond delay="0"/>
+                                  </p:stCondLst>
+                                  <p:childTnLst>
+                                    <p:anim calcmode="lin" valueType="num">
+                                      <p:cBhvr additive="base">
+                                        <p:cTn id="16" dur="500"/>
+                                        <p:tgtEl>
+                                          <p:spTgt spid="1028"/>
+                                        </p:tgtEl>
+                                        <p:attrNameLst>
+                                          <p:attrName>ppt_x</p:attrName>
+                                        </p:attrNameLst>
+                                      </p:cBhvr>
+                                      <p:tavLst>
+                                        <p:tav tm="0">
+                                          <p:val>
+                                            <p:strVal val="ppt_x"/>
+                                          </p:val>
+                                        </p:tav>
+                                        <p:tav tm="100000">
+                                          <p:val>
+                                            <p:strVal val="ppt_x"/>
+                                          </p:val>
+                                        </p:tav>
+                                      </p:tavLst>
+                                    </p:anim>
+                                    <p:anim calcmode="lin" valueType="num">
+                                      <p:cBhvr additive="base">
+                                        <p:cTn id="17" dur="500"/>
+                                        <p:tgtEl>
+                                          <p:spTgt spid="1028"/>
+                                        </p:tgtEl>
+                                        <p:attrNameLst>
+                                          <p:attrName>ppt_y</p:attrName>
+                                        </p:attrNameLst>
+                                      </p:cBhvr>
+                                      <p:tavLst>
+                                        <p:tav tm="0">
+                                          <p:val>
+                                            <p:strVal val="ppt_y"/>
+                                          </p:val>
+                                        </p:tav>
+                                        <p:tav tm="100000">
+                                          <p:val>
+                                            <p:strVal val="1+ppt_h/2"/>
+                                          </p:val>
+                                        </p:tav>
+                                      </p:tavLst>
+                                    </p:anim>
+                                    <p:set>
+                                      <p:cBhvr>
+                                        <p:cTn id="18" dur="1" fill="hold">
+                                          <p:stCondLst>
+                                            <p:cond delay="499"/>
+                                          </p:stCondLst>
+                                        </p:cTn>
+                                        <p:tgtEl>
+                                          <p:spTgt spid="1028"/>
+                                        </p:tgtEl>
+                                        <p:attrNameLst>
+                                          <p:attrName>style.visibility</p:attrName>
+                                        </p:attrNameLst>
+                                      </p:cBhvr>
+                                      <p:to>
+                                        <p:strVal val="hidden"/>
+                                      </p:to>
+                                    </p:set>
+                                  </p:childTnLst>
+                                </p:cTn>
+                              </p:par>
+                              <p:par>
+                                <p:cTn id="19" presetID="2" presetClass="entr" presetSubtype="4" fill="hold" nodeType="withEffect">
+                                  <p:stCondLst>
+                                    <p:cond delay="0"/>
+                                  </p:stCondLst>
+                                  <p:childTnLst>
+                                    <p:set>
+                                      <p:cBhvr>
+                                        <p:cTn id="20" dur="1" fill="hold">
+                                          <p:stCondLst>
+                                            <p:cond delay="0"/>
+                                          </p:stCondLst>
+                                        </p:cTn>
+                                        <p:tgtEl>
+                                          <p:spTgt spid="1027"/>
+                                        </p:tgtEl>
+                                        <p:attrNameLst>
+                                          <p:attrName>style.visibility</p:attrName>
+                                        </p:attrNameLst>
+                                      </p:cBhvr>
+                                      <p:to>
+                                        <p:strVal val="visible"/>
+                                      </p:to>
+                                    </p:set>
+                                    <p:anim calcmode="lin" valueType="num">
+                                      <p:cBhvr additive="base">
+                                        <p:cTn id="21" dur="500" fill="hold"/>
+                                        <p:tgtEl>
+                                          <p:spTgt spid="1027"/>
+                                        </p:tgtEl>
+                                        <p:attrNameLst>
+                                          <p:attrName>ppt_x</p:attrName>
+                                        </p:attrNameLst>
+                                      </p:cBhvr>
+                                      <p:tavLst>
+                                        <p:tav tm="0">
+                                          <p:val>
+                                            <p:strVal val="#ppt_x"/>
+                                          </p:val>
+                                        </p:tav>
+                                        <p:tav tm="100000">
+                                          <p:val>
+                                            <p:strVal val="#ppt_x"/>
+                                          </p:val>
+                                        </p:tav>
+                                      </p:tavLst>
+                                    </p:anim>
+                                    <p:anim calcmode="lin" valueType="num">
+                                      <p:cBhvr additive="base">
+                                        <p:cTn id="22" dur="500" fill="hold"/>
+                                        <p:tgtEl>
+                                          <p:spTgt spid="1027"/>
+                                        </p:tgtEl>
+                                        <p:attrNameLst>
+                                          <p:attrName>ppt_y</p:attrName>
+                                        </p:attrNameLst>
+                                      </p:cBhvr>
+                                      <p:tavLst>
+                                        <p:tav tm="0">
+                                          <p:val>
+                                            <p:strVal val="1+#ppt_h/2"/>
+                                          </p:val>
+                                        </p:tav>
+                                        <p:tav tm="100000">
+                                          <p:val>
+                                            <p:strVal val="#ppt_y"/>
+                                          </p:val>
+                                        </p:tav>
+                                      </p:tavLst>
+                                    </p:anim>
+                                  </p:childTnLst>
+                                </p:cTn>
+                              </p:par>
+                            </p:childTnLst>
+                          </p:cTn>
+                        </p:par>
+                      </p:childTnLst>
+                    </p:cTn>
+                  </p:par>
+                </p:childTnLst>
+              </p:cTn>
+              <p:prevCondLst>
+                <p:cond evt="onPrev" delay="0">
+                  <p:tgtEl>
+                    <p:sldTgt/>
+                  </p:tgtEl>
+                </p:cond>
+              </p:prevCondLst>
+              <p:nextCondLst>
+                <p:cond evt="onNext" delay="0">
+                  <p:tgtEl>
+                    <p:sldTgt/>
+                  </p:tgtEl>
+                </p:cond>
+              </p:nextCondLst>
+            </p:seq>
+          </p:childTnLst>
+        </p:cTn>
+      </p:par>
+    </p:tnLst>
+  </p:timing>
 </p:sld>
 </file>
 
@@ -5265,7 +5959,7 @@
           <a:p>
             <a:r>
               <a:rPr lang="ru-RU" dirty="0" smtClean="0"/>
-              <a:t>Спасибо за внимание!!!</a:t>
+              <a:t>Структура уровня</a:t>
             </a:r>
             <a:endParaRPr lang="ru-RU" dirty="0"/>
           </a:p>
@@ -5273,37 +5967,740 @@
       </p:sp>
       <p:sp>
         <p:nvSpPr>
-          <p:cNvPr id="3" name="Объект 2"/>
-          <p:cNvSpPr>
-            <a:spLocks noGrp="1"/>
-          </p:cNvSpPr>
-          <p:nvPr>
-            <p:ph idx="1"/>
-          </p:nvPr>
-        </p:nvSpPr>
-        <p:spPr/>
-        <p:txBody>
-          <a:bodyPr/>
-          <a:lstStyle/>
-          <a:p>
+          <p:cNvPr id="4" name="Прямоугольник 3"/>
+          <p:cNvSpPr/>
+          <p:nvPr/>
+        </p:nvSpPr>
+        <p:spPr>
+          <a:xfrm>
+            <a:off x="868065" y="1247254"/>
+            <a:ext cx="1440160" cy="648072"/>
+          </a:xfrm>
+          <a:prstGeom prst="rect">
+            <a:avLst/>
+          </a:prstGeom>
+        </p:spPr>
+        <p:style>
+          <a:lnRef idx="2">
+            <a:schemeClr val="accent1">
+              <a:shade val="50000"/>
+            </a:schemeClr>
+          </a:lnRef>
+          <a:fillRef idx="1">
+            <a:schemeClr val="accent1"/>
+          </a:fillRef>
+          <a:effectRef idx="0">
+            <a:schemeClr val="accent1"/>
+          </a:effectRef>
+          <a:fontRef idx="minor">
+            <a:schemeClr val="lt1"/>
+          </a:fontRef>
+        </p:style>
+        <p:txBody>
+          <a:bodyPr rtlCol="0" anchor="ctr"/>
+          <a:lstStyle/>
+          <a:p>
+            <a:pPr algn="ctr"/>
             <a:endParaRPr lang="ru-RU"/>
           </a:p>
         </p:txBody>
       </p:sp>
     </p:spTree>
-    <p:extLst>
-      <p:ext uri="{BB962C8B-B14F-4D97-AF65-F5344CB8AC3E}">
-        <p14:creationId xmlns:p14="http://schemas.microsoft.com/office/powerpoint/2010/main" xmlns="" val="3724832604"/>
-      </p:ext>
-    </p:extLst>
   </p:cSld>
   <p:clrMapOvr>
     <a:masterClrMapping/>
   </p:clrMapOvr>
+  <p:transition>
+    <p:wipe dir="d"/>
+  </p:transition>
   <p:timing>
     <p:tnLst>
       <p:par>
         <p:cTn id="1" dur="indefinite" restart="never" nodeType="tmRoot"/>
+      </p:par>
+    </p:tnLst>
+  </p:timing>
+</p:sld>
+</file>
+
+<file path=ppt/slides/slide9.xml><?xml version="1.0" encoding="utf-8"?>
+<p:sld xmlns:a="http://schemas.openxmlformats.org/drawingml/2006/main" xmlns:r="http://schemas.openxmlformats.org/officeDocument/2006/relationships" xmlns:p="http://schemas.openxmlformats.org/presentationml/2006/main">
+  <p:cSld>
+    <p:spTree>
+      <p:nvGrpSpPr>
+        <p:cNvPr id="1" name=""/>
+        <p:cNvGrpSpPr/>
+        <p:nvPr/>
+      </p:nvGrpSpPr>
+      <p:grpSpPr>
+        <a:xfrm>
+          <a:off x="0" y="0"/>
+          <a:ext cx="0" cy="0"/>
+          <a:chOff x="0" y="0"/>
+          <a:chExt cx="0" cy="0"/>
+        </a:xfrm>
+      </p:grpSpPr>
+      <p:sp>
+        <p:nvSpPr>
+          <p:cNvPr id="2" name="Заголовок 1"/>
+          <p:cNvSpPr>
+            <a:spLocks noGrp="1"/>
+          </p:cNvSpPr>
+          <p:nvPr>
+            <p:ph type="title"/>
+          </p:nvPr>
+        </p:nvSpPr>
+        <p:spPr/>
+        <p:style>
+          <a:lnRef idx="2">
+            <a:schemeClr val="accent1">
+              <a:shade val="50000"/>
+            </a:schemeClr>
+          </a:lnRef>
+          <a:fillRef idx="1">
+            <a:schemeClr val="accent1"/>
+          </a:fillRef>
+          <a:effectRef idx="0">
+            <a:schemeClr val="accent1"/>
+          </a:effectRef>
+          <a:fontRef idx="minor">
+            <a:schemeClr val="lt1"/>
+          </a:fontRef>
+        </p:style>
+        <p:txBody>
+          <a:bodyPr/>
+          <a:lstStyle/>
+          <a:p>
+            <a:r>
+              <a:rPr lang="ru-RU" dirty="0" smtClean="0"/>
+              <a:t>Класс уровня</a:t>
+            </a:r>
+            <a:endParaRPr lang="ru-RU" dirty="0"/>
+          </a:p>
+        </p:txBody>
+      </p:sp>
+      <p:pic>
+        <p:nvPicPr>
+          <p:cNvPr id="4" name="Содержимое 3" descr="Screenshot_2015-04-28-16-50-58 — копия.png"/>
+          <p:cNvPicPr>
+            <a:picLocks noGrp="1" noChangeAspect="1"/>
+          </p:cNvPicPr>
+          <p:nvPr>
+            <p:ph idx="1"/>
+          </p:nvPr>
+        </p:nvPicPr>
+        <p:blipFill>
+          <a:blip r:embed="rId2" cstate="print"/>
+          <a:stretch>
+            <a:fillRect/>
+          </a:stretch>
+        </p:blipFill>
+        <p:spPr>
+          <a:xfrm>
+            <a:off x="1084089" y="1175246"/>
+            <a:ext cx="6912000" cy="4320000"/>
+          </a:xfrm>
+        </p:spPr>
+      </p:pic>
+      <p:pic>
+        <p:nvPicPr>
+          <p:cNvPr id="5" name="Рисунок 4" descr="Screenshot_2015-04-28-16-51-05.png"/>
+          <p:cNvPicPr>
+            <a:picLocks noChangeAspect="1"/>
+          </p:cNvPicPr>
+          <p:nvPr/>
+        </p:nvPicPr>
+        <p:blipFill>
+          <a:blip r:embed="rId3" cstate="print"/>
+          <a:stretch>
+            <a:fillRect/>
+          </a:stretch>
+        </p:blipFill>
+        <p:spPr>
+          <a:xfrm>
+            <a:off x="1084089" y="1175246"/>
+            <a:ext cx="6912000" cy="4320000"/>
+          </a:xfrm>
+          <a:prstGeom prst="rect">
+            <a:avLst/>
+          </a:prstGeom>
+        </p:spPr>
+      </p:pic>
+      <p:pic>
+        <p:nvPicPr>
+          <p:cNvPr id="6" name="Рисунок 5" descr="Screenshot_2015-04-28-16-51-50.png"/>
+          <p:cNvPicPr>
+            <a:picLocks noChangeAspect="1"/>
+          </p:cNvPicPr>
+          <p:nvPr/>
+        </p:nvPicPr>
+        <p:blipFill>
+          <a:blip r:embed="rId4" cstate="print"/>
+          <a:stretch>
+            <a:fillRect/>
+          </a:stretch>
+        </p:blipFill>
+        <p:spPr>
+          <a:xfrm>
+            <a:off x="1084089" y="1175246"/>
+            <a:ext cx="6912000" cy="4320000"/>
+          </a:xfrm>
+          <a:prstGeom prst="rect">
+            <a:avLst/>
+          </a:prstGeom>
+        </p:spPr>
+      </p:pic>
+      <p:pic>
+        <p:nvPicPr>
+          <p:cNvPr id="7" name="Рисунок 6" descr="Screenshot_2015-04-28-17-03-42.png"/>
+          <p:cNvPicPr>
+            <a:picLocks noChangeAspect="1"/>
+          </p:cNvPicPr>
+          <p:nvPr/>
+        </p:nvPicPr>
+        <p:blipFill>
+          <a:blip r:embed="rId5" cstate="print"/>
+          <a:stretch>
+            <a:fillRect/>
+          </a:stretch>
+        </p:blipFill>
+        <p:spPr>
+          <a:xfrm>
+            <a:off x="1084089" y="1175246"/>
+            <a:ext cx="6912000" cy="4320000"/>
+          </a:xfrm>
+          <a:prstGeom prst="rect">
+            <a:avLst/>
+          </a:prstGeom>
+        </p:spPr>
+      </p:pic>
+    </p:spTree>
+  </p:cSld>
+  <p:clrMapOvr>
+    <a:masterClrMapping/>
+  </p:clrMapOvr>
+  <p:transition>
+    <p:wipe dir="d"/>
+  </p:transition>
+  <p:timing>
+    <p:tnLst>
+      <p:par>
+        <p:cTn id="1" dur="indefinite" restart="never" nodeType="tmRoot">
+          <p:childTnLst>
+            <p:seq concurrent="1" nextAc="seek">
+              <p:cTn id="2" dur="indefinite" nodeType="mainSeq">
+                <p:childTnLst>
+                  <p:par>
+                    <p:cTn id="3" fill="hold">
+                      <p:stCondLst>
+                        <p:cond delay="indefinite"/>
+                      </p:stCondLst>
+                      <p:childTnLst>
+                        <p:par>
+                          <p:cTn id="4" fill="hold">
+                            <p:stCondLst>
+                              <p:cond delay="0"/>
+                            </p:stCondLst>
+                            <p:childTnLst>
+                              <p:par>
+                                <p:cTn id="5" presetID="2" presetClass="exit" presetSubtype="4" fill="hold" nodeType="clickEffect">
+                                  <p:stCondLst>
+                                    <p:cond delay="0"/>
+                                  </p:stCondLst>
+                                  <p:childTnLst>
+                                    <p:anim calcmode="lin" valueType="num">
+                                      <p:cBhvr additive="base">
+                                        <p:cTn id="6" dur="500"/>
+                                        <p:tgtEl>
+                                          <p:spTgt spid="4"/>
+                                        </p:tgtEl>
+                                        <p:attrNameLst>
+                                          <p:attrName>ppt_x</p:attrName>
+                                        </p:attrNameLst>
+                                      </p:cBhvr>
+                                      <p:tavLst>
+                                        <p:tav tm="0">
+                                          <p:val>
+                                            <p:strVal val="ppt_x"/>
+                                          </p:val>
+                                        </p:tav>
+                                        <p:tav tm="100000">
+                                          <p:val>
+                                            <p:strVal val="ppt_x"/>
+                                          </p:val>
+                                        </p:tav>
+                                      </p:tavLst>
+                                    </p:anim>
+                                    <p:anim calcmode="lin" valueType="num">
+                                      <p:cBhvr additive="base">
+                                        <p:cTn id="7" dur="500"/>
+                                        <p:tgtEl>
+                                          <p:spTgt spid="4"/>
+                                        </p:tgtEl>
+                                        <p:attrNameLst>
+                                          <p:attrName>ppt_y</p:attrName>
+                                        </p:attrNameLst>
+                                      </p:cBhvr>
+                                      <p:tavLst>
+                                        <p:tav tm="0">
+                                          <p:val>
+                                            <p:strVal val="ppt_y"/>
+                                          </p:val>
+                                        </p:tav>
+                                        <p:tav tm="100000">
+                                          <p:val>
+                                            <p:strVal val="1+ppt_h/2"/>
+                                          </p:val>
+                                        </p:tav>
+                                      </p:tavLst>
+                                    </p:anim>
+                                    <p:set>
+                                      <p:cBhvr>
+                                        <p:cTn id="8" dur="1" fill="hold">
+                                          <p:stCondLst>
+                                            <p:cond delay="499"/>
+                                          </p:stCondLst>
+                                        </p:cTn>
+                                        <p:tgtEl>
+                                          <p:spTgt spid="4"/>
+                                        </p:tgtEl>
+                                        <p:attrNameLst>
+                                          <p:attrName>style.visibility</p:attrName>
+                                        </p:attrNameLst>
+                                      </p:cBhvr>
+                                      <p:to>
+                                        <p:strVal val="hidden"/>
+                                      </p:to>
+                                    </p:set>
+                                  </p:childTnLst>
+                                </p:cTn>
+                              </p:par>
+                              <p:par>
+                                <p:cTn id="9" presetID="2" presetClass="entr" presetSubtype="4" fill="hold" nodeType="withEffect">
+                                  <p:stCondLst>
+                                    <p:cond delay="0"/>
+                                  </p:stCondLst>
+                                  <p:childTnLst>
+                                    <p:set>
+                                      <p:cBhvr>
+                                        <p:cTn id="10" dur="1" fill="hold">
+                                          <p:stCondLst>
+                                            <p:cond delay="0"/>
+                                          </p:stCondLst>
+                                        </p:cTn>
+                                        <p:tgtEl>
+                                          <p:spTgt spid="5"/>
+                                        </p:tgtEl>
+                                        <p:attrNameLst>
+                                          <p:attrName>style.visibility</p:attrName>
+                                        </p:attrNameLst>
+                                      </p:cBhvr>
+                                      <p:to>
+                                        <p:strVal val="visible"/>
+                                      </p:to>
+                                    </p:set>
+                                    <p:anim calcmode="lin" valueType="num">
+                                      <p:cBhvr additive="base">
+                                        <p:cTn id="11" dur="500" fill="hold"/>
+                                        <p:tgtEl>
+                                          <p:spTgt spid="5"/>
+                                        </p:tgtEl>
+                                        <p:attrNameLst>
+                                          <p:attrName>ppt_x</p:attrName>
+                                        </p:attrNameLst>
+                                      </p:cBhvr>
+                                      <p:tavLst>
+                                        <p:tav tm="0">
+                                          <p:val>
+                                            <p:strVal val="#ppt_x"/>
+                                          </p:val>
+                                        </p:tav>
+                                        <p:tav tm="100000">
+                                          <p:val>
+                                            <p:strVal val="#ppt_x"/>
+                                          </p:val>
+                                        </p:tav>
+                                      </p:tavLst>
+                                    </p:anim>
+                                    <p:anim calcmode="lin" valueType="num">
+                                      <p:cBhvr additive="base">
+                                        <p:cTn id="12" dur="500" fill="hold"/>
+                                        <p:tgtEl>
+                                          <p:spTgt spid="5"/>
+                                        </p:tgtEl>
+                                        <p:attrNameLst>
+                                          <p:attrName>ppt_y</p:attrName>
+                                        </p:attrNameLst>
+                                      </p:cBhvr>
+                                      <p:tavLst>
+                                        <p:tav tm="0">
+                                          <p:val>
+                                            <p:strVal val="1+#ppt_h/2"/>
+                                          </p:val>
+                                        </p:tav>
+                                        <p:tav tm="100000">
+                                          <p:val>
+                                            <p:strVal val="#ppt_y"/>
+                                          </p:val>
+                                        </p:tav>
+                                      </p:tavLst>
+                                    </p:anim>
+                                  </p:childTnLst>
+                                </p:cTn>
+                              </p:par>
+                            </p:childTnLst>
+                          </p:cTn>
+                        </p:par>
+                      </p:childTnLst>
+                    </p:cTn>
+                  </p:par>
+                  <p:par>
+                    <p:cTn id="13" fill="hold">
+                      <p:stCondLst>
+                        <p:cond delay="indefinite"/>
+                      </p:stCondLst>
+                      <p:childTnLst>
+                        <p:par>
+                          <p:cTn id="14" fill="hold">
+                            <p:stCondLst>
+                              <p:cond delay="0"/>
+                            </p:stCondLst>
+                            <p:childTnLst>
+                              <p:par>
+                                <p:cTn id="15" presetID="2" presetClass="exit" presetSubtype="4" fill="hold" nodeType="clickEffect">
+                                  <p:stCondLst>
+                                    <p:cond delay="0"/>
+                                  </p:stCondLst>
+                                  <p:childTnLst>
+                                    <p:anim calcmode="lin" valueType="num">
+                                      <p:cBhvr additive="base">
+                                        <p:cTn id="16" dur="500"/>
+                                        <p:tgtEl>
+                                          <p:spTgt spid="5"/>
+                                        </p:tgtEl>
+                                        <p:attrNameLst>
+                                          <p:attrName>ppt_x</p:attrName>
+                                        </p:attrNameLst>
+                                      </p:cBhvr>
+                                      <p:tavLst>
+                                        <p:tav tm="0">
+                                          <p:val>
+                                            <p:strVal val="ppt_x"/>
+                                          </p:val>
+                                        </p:tav>
+                                        <p:tav tm="100000">
+                                          <p:val>
+                                            <p:strVal val="ppt_x"/>
+                                          </p:val>
+                                        </p:tav>
+                                      </p:tavLst>
+                                    </p:anim>
+                                    <p:anim calcmode="lin" valueType="num">
+                                      <p:cBhvr additive="base">
+                                        <p:cTn id="17" dur="500"/>
+                                        <p:tgtEl>
+                                          <p:spTgt spid="5"/>
+                                        </p:tgtEl>
+                                        <p:attrNameLst>
+                                          <p:attrName>ppt_y</p:attrName>
+                                        </p:attrNameLst>
+                                      </p:cBhvr>
+                                      <p:tavLst>
+                                        <p:tav tm="0">
+                                          <p:val>
+                                            <p:strVal val="ppt_y"/>
+                                          </p:val>
+                                        </p:tav>
+                                        <p:tav tm="100000">
+                                          <p:val>
+                                            <p:strVal val="1+ppt_h/2"/>
+                                          </p:val>
+                                        </p:tav>
+                                      </p:tavLst>
+                                    </p:anim>
+                                    <p:set>
+                                      <p:cBhvr>
+                                        <p:cTn id="18" dur="1" fill="hold">
+                                          <p:stCondLst>
+                                            <p:cond delay="499"/>
+                                          </p:stCondLst>
+                                        </p:cTn>
+                                        <p:tgtEl>
+                                          <p:spTgt spid="5"/>
+                                        </p:tgtEl>
+                                        <p:attrNameLst>
+                                          <p:attrName>style.visibility</p:attrName>
+                                        </p:attrNameLst>
+                                      </p:cBhvr>
+                                      <p:to>
+                                        <p:strVal val="hidden"/>
+                                      </p:to>
+                                    </p:set>
+                                  </p:childTnLst>
+                                </p:cTn>
+                              </p:par>
+                              <p:par>
+                                <p:cTn id="19" presetID="2" presetClass="entr" presetSubtype="4" fill="hold" nodeType="withEffect">
+                                  <p:stCondLst>
+                                    <p:cond delay="0"/>
+                                  </p:stCondLst>
+                                  <p:childTnLst>
+                                    <p:set>
+                                      <p:cBhvr>
+                                        <p:cTn id="20" dur="1" fill="hold">
+                                          <p:stCondLst>
+                                            <p:cond delay="0"/>
+                                          </p:stCondLst>
+                                        </p:cTn>
+                                        <p:tgtEl>
+                                          <p:spTgt spid="6"/>
+                                        </p:tgtEl>
+                                        <p:attrNameLst>
+                                          <p:attrName>style.visibility</p:attrName>
+                                        </p:attrNameLst>
+                                      </p:cBhvr>
+                                      <p:to>
+                                        <p:strVal val="visible"/>
+                                      </p:to>
+                                    </p:set>
+                                    <p:anim calcmode="lin" valueType="num">
+                                      <p:cBhvr additive="base">
+                                        <p:cTn id="21" dur="500" fill="hold"/>
+                                        <p:tgtEl>
+                                          <p:spTgt spid="6"/>
+                                        </p:tgtEl>
+                                        <p:attrNameLst>
+                                          <p:attrName>ppt_x</p:attrName>
+                                        </p:attrNameLst>
+                                      </p:cBhvr>
+                                      <p:tavLst>
+                                        <p:tav tm="0">
+                                          <p:val>
+                                            <p:strVal val="#ppt_x"/>
+                                          </p:val>
+                                        </p:tav>
+                                        <p:tav tm="100000">
+                                          <p:val>
+                                            <p:strVal val="#ppt_x"/>
+                                          </p:val>
+                                        </p:tav>
+                                      </p:tavLst>
+                                    </p:anim>
+                                    <p:anim calcmode="lin" valueType="num">
+                                      <p:cBhvr additive="base">
+                                        <p:cTn id="22" dur="500" fill="hold"/>
+                                        <p:tgtEl>
+                                          <p:spTgt spid="6"/>
+                                        </p:tgtEl>
+                                        <p:attrNameLst>
+                                          <p:attrName>ppt_y</p:attrName>
+                                        </p:attrNameLst>
+                                      </p:cBhvr>
+                                      <p:tavLst>
+                                        <p:tav tm="0">
+                                          <p:val>
+                                            <p:strVal val="1+#ppt_h/2"/>
+                                          </p:val>
+                                        </p:tav>
+                                        <p:tav tm="100000">
+                                          <p:val>
+                                            <p:strVal val="#ppt_y"/>
+                                          </p:val>
+                                        </p:tav>
+                                      </p:tavLst>
+                                    </p:anim>
+                                  </p:childTnLst>
+                                </p:cTn>
+                              </p:par>
+                            </p:childTnLst>
+                          </p:cTn>
+                        </p:par>
+                      </p:childTnLst>
+                    </p:cTn>
+                  </p:par>
+                  <p:par>
+                    <p:cTn id="23" fill="hold">
+                      <p:stCondLst>
+                        <p:cond delay="indefinite"/>
+                      </p:stCondLst>
+                      <p:childTnLst>
+                        <p:par>
+                          <p:cTn id="24" fill="hold">
+                            <p:stCondLst>
+                              <p:cond delay="0"/>
+                            </p:stCondLst>
+                            <p:childTnLst>
+                              <p:par>
+                                <p:cTn id="25" presetID="2" presetClass="exit" presetSubtype="4" fill="hold" nodeType="clickEffect">
+                                  <p:stCondLst>
+                                    <p:cond delay="0"/>
+                                  </p:stCondLst>
+                                  <p:childTnLst>
+                                    <p:anim calcmode="lin" valueType="num">
+                                      <p:cBhvr additive="base">
+                                        <p:cTn id="26" dur="500"/>
+                                        <p:tgtEl>
+                                          <p:spTgt spid="6"/>
+                                        </p:tgtEl>
+                                        <p:attrNameLst>
+                                          <p:attrName>ppt_x</p:attrName>
+                                        </p:attrNameLst>
+                                      </p:cBhvr>
+                                      <p:tavLst>
+                                        <p:tav tm="0">
+                                          <p:val>
+                                            <p:strVal val="ppt_x"/>
+                                          </p:val>
+                                        </p:tav>
+                                        <p:tav tm="100000">
+                                          <p:val>
+                                            <p:strVal val="ppt_x"/>
+                                          </p:val>
+                                        </p:tav>
+                                      </p:tavLst>
+                                    </p:anim>
+                                    <p:anim calcmode="lin" valueType="num">
+                                      <p:cBhvr additive="base">
+                                        <p:cTn id="27" dur="500"/>
+                                        <p:tgtEl>
+                                          <p:spTgt spid="6"/>
+                                        </p:tgtEl>
+                                        <p:attrNameLst>
+                                          <p:attrName>ppt_y</p:attrName>
+                                        </p:attrNameLst>
+                                      </p:cBhvr>
+                                      <p:tavLst>
+                                        <p:tav tm="0">
+                                          <p:val>
+                                            <p:strVal val="ppt_y"/>
+                                          </p:val>
+                                        </p:tav>
+                                        <p:tav tm="100000">
+                                          <p:val>
+                                            <p:strVal val="1+ppt_h/2"/>
+                                          </p:val>
+                                        </p:tav>
+                                      </p:tavLst>
+                                    </p:anim>
+                                    <p:set>
+                                      <p:cBhvr>
+                                        <p:cTn id="28" dur="1" fill="hold">
+                                          <p:stCondLst>
+                                            <p:cond delay="499"/>
+                                          </p:stCondLst>
+                                        </p:cTn>
+                                        <p:tgtEl>
+                                          <p:spTgt spid="6"/>
+                                        </p:tgtEl>
+                                        <p:attrNameLst>
+                                          <p:attrName>style.visibility</p:attrName>
+                                        </p:attrNameLst>
+                                      </p:cBhvr>
+                                      <p:to>
+                                        <p:strVal val="hidden"/>
+                                      </p:to>
+                                    </p:set>
+                                  </p:childTnLst>
+                                </p:cTn>
+                              </p:par>
+                              <p:par>
+                                <p:cTn id="29" presetID="2" presetClass="entr" presetSubtype="4" fill="hold" nodeType="withEffect">
+                                  <p:stCondLst>
+                                    <p:cond delay="0"/>
+                                  </p:stCondLst>
+                                  <p:childTnLst>
+                                    <p:set>
+                                      <p:cBhvr>
+                                        <p:cTn id="30" dur="1" fill="hold">
+                                          <p:stCondLst>
+                                            <p:cond delay="0"/>
+                                          </p:stCondLst>
+                                        </p:cTn>
+                                        <p:tgtEl>
+                                          <p:spTgt spid="7"/>
+                                        </p:tgtEl>
+                                        <p:attrNameLst>
+                                          <p:attrName>style.visibility</p:attrName>
+                                        </p:attrNameLst>
+                                      </p:cBhvr>
+                                      <p:to>
+                                        <p:strVal val="visible"/>
+                                      </p:to>
+                                    </p:set>
+                                    <p:anim calcmode="lin" valueType="num">
+                                      <p:cBhvr additive="base">
+                                        <p:cTn id="31" dur="500" fill="hold"/>
+                                        <p:tgtEl>
+                                          <p:spTgt spid="7"/>
+                                        </p:tgtEl>
+                                        <p:attrNameLst>
+                                          <p:attrName>ppt_x</p:attrName>
+                                        </p:attrNameLst>
+                                      </p:cBhvr>
+                                      <p:tavLst>
+                                        <p:tav tm="0">
+                                          <p:val>
+                                            <p:strVal val="#ppt_x"/>
+                                          </p:val>
+                                        </p:tav>
+                                        <p:tav tm="100000">
+                                          <p:val>
+                                            <p:strVal val="#ppt_x"/>
+                                          </p:val>
+                                        </p:tav>
+                                      </p:tavLst>
+                                    </p:anim>
+                                    <p:anim calcmode="lin" valueType="num">
+                                      <p:cBhvr additive="base">
+                                        <p:cTn id="32" dur="500" fill="hold"/>
+                                        <p:tgtEl>
+                                          <p:spTgt spid="7"/>
+                                        </p:tgtEl>
+                                        <p:attrNameLst>
+                                          <p:attrName>ppt_y</p:attrName>
+                                        </p:attrNameLst>
+                                      </p:cBhvr>
+                                      <p:tavLst>
+                                        <p:tav tm="0">
+                                          <p:val>
+                                            <p:strVal val="1+#ppt_h/2"/>
+                                          </p:val>
+                                        </p:tav>
+                                        <p:tav tm="100000">
+                                          <p:val>
+                                            <p:strVal val="#ppt_y"/>
+                                          </p:val>
+                                        </p:tav>
+                                      </p:tavLst>
+                                    </p:anim>
+                                  </p:childTnLst>
+                                </p:cTn>
+                              </p:par>
+                            </p:childTnLst>
+                          </p:cTn>
+                        </p:par>
+                      </p:childTnLst>
+                    </p:cTn>
+                  </p:par>
+                </p:childTnLst>
+              </p:cTn>
+              <p:prevCondLst>
+                <p:cond evt="onPrev" delay="0">
+                  <p:tgtEl>
+                    <p:sldTgt/>
+                  </p:tgtEl>
+                </p:cond>
+              </p:prevCondLst>
+              <p:nextCondLst>
+                <p:cond evt="onNext" delay="0">
+                  <p:tgtEl>
+                    <p:sldTgt/>
+                  </p:tgtEl>
+                </p:cond>
+              </p:nextCondLst>
+            </p:seq>
+          </p:childTnLst>
+        </p:cTn>
       </p:par>
     </p:tnLst>
   </p:timing>

</xml_diff>

<commit_message>
15_04_28_22_01 //finished presentation //added some javaDoc //regenerated javaDoc
</commit_message>
<xml_diff>
--- a/Samsung/Presentation/Андрющенко Андрей - 'Гравитационные частицы'.pptx
+++ b/Samsung/Presentation/Андрющенко Андрей - 'Гравитационные частицы'.pptx
@@ -11,8 +11,8 @@
     <p:sldId id="260" r:id="rId5"/>
     <p:sldId id="261" r:id="rId6"/>
     <p:sldId id="262" r:id="rId7"/>
-    <p:sldId id="265" r:id="rId8"/>
-    <p:sldId id="267" r:id="rId9"/>
+    <p:sldId id="267" r:id="rId8"/>
+    <p:sldId id="265" r:id="rId9"/>
     <p:sldId id="264" r:id="rId10"/>
     <p:sldId id="266" r:id="rId11"/>
     <p:sldId id="263" r:id="rId12"/>
@@ -116,7 +116,7 @@
   </p:defaultTextStyle>
   <p:extLst>
     <p:ext uri="{EFAFB233-063F-42B5-8137-9DF3F51BA10A}">
-      <p15:sldGuideLst xmlns:p15="http://schemas.microsoft.com/office/powerpoint/2012/main" xmlns="">
+      <p15:sldGuideLst xmlns:p15="http://schemas.microsoft.com/office/powerpoint/2012/main">
         <p15:guide id="1" orient="horz" pos="1648">
           <p15:clr>
             <a:srgbClr val="A4A3A4"/>
@@ -315,7 +315,7 @@
             <a:fld id="{B4C71EC6-210F-42DE-9C53-41977AD35B3D}" type="datetimeFigureOut">
               <a:rPr lang="ru-RU" smtClean="0"/>
               <a:pPr/>
-              <a:t>28.04.2015</a:t>
+              <a:t>29.04.2015</a:t>
             </a:fld>
             <a:endParaRPr lang="ru-RU"/>
           </a:p>
@@ -369,8 +369,8 @@
   <p:clrMapOvr>
     <a:masterClrMapping/>
   </p:clrMapOvr>
-  <p:transition>
-    <p:wipe dir="d"/>
+  <p:transition spd="slow">
+    <p:push dir="u"/>
   </p:transition>
 </p:sldLayout>
 </file>
@@ -485,7 +485,7 @@
             <a:fld id="{B4C71EC6-210F-42DE-9C53-41977AD35B3D}" type="datetimeFigureOut">
               <a:rPr lang="ru-RU" smtClean="0"/>
               <a:pPr/>
-              <a:t>28.04.2015</a:t>
+              <a:t>29.04.2015</a:t>
             </a:fld>
             <a:endParaRPr lang="ru-RU"/>
           </a:p>
@@ -539,8 +539,8 @@
   <p:clrMapOvr>
     <a:masterClrMapping/>
   </p:clrMapOvr>
-  <p:transition>
-    <p:wipe dir="d"/>
+  <p:transition spd="slow">
+    <p:push dir="u"/>
   </p:transition>
 </p:sldLayout>
 </file>
@@ -665,7 +665,7 @@
             <a:fld id="{B4C71EC6-210F-42DE-9C53-41977AD35B3D}" type="datetimeFigureOut">
               <a:rPr lang="ru-RU" smtClean="0"/>
               <a:pPr/>
-              <a:t>28.04.2015</a:t>
+              <a:t>29.04.2015</a:t>
             </a:fld>
             <a:endParaRPr lang="ru-RU"/>
           </a:p>
@@ -719,8 +719,8 @@
   <p:clrMapOvr>
     <a:masterClrMapping/>
   </p:clrMapOvr>
-  <p:transition>
-    <p:wipe dir="d"/>
+  <p:transition spd="slow">
+    <p:push dir="u"/>
   </p:transition>
 </p:sldLayout>
 </file>
@@ -835,7 +835,7 @@
             <a:fld id="{B4C71EC6-210F-42DE-9C53-41977AD35B3D}" type="datetimeFigureOut">
               <a:rPr lang="ru-RU" smtClean="0"/>
               <a:pPr/>
-              <a:t>28.04.2015</a:t>
+              <a:t>29.04.2015</a:t>
             </a:fld>
             <a:endParaRPr lang="ru-RU"/>
           </a:p>
@@ -889,8 +889,8 @@
   <p:clrMapOvr>
     <a:masterClrMapping/>
   </p:clrMapOvr>
-  <p:transition>
-    <p:wipe dir="d"/>
+  <p:transition spd="slow">
+    <p:push dir="u"/>
   </p:transition>
 </p:sldLayout>
 </file>
@@ -1081,7 +1081,7 @@
             <a:fld id="{B4C71EC6-210F-42DE-9C53-41977AD35B3D}" type="datetimeFigureOut">
               <a:rPr lang="ru-RU" smtClean="0"/>
               <a:pPr/>
-              <a:t>28.04.2015</a:t>
+              <a:t>29.04.2015</a:t>
             </a:fld>
             <a:endParaRPr lang="ru-RU"/>
           </a:p>
@@ -1135,8 +1135,8 @@
   <p:clrMapOvr>
     <a:masterClrMapping/>
   </p:clrMapOvr>
-  <p:transition>
-    <p:wipe dir="d"/>
+  <p:transition spd="slow">
+    <p:push dir="u"/>
   </p:transition>
 </p:sldLayout>
 </file>
@@ -1369,7 +1369,7 @@
             <a:fld id="{B4C71EC6-210F-42DE-9C53-41977AD35B3D}" type="datetimeFigureOut">
               <a:rPr lang="ru-RU" smtClean="0"/>
               <a:pPr/>
-              <a:t>28.04.2015</a:t>
+              <a:t>29.04.2015</a:t>
             </a:fld>
             <a:endParaRPr lang="ru-RU"/>
           </a:p>
@@ -1423,8 +1423,8 @@
   <p:clrMapOvr>
     <a:masterClrMapping/>
   </p:clrMapOvr>
-  <p:transition>
-    <p:wipe dir="d"/>
+  <p:transition spd="slow">
+    <p:push dir="u"/>
   </p:transition>
 </p:sldLayout>
 </file>
@@ -1791,7 +1791,7 @@
             <a:fld id="{B4C71EC6-210F-42DE-9C53-41977AD35B3D}" type="datetimeFigureOut">
               <a:rPr lang="ru-RU" smtClean="0"/>
               <a:pPr/>
-              <a:t>28.04.2015</a:t>
+              <a:t>29.04.2015</a:t>
             </a:fld>
             <a:endParaRPr lang="ru-RU"/>
           </a:p>
@@ -1845,8 +1845,8 @@
   <p:clrMapOvr>
     <a:masterClrMapping/>
   </p:clrMapOvr>
-  <p:transition>
-    <p:wipe dir="d"/>
+  <p:transition spd="slow">
+    <p:push dir="u"/>
   </p:transition>
 </p:sldLayout>
 </file>
@@ -1909,7 +1909,7 @@
             <a:fld id="{B4C71EC6-210F-42DE-9C53-41977AD35B3D}" type="datetimeFigureOut">
               <a:rPr lang="ru-RU" smtClean="0"/>
               <a:pPr/>
-              <a:t>28.04.2015</a:t>
+              <a:t>29.04.2015</a:t>
             </a:fld>
             <a:endParaRPr lang="ru-RU"/>
           </a:p>
@@ -1963,8 +1963,8 @@
   <p:clrMapOvr>
     <a:masterClrMapping/>
   </p:clrMapOvr>
-  <p:transition>
-    <p:wipe dir="d"/>
+  <p:transition spd="slow">
+    <p:push dir="u"/>
   </p:transition>
 </p:sldLayout>
 </file>
@@ -2004,7 +2004,7 @@
             <a:fld id="{B4C71EC6-210F-42DE-9C53-41977AD35B3D}" type="datetimeFigureOut">
               <a:rPr lang="ru-RU" smtClean="0"/>
               <a:pPr/>
-              <a:t>28.04.2015</a:t>
+              <a:t>29.04.2015</a:t>
             </a:fld>
             <a:endParaRPr lang="ru-RU"/>
           </a:p>
@@ -2058,8 +2058,8 @@
   <p:clrMapOvr>
     <a:masterClrMapping/>
   </p:clrMapOvr>
-  <p:transition>
-    <p:wipe dir="d"/>
+  <p:transition spd="slow">
+    <p:push dir="u"/>
   </p:transition>
 </p:sldLayout>
 </file>
@@ -2281,7 +2281,7 @@
             <a:fld id="{B4C71EC6-210F-42DE-9C53-41977AD35B3D}" type="datetimeFigureOut">
               <a:rPr lang="ru-RU" smtClean="0"/>
               <a:pPr/>
-              <a:t>28.04.2015</a:t>
+              <a:t>29.04.2015</a:t>
             </a:fld>
             <a:endParaRPr lang="ru-RU"/>
           </a:p>
@@ -2335,8 +2335,8 @@
   <p:clrMapOvr>
     <a:masterClrMapping/>
   </p:clrMapOvr>
-  <p:transition>
-    <p:wipe dir="d"/>
+  <p:transition spd="slow">
+    <p:push dir="u"/>
   </p:transition>
 </p:sldLayout>
 </file>
@@ -2534,7 +2534,7 @@
             <a:fld id="{B4C71EC6-210F-42DE-9C53-41977AD35B3D}" type="datetimeFigureOut">
               <a:rPr lang="ru-RU" smtClean="0"/>
               <a:pPr/>
-              <a:t>28.04.2015</a:t>
+              <a:t>29.04.2015</a:t>
             </a:fld>
             <a:endParaRPr lang="ru-RU"/>
           </a:p>
@@ -2588,8 +2588,8 @@
   <p:clrMapOvr>
     <a:masterClrMapping/>
   </p:clrMapOvr>
-  <p:transition>
-    <p:wipe dir="d"/>
+  <p:transition spd="slow">
+    <p:push dir="u"/>
   </p:transition>
 </p:sldLayout>
 </file>
@@ -2756,7 +2756,7 @@
             <a:fld id="{B4C71EC6-210F-42DE-9C53-41977AD35B3D}" type="datetimeFigureOut">
               <a:rPr lang="ru-RU" smtClean="0"/>
               <a:pPr/>
-              <a:t>28.04.2015</a:t>
+              <a:t>29.04.2015</a:t>
             </a:fld>
             <a:endParaRPr lang="ru-RU"/>
           </a:p>
@@ -2857,8 +2857,8 @@
     <p:sldLayoutId id="2147483658" r:id="rId10"/>
     <p:sldLayoutId id="2147483659" r:id="rId11"/>
   </p:sldLayoutIdLst>
-  <p:transition>
-    <p:wipe dir="d"/>
+  <p:transition spd="slow">
+    <p:push dir="u"/>
   </p:transition>
   <p:txStyles>
     <p:titleStyle>
@@ -3688,13 +3688,6 @@
               </a:rPr>
               <a:t>Математический Лицей</a:t>
             </a:r>
-            <a:endParaRPr lang="ru-RU" sz="1400" b="1" dirty="0" smtClean="0">
-              <a:solidFill>
-                <a:schemeClr val="tx2">
-                  <a:lumMod val="75000"/>
-                </a:schemeClr>
-              </a:solidFill>
-            </a:endParaRPr>
           </a:p>
           <a:p>
             <a:pPr marL="0" marR="0" lvl="0" indent="0" algn="l" defTabSz="914400" rtl="0" eaLnBrk="1" fontAlgn="auto" latinLnBrk="0" hangingPunct="1">
@@ -3876,15 +3869,15 @@
     </p:spTree>
     <p:extLst>
       <p:ext uri="{BB962C8B-B14F-4D97-AF65-F5344CB8AC3E}">
-        <p14:creationId xmlns:p14="http://schemas.microsoft.com/office/powerpoint/2010/main" xmlns="" val="267235647"/>
+        <p14:creationId xmlns:p14="http://schemas.microsoft.com/office/powerpoint/2010/main" val="267235647"/>
       </p:ext>
     </p:extLst>
   </p:cSld>
   <p:clrMapOvr>
     <a:masterClrMapping/>
   </p:clrMapOvr>
-  <p:transition>
-    <p:wipe dir="d"/>
+  <p:transition spd="slow">
+    <p:push dir="u"/>
   </p:transition>
   <p:timing>
     <p:tnLst>
@@ -3983,8 +3976,8 @@
   <p:clrMapOvr>
     <a:masterClrMapping/>
   </p:clrMapOvr>
-  <p:transition>
-    <p:wipe dir="d"/>
+  <p:transition spd="slow">
+    <p:push dir="u"/>
   </p:transition>
   <p:timing>
     <p:tnLst>
@@ -4074,15 +4067,15 @@
     </p:spTree>
     <p:extLst>
       <p:ext uri="{BB962C8B-B14F-4D97-AF65-F5344CB8AC3E}">
-        <p14:creationId xmlns:p14="http://schemas.microsoft.com/office/powerpoint/2010/main" xmlns="" val="3724832604"/>
+        <p14:creationId xmlns:p14="http://schemas.microsoft.com/office/powerpoint/2010/main" val="3724832604"/>
       </p:ext>
     </p:extLst>
   </p:cSld>
   <p:clrMapOvr>
     <a:masterClrMapping/>
   </p:clrMapOvr>
-  <p:transition>
-    <p:wipe dir="d"/>
+  <p:transition spd="slow">
+    <p:push dir="u"/>
   </p:transition>
   <p:timing>
     <p:tnLst>
@@ -4190,15 +4183,15 @@
     </p:spTree>
     <p:extLst>
       <p:ext uri="{BB962C8B-B14F-4D97-AF65-F5344CB8AC3E}">
-        <p14:creationId xmlns:p14="http://schemas.microsoft.com/office/powerpoint/2010/main" xmlns="" val="2673980021"/>
+        <p14:creationId xmlns:p14="http://schemas.microsoft.com/office/powerpoint/2010/main" val="2673980021"/>
       </p:ext>
     </p:extLst>
   </p:cSld>
   <p:clrMapOvr>
     <a:masterClrMapping/>
   </p:clrMapOvr>
-  <p:transition>
-    <p:wipe dir="d"/>
+  <p:transition spd="slow">
+    <p:push dir="u"/>
   </p:transition>
   <p:timing>
     <p:tnLst>
@@ -4322,15 +4315,15 @@
     </p:spTree>
     <p:extLst>
       <p:ext uri="{BB962C8B-B14F-4D97-AF65-F5344CB8AC3E}">
-        <p14:creationId xmlns:p14="http://schemas.microsoft.com/office/powerpoint/2010/main" xmlns="" val="4226990272"/>
+        <p14:creationId xmlns:p14="http://schemas.microsoft.com/office/powerpoint/2010/main" val="4226990272"/>
       </p:ext>
     </p:extLst>
   </p:cSld>
   <p:clrMapOvr>
     <a:masterClrMapping/>
   </p:clrMapOvr>
-  <p:transition>
-    <p:wipe dir="d"/>
+  <p:transition spd="slow">
+    <p:push dir="u"/>
   </p:transition>
   <p:timing>
     <p:tnLst>
@@ -4462,15 +4455,15 @@
     </p:spTree>
     <p:extLst>
       <p:ext uri="{BB962C8B-B14F-4D97-AF65-F5344CB8AC3E}">
-        <p14:creationId xmlns:p14="http://schemas.microsoft.com/office/powerpoint/2010/main" xmlns="" val="3450916455"/>
+        <p14:creationId xmlns:p14="http://schemas.microsoft.com/office/powerpoint/2010/main" val="3450916455"/>
       </p:ext>
     </p:extLst>
   </p:cSld>
   <p:clrMapOvr>
     <a:masterClrMapping/>
   </p:clrMapOvr>
-  <p:transition>
-    <p:wipe dir="d"/>
+  <p:transition spd="slow">
+    <p:push dir="u"/>
   </p:transition>
   <p:timing>
     <p:tnLst>
@@ -4764,15 +4757,15 @@
     </p:spTree>
     <p:extLst>
       <p:ext uri="{BB962C8B-B14F-4D97-AF65-F5344CB8AC3E}">
-        <p14:creationId xmlns:p14="http://schemas.microsoft.com/office/powerpoint/2010/main" xmlns="" val="1483474005"/>
+        <p14:creationId xmlns:p14="http://schemas.microsoft.com/office/powerpoint/2010/main" val="1483474005"/>
       </p:ext>
     </p:extLst>
   </p:cSld>
   <p:clrMapOvr>
     <a:masterClrMapping/>
   </p:clrMapOvr>
-  <p:transition>
-    <p:wipe dir="d"/>
+  <p:transition spd="slow">
+    <p:push dir="u"/>
   </p:transition>
   <p:timing>
     <p:tnLst>
@@ -5367,15 +5360,15 @@
     </p:spTree>
     <p:extLst>
       <p:ext uri="{BB962C8B-B14F-4D97-AF65-F5344CB8AC3E}">
-        <p14:creationId xmlns:p14="http://schemas.microsoft.com/office/powerpoint/2010/main" xmlns="" val="1473186529"/>
+        <p14:creationId xmlns:p14="http://schemas.microsoft.com/office/powerpoint/2010/main" val="1473186529"/>
       </p:ext>
     </p:extLst>
   </p:cSld>
   <p:clrMapOvr>
     <a:masterClrMapping/>
   </p:clrMapOvr>
-  <p:transition>
-    <p:wipe dir="d"/>
+  <p:transition spd="slow">
+    <p:push dir="u"/>
   </p:transition>
   <p:timing>
     <p:tnLst>
@@ -5388,6 +5381,3722 @@
 </file>
 
 <file path=ppt/slides/slide7.xml><?xml version="1.0" encoding="utf-8"?>
+<p:sld xmlns:a="http://schemas.openxmlformats.org/drawingml/2006/main" xmlns:r="http://schemas.openxmlformats.org/officeDocument/2006/relationships" xmlns:p="http://schemas.openxmlformats.org/presentationml/2006/main">
+  <p:cSld>
+    <p:spTree>
+      <p:nvGrpSpPr>
+        <p:cNvPr id="1" name=""/>
+        <p:cNvGrpSpPr/>
+        <p:nvPr/>
+      </p:nvGrpSpPr>
+      <p:grpSpPr>
+        <a:xfrm>
+          <a:off x="0" y="0"/>
+          <a:ext cx="0" cy="0"/>
+          <a:chOff x="0" y="0"/>
+          <a:chExt cx="0" cy="0"/>
+        </a:xfrm>
+      </p:grpSpPr>
+      <p:sp>
+        <p:nvSpPr>
+          <p:cNvPr id="2" name="Заголовок 1"/>
+          <p:cNvSpPr>
+            <a:spLocks noGrp="1"/>
+          </p:cNvSpPr>
+          <p:nvPr>
+            <p:ph type="title"/>
+          </p:nvPr>
+        </p:nvSpPr>
+        <p:spPr/>
+        <p:style>
+          <a:lnRef idx="2">
+            <a:schemeClr val="accent3">
+              <a:shade val="50000"/>
+            </a:schemeClr>
+          </a:lnRef>
+          <a:fillRef idx="1">
+            <a:schemeClr val="accent3"/>
+          </a:fillRef>
+          <a:effectRef idx="0">
+            <a:schemeClr val="accent3"/>
+          </a:effectRef>
+          <a:fontRef idx="minor">
+            <a:schemeClr val="lt1"/>
+          </a:fontRef>
+        </p:style>
+        <p:txBody>
+          <a:bodyPr/>
+          <a:lstStyle/>
+          <a:p>
+            <a:r>
+              <a:rPr lang="ru-RU" dirty="0" smtClean="0"/>
+              <a:t>Структура уровня</a:t>
+            </a:r>
+            <a:endParaRPr lang="ru-RU" dirty="0"/>
+          </a:p>
+        </p:txBody>
+      </p:sp>
+      <p:sp>
+        <p:nvSpPr>
+          <p:cNvPr id="4" name="Прямоугольник 3"/>
+          <p:cNvSpPr/>
+          <p:nvPr/>
+        </p:nvSpPr>
+        <p:spPr>
+          <a:xfrm>
+            <a:off x="2020193" y="1175246"/>
+            <a:ext cx="2232248" cy="432048"/>
+          </a:xfrm>
+          <a:prstGeom prst="rect">
+            <a:avLst/>
+          </a:prstGeom>
+        </p:spPr>
+        <p:style>
+          <a:lnRef idx="2">
+            <a:schemeClr val="accent1">
+              <a:shade val="50000"/>
+            </a:schemeClr>
+          </a:lnRef>
+          <a:fillRef idx="1">
+            <a:schemeClr val="accent1"/>
+          </a:fillRef>
+          <a:effectRef idx="0">
+            <a:schemeClr val="accent1"/>
+          </a:effectRef>
+          <a:fontRef idx="minor">
+            <a:schemeClr val="lt1"/>
+          </a:fontRef>
+        </p:style>
+        <p:txBody>
+          <a:bodyPr rtlCol="0" anchor="ctr"/>
+          <a:lstStyle/>
+          <a:p>
+            <a:pPr algn="ctr"/>
+            <a:r>
+              <a:rPr lang="en-US" dirty="0" smtClean="0"/>
+              <a:t>Level extends Thread</a:t>
+            </a:r>
+            <a:endParaRPr lang="ru-RU" dirty="0"/>
+          </a:p>
+        </p:txBody>
+      </p:sp>
+      <p:sp>
+        <p:nvSpPr>
+          <p:cNvPr id="3" name="Прямоугольник 2"/>
+          <p:cNvSpPr/>
+          <p:nvPr/>
+        </p:nvSpPr>
+        <p:spPr>
+          <a:xfrm>
+            <a:off x="0" y="2255366"/>
+            <a:ext cx="1440160" cy="504056"/>
+          </a:xfrm>
+          <a:prstGeom prst="rect">
+            <a:avLst/>
+          </a:prstGeom>
+        </p:spPr>
+        <p:style>
+          <a:lnRef idx="2">
+            <a:schemeClr val="accent1">
+              <a:shade val="50000"/>
+            </a:schemeClr>
+          </a:lnRef>
+          <a:fillRef idx="1">
+            <a:schemeClr val="accent1"/>
+          </a:fillRef>
+          <a:effectRef idx="0">
+            <a:schemeClr val="accent1"/>
+          </a:effectRef>
+          <a:fontRef idx="minor">
+            <a:schemeClr val="lt1"/>
+          </a:fontRef>
+        </p:style>
+        <p:txBody>
+          <a:bodyPr rtlCol="0" anchor="ctr"/>
+          <a:lstStyle/>
+          <a:p>
+            <a:pPr algn="ctr"/>
+            <a:r>
+              <a:rPr lang="en-US" dirty="0" smtClean="0"/>
+              <a:t>particles</a:t>
+            </a:r>
+            <a:endParaRPr lang="ru-RU" dirty="0"/>
+          </a:p>
+        </p:txBody>
+      </p:sp>
+      <p:sp>
+        <p:nvSpPr>
+          <p:cNvPr id="5" name="Прямоугольник 4"/>
+          <p:cNvSpPr/>
+          <p:nvPr/>
+        </p:nvSpPr>
+        <p:spPr>
+          <a:xfrm>
+            <a:off x="0" y="2758600"/>
+            <a:ext cx="1440160" cy="504056"/>
+          </a:xfrm>
+          <a:prstGeom prst="rect">
+            <a:avLst/>
+          </a:prstGeom>
+        </p:spPr>
+        <p:style>
+          <a:lnRef idx="2">
+            <a:schemeClr val="accent1">
+              <a:shade val="50000"/>
+            </a:schemeClr>
+          </a:lnRef>
+          <a:fillRef idx="1">
+            <a:schemeClr val="accent1"/>
+          </a:fillRef>
+          <a:effectRef idx="0">
+            <a:schemeClr val="accent1"/>
+          </a:effectRef>
+          <a:fontRef idx="minor">
+            <a:schemeClr val="lt1"/>
+          </a:fontRef>
+        </p:style>
+        <p:txBody>
+          <a:bodyPr rtlCol="0" anchor="ctr"/>
+          <a:lstStyle/>
+          <a:p>
+            <a:pPr algn="ctr"/>
+            <a:r>
+              <a:rPr lang="en-US" dirty="0" smtClean="0"/>
+              <a:t>borders</a:t>
+            </a:r>
+            <a:endParaRPr lang="ru-RU" dirty="0"/>
+          </a:p>
+        </p:txBody>
+      </p:sp>
+      <p:sp>
+        <p:nvSpPr>
+          <p:cNvPr id="6" name="Прямоугольник 5"/>
+          <p:cNvSpPr/>
+          <p:nvPr/>
+        </p:nvSpPr>
+        <p:spPr>
+          <a:xfrm>
+            <a:off x="0" y="3262656"/>
+            <a:ext cx="1440160" cy="504056"/>
+          </a:xfrm>
+          <a:prstGeom prst="rect">
+            <a:avLst/>
+          </a:prstGeom>
+        </p:spPr>
+        <p:style>
+          <a:lnRef idx="2">
+            <a:schemeClr val="accent1">
+              <a:shade val="50000"/>
+            </a:schemeClr>
+          </a:lnRef>
+          <a:fillRef idx="1">
+            <a:schemeClr val="accent1"/>
+          </a:fillRef>
+          <a:effectRef idx="0">
+            <a:schemeClr val="accent1"/>
+          </a:effectRef>
+          <a:fontRef idx="minor">
+            <a:schemeClr val="lt1"/>
+          </a:fontRef>
+        </p:style>
+        <p:txBody>
+          <a:bodyPr rtlCol="0" anchor="ctr"/>
+          <a:lstStyle/>
+          <a:p>
+            <a:pPr algn="ctr"/>
+            <a:r>
+              <a:rPr lang="en-US" dirty="0" smtClean="0"/>
+              <a:t>others</a:t>
+            </a:r>
+            <a:endParaRPr lang="ru-RU" dirty="0"/>
+          </a:p>
+        </p:txBody>
+      </p:sp>
+      <p:sp>
+        <p:nvSpPr>
+          <p:cNvPr id="8" name="Прямоугольник 7"/>
+          <p:cNvSpPr/>
+          <p:nvPr/>
+        </p:nvSpPr>
+        <p:spPr>
+          <a:xfrm>
+            <a:off x="8432" y="1499282"/>
+            <a:ext cx="1440160" cy="504056"/>
+          </a:xfrm>
+          <a:prstGeom prst="rect">
+            <a:avLst/>
+          </a:prstGeom>
+        </p:spPr>
+        <p:style>
+          <a:lnRef idx="2">
+            <a:schemeClr val="accent1">
+              <a:shade val="50000"/>
+            </a:schemeClr>
+          </a:lnRef>
+          <a:fillRef idx="1">
+            <a:schemeClr val="accent1"/>
+          </a:fillRef>
+          <a:effectRef idx="0">
+            <a:schemeClr val="accent1"/>
+          </a:effectRef>
+          <a:fontRef idx="minor">
+            <a:schemeClr val="lt1"/>
+          </a:fontRef>
+        </p:style>
+        <p:txBody>
+          <a:bodyPr rtlCol="0" anchor="ctr"/>
+          <a:lstStyle/>
+          <a:p>
+            <a:pPr algn="ctr"/>
+            <a:r>
+              <a:rPr lang="en-US" dirty="0" smtClean="0"/>
+              <a:t>world</a:t>
+            </a:r>
+            <a:endParaRPr lang="ru-RU" dirty="0"/>
+          </a:p>
+        </p:txBody>
+      </p:sp>
+      <p:sp>
+        <p:nvSpPr>
+          <p:cNvPr id="10" name="Прямоугольник 9"/>
+          <p:cNvSpPr/>
+          <p:nvPr/>
+        </p:nvSpPr>
+        <p:spPr>
+          <a:xfrm>
+            <a:off x="7276995" y="1298811"/>
+            <a:ext cx="1440160" cy="504056"/>
+          </a:xfrm>
+          <a:prstGeom prst="rect">
+            <a:avLst/>
+          </a:prstGeom>
+        </p:spPr>
+        <p:style>
+          <a:lnRef idx="2">
+            <a:schemeClr val="accent2">
+              <a:shade val="50000"/>
+            </a:schemeClr>
+          </a:lnRef>
+          <a:fillRef idx="1">
+            <a:schemeClr val="accent2"/>
+          </a:fillRef>
+          <a:effectRef idx="0">
+            <a:schemeClr val="accent2"/>
+          </a:effectRef>
+          <a:fontRef idx="minor">
+            <a:schemeClr val="lt1"/>
+          </a:fontRef>
+        </p:style>
+        <p:txBody>
+          <a:bodyPr rtlCol="0" anchor="ctr"/>
+          <a:lstStyle/>
+          <a:p>
+            <a:pPr algn="ctr"/>
+            <a:r>
+              <a:rPr lang="en-US" dirty="0" smtClean="0"/>
+              <a:t>actions</a:t>
+            </a:r>
+            <a:endParaRPr lang="ru-RU" dirty="0"/>
+          </a:p>
+        </p:txBody>
+      </p:sp>
+      <p:sp>
+        <p:nvSpPr>
+          <p:cNvPr id="11" name="TextBox 10"/>
+          <p:cNvSpPr txBox="1"/>
+          <p:nvPr/>
+        </p:nvSpPr>
+        <p:spPr>
+          <a:xfrm>
+            <a:off x="1448592" y="3869463"/>
+            <a:ext cx="4680520" cy="738664"/>
+          </a:xfrm>
+          <a:prstGeom prst="rect">
+            <a:avLst/>
+          </a:prstGeom>
+        </p:spPr>
+        <p:style>
+          <a:lnRef idx="2">
+            <a:schemeClr val="accent2"/>
+          </a:lnRef>
+          <a:fillRef idx="1">
+            <a:schemeClr val="lt1"/>
+          </a:fillRef>
+          <a:effectRef idx="0">
+            <a:schemeClr val="accent2"/>
+          </a:effectRef>
+          <a:fontRef idx="minor">
+            <a:schemeClr val="dk1"/>
+          </a:fontRef>
+        </p:style>
+        <p:txBody>
+          <a:bodyPr wrap="square" rtlCol="0">
+            <a:spAutoFit/>
+          </a:bodyPr>
+          <a:lstStyle/>
+          <a:p>
+            <a:r>
+              <a:rPr lang="en-US" sz="1400" dirty="0"/>
+              <a:t>if (!</a:t>
+            </a:r>
+            <a:r>
+              <a:rPr lang="en-US" sz="1400" dirty="0" err="1"/>
+              <a:t>this.actions.isEmpty</a:t>
+            </a:r>
+            <a:r>
+              <a:rPr lang="en-US" sz="1400" dirty="0"/>
+              <a:t>()) {</a:t>
+            </a:r>
+          </a:p>
+          <a:p>
+            <a:r>
+              <a:rPr lang="en-US" sz="1400" dirty="0"/>
+              <a:t>                    </a:t>
+            </a:r>
+            <a:r>
+              <a:rPr lang="en-US" sz="1400" dirty="0" err="1"/>
+              <a:t>this.actions.remove</a:t>
+            </a:r>
+            <a:r>
+              <a:rPr lang="en-US" sz="1400" dirty="0"/>
+              <a:t>(0).</a:t>
+            </a:r>
+            <a:r>
+              <a:rPr lang="en-US" sz="1400" dirty="0" err="1"/>
+              <a:t>doSomethingOnStep</a:t>
+            </a:r>
+            <a:r>
+              <a:rPr lang="en-US" sz="1400" dirty="0"/>
+              <a:t>(this);</a:t>
+            </a:r>
+          </a:p>
+          <a:p>
+            <a:r>
+              <a:rPr lang="en-US" sz="1400" dirty="0"/>
+              <a:t>                }</a:t>
+            </a:r>
+            <a:endParaRPr lang="ru-RU" sz="1400" dirty="0"/>
+          </a:p>
+        </p:txBody>
+      </p:sp>
+      <p:cxnSp>
+        <p:nvCxnSpPr>
+          <p:cNvPr id="13" name="Скругленная соединительная линия 12"/>
+          <p:cNvCxnSpPr>
+            <a:stCxn id="11" idx="2"/>
+            <a:endCxn id="11" idx="0"/>
+          </p:cNvCxnSpPr>
+          <p:nvPr/>
+        </p:nvCxnSpPr>
+        <p:spPr>
+          <a:xfrm rot="5400000" flipH="1">
+            <a:off x="3419520" y="4238795"/>
+            <a:ext cx="738664" cy="12700"/>
+          </a:xfrm>
+          <a:prstGeom prst="curvedConnector5">
+            <a:avLst>
+              <a:gd name="adj1" fmla="val -73109"/>
+              <a:gd name="adj2" fmla="val 21114197"/>
+              <a:gd name="adj3" fmla="val 157859"/>
+            </a:avLst>
+          </a:prstGeom>
+          <a:ln>
+            <a:tailEnd type="triangle"/>
+          </a:ln>
+        </p:spPr>
+        <p:style>
+          <a:lnRef idx="3">
+            <a:schemeClr val="accent1"/>
+          </a:lnRef>
+          <a:fillRef idx="0">
+            <a:schemeClr val="accent1"/>
+          </a:fillRef>
+          <a:effectRef idx="2">
+            <a:schemeClr val="accent1"/>
+          </a:effectRef>
+          <a:fontRef idx="minor">
+            <a:schemeClr val="tx1"/>
+          </a:fontRef>
+        </p:style>
+      </p:cxnSp>
+      <p:sp>
+        <p:nvSpPr>
+          <p:cNvPr id="61" name="Прямоугольник 60"/>
+          <p:cNvSpPr/>
+          <p:nvPr/>
+        </p:nvSpPr>
+        <p:spPr>
+          <a:xfrm>
+            <a:off x="6188269" y="2020401"/>
+            <a:ext cx="2219914" cy="2880320"/>
+          </a:xfrm>
+          <a:prstGeom prst="rect">
+            <a:avLst/>
+          </a:prstGeom>
+        </p:spPr>
+        <p:style>
+          <a:lnRef idx="2">
+            <a:schemeClr val="accent1"/>
+          </a:lnRef>
+          <a:fillRef idx="1">
+            <a:schemeClr val="lt1"/>
+          </a:fillRef>
+          <a:effectRef idx="0">
+            <a:schemeClr val="accent1"/>
+          </a:effectRef>
+          <a:fontRef idx="minor">
+            <a:schemeClr val="dk1"/>
+          </a:fontRef>
+        </p:style>
+        <p:txBody>
+          <a:bodyPr rtlCol="0" anchor="ctr"/>
+          <a:lstStyle/>
+          <a:p>
+            <a:pPr algn="ctr"/>
+            <a:endParaRPr lang="ru-RU" sz="1400"/>
+          </a:p>
+        </p:txBody>
+      </p:sp>
+      <p:cxnSp>
+        <p:nvCxnSpPr>
+          <p:cNvPr id="24" name="Скругленная соединительная линия 23"/>
+          <p:cNvCxnSpPr>
+            <a:stCxn id="4" idx="2"/>
+            <a:endCxn id="11" idx="0"/>
+          </p:cNvCxnSpPr>
+          <p:nvPr/>
+        </p:nvCxnSpPr>
+        <p:spPr>
+          <a:xfrm rot="16200000" flipH="1">
+            <a:off x="2331500" y="2412110"/>
+            <a:ext cx="2262169" cy="652535"/>
+          </a:xfrm>
+          <a:prstGeom prst="curvedConnector3">
+            <a:avLst>
+              <a:gd name="adj1" fmla="val 50000"/>
+            </a:avLst>
+          </a:prstGeom>
+          <a:ln>
+            <a:tailEnd type="triangle"/>
+          </a:ln>
+        </p:spPr>
+        <p:style>
+          <a:lnRef idx="3">
+            <a:schemeClr val="accent1"/>
+          </a:lnRef>
+          <a:fillRef idx="0">
+            <a:schemeClr val="accent1"/>
+          </a:fillRef>
+          <a:effectRef idx="2">
+            <a:schemeClr val="accent1"/>
+          </a:effectRef>
+          <a:fontRef idx="minor">
+            <a:schemeClr val="tx1"/>
+          </a:fontRef>
+        </p:style>
+      </p:cxnSp>
+      <p:sp>
+        <p:nvSpPr>
+          <p:cNvPr id="33" name="Прямоугольник 32"/>
+          <p:cNvSpPr/>
+          <p:nvPr/>
+        </p:nvSpPr>
+        <p:spPr>
+          <a:xfrm>
+            <a:off x="6855504" y="2252408"/>
+            <a:ext cx="1124227" cy="504056"/>
+          </a:xfrm>
+          <a:prstGeom prst="rect">
+            <a:avLst/>
+          </a:prstGeom>
+        </p:spPr>
+        <p:style>
+          <a:lnRef idx="2">
+            <a:schemeClr val="accent2">
+              <a:shade val="50000"/>
+            </a:schemeClr>
+          </a:lnRef>
+          <a:fillRef idx="1">
+            <a:schemeClr val="accent2"/>
+          </a:fillRef>
+          <a:effectRef idx="0">
+            <a:schemeClr val="accent2"/>
+          </a:effectRef>
+          <a:fontRef idx="minor">
+            <a:schemeClr val="lt1"/>
+          </a:fontRef>
+        </p:style>
+        <p:txBody>
+          <a:bodyPr rtlCol="0" anchor="ctr"/>
+          <a:lstStyle/>
+          <a:p>
+            <a:pPr algn="ctr"/>
+            <a:r>
+              <a:rPr lang="en-US" sz="1400" dirty="0" err="1" smtClean="0"/>
+              <a:t>LevelScreen</a:t>
+            </a:r>
+            <a:endParaRPr lang="ru-RU" sz="1400" dirty="0"/>
+          </a:p>
+        </p:txBody>
+      </p:sp>
+      <p:sp>
+        <p:nvSpPr>
+          <p:cNvPr id="44" name="Rectangle 3"/>
+          <p:cNvSpPr>
+            <a:spLocks noChangeArrowheads="1"/>
+          </p:cNvSpPr>
+          <p:nvPr/>
+        </p:nvSpPr>
+        <p:spPr bwMode="auto">
+          <a:xfrm>
+            <a:off x="6194619" y="3107412"/>
+            <a:ext cx="2162279" cy="261610"/>
+          </a:xfrm>
+          <a:prstGeom prst="rect">
+            <a:avLst/>
+          </a:prstGeom>
+          <a:solidFill>
+            <a:srgbClr val="FFFFFF"/>
+          </a:solidFill>
+          <a:ln>
+            <a:noFill/>
+          </a:ln>
+          <a:effectLst/>
+          <a:extLst>
+            <a:ext uri="{91240B29-F687-4F45-9708-019B960494DF}">
+              <a14:hiddenLine xmlns:a14="http://schemas.microsoft.com/office/drawing/2010/main" w="9525">
+                <a:solidFill>
+                  <a:schemeClr val="tx1"/>
+                </a:solidFill>
+                <a:miter lim="800000"/>
+                <a:headEnd/>
+                <a:tailEnd/>
+              </a14:hiddenLine>
+            </a:ext>
+            <a:ext uri="{AF507438-7753-43E0-B8FC-AC1667EBCBE1}">
+              <a14:hiddenEffects xmlns:a14="http://schemas.microsoft.com/office/drawing/2010/main">
+                <a:effectLst>
+                  <a:outerShdw dist="35921" dir="2700000" algn="ctr" rotWithShape="0">
+                    <a:schemeClr val="bg2"/>
+                  </a:outerShdw>
+                </a:effectLst>
+              </a14:hiddenEffects>
+            </a:ext>
+          </a:extLst>
+        </p:spPr>
+        <p:txBody>
+          <a:bodyPr vert="horz" wrap="square" lIns="91440" tIns="45720" rIns="91440" bIns="45720" numCol="1" anchor="ctr" anchorCtr="0" compatLnSpc="1">
+            <a:prstTxWarp prst="textNoShape">
+              <a:avLst/>
+            </a:prstTxWarp>
+            <a:spAutoFit/>
+          </a:bodyPr>
+          <a:lstStyle/>
+          <a:p>
+            <a:pPr marL="0" marR="0" lvl="0" indent="0" algn="l" defTabSz="914400" rtl="0" eaLnBrk="0" fontAlgn="base" latinLnBrk="0" hangingPunct="0">
+              <a:lnSpc>
+                <a:spcPct val="100000"/>
+              </a:lnSpc>
+              <a:spcBef>
+                <a:spcPct val="0"/>
+              </a:spcBef>
+              <a:spcAft>
+                <a:spcPct val="0"/>
+              </a:spcAft>
+              <a:buClrTx/>
+              <a:buSzTx/>
+              <a:buFontTx/>
+              <a:buNone/>
+              <a:tabLst/>
+            </a:pPr>
+            <a:r>
+              <a:rPr kumimoji="0" lang="ru-RU" altLang="ru-RU" sz="1050" b="1" i="0" u="none" strike="noStrike" cap="none" normalizeH="0" baseline="0" dirty="0" err="1" smtClean="0">
+                <a:ln>
+                  <a:noFill/>
+                </a:ln>
+                <a:solidFill>
+                  <a:srgbClr val="000080"/>
+                </a:solidFill>
+                <a:effectLst/>
+                <a:latin typeface="Courier New" panose="02070309020205020404" pitchFamily="49" charset="0"/>
+                <a:cs typeface="Courier New" panose="02070309020205020404" pitchFamily="49" charset="0"/>
+              </a:rPr>
+              <a:t>this</a:t>
+            </a:r>
+            <a:r>
+              <a:rPr kumimoji="0" lang="ru-RU" altLang="ru-RU" sz="1050" b="0" i="0" u="none" strike="noStrike" cap="none" normalizeH="0" baseline="0" dirty="0" err="1" smtClean="0">
+                <a:ln>
+                  <a:noFill/>
+                </a:ln>
+                <a:solidFill>
+                  <a:srgbClr val="000000"/>
+                </a:solidFill>
+                <a:effectLst/>
+                <a:latin typeface="Courier New" panose="02070309020205020404" pitchFamily="49" charset="0"/>
+                <a:cs typeface="Courier New" panose="02070309020205020404" pitchFamily="49" charset="0"/>
+              </a:rPr>
+              <a:t>.</a:t>
+            </a:r>
+            <a:r>
+              <a:rPr kumimoji="0" lang="ru-RU" altLang="ru-RU" sz="1050" b="1" i="0" u="none" strike="noStrike" cap="none" normalizeH="0" baseline="0" dirty="0" err="1" smtClean="0">
+                <a:ln>
+                  <a:noFill/>
+                </a:ln>
+                <a:solidFill>
+                  <a:srgbClr val="660E7A"/>
+                </a:solidFill>
+                <a:effectLst/>
+                <a:latin typeface="Courier New" panose="02070309020205020404" pitchFamily="49" charset="0"/>
+                <a:cs typeface="Courier New" panose="02070309020205020404" pitchFamily="49" charset="0"/>
+              </a:rPr>
+              <a:t>level</a:t>
+            </a:r>
+            <a:r>
+              <a:rPr kumimoji="0" lang="ru-RU" altLang="ru-RU" sz="1050" b="0" i="0" u="none" strike="noStrike" cap="none" normalizeH="0" baseline="0" dirty="0" err="1" smtClean="0">
+                <a:ln>
+                  <a:noFill/>
+                </a:ln>
+                <a:solidFill>
+                  <a:srgbClr val="000000"/>
+                </a:solidFill>
+                <a:effectLst/>
+                <a:latin typeface="Courier New" panose="02070309020205020404" pitchFamily="49" charset="0"/>
+                <a:cs typeface="Courier New" panose="02070309020205020404" pitchFamily="49" charset="0"/>
+              </a:rPr>
+              <a:t>.preRender</a:t>
+            </a:r>
+            <a:r>
+              <a:rPr kumimoji="0" lang="ru-RU" altLang="ru-RU" sz="1050" b="0" i="0" u="none" strike="noStrike" cap="none" normalizeH="0" baseline="0" dirty="0" smtClean="0">
+                <a:ln>
+                  <a:noFill/>
+                </a:ln>
+                <a:solidFill>
+                  <a:srgbClr val="000000"/>
+                </a:solidFill>
+                <a:effectLst/>
+                <a:latin typeface="Courier New" panose="02070309020205020404" pitchFamily="49" charset="0"/>
+                <a:cs typeface="Courier New" panose="02070309020205020404" pitchFamily="49" charset="0"/>
+              </a:rPr>
+              <a:t>();</a:t>
+            </a:r>
+            <a:endParaRPr kumimoji="0" lang="ru-RU" altLang="ru-RU" sz="1400" b="0" i="0" u="none" strike="noStrike" cap="none" normalizeH="0" baseline="0" dirty="0" smtClean="0">
+              <a:ln>
+                <a:noFill/>
+              </a:ln>
+              <a:solidFill>
+                <a:schemeClr val="tx1"/>
+              </a:solidFill>
+              <a:effectLst/>
+              <a:latin typeface="Arial" panose="020B0604020202020204" pitchFamily="34" charset="0"/>
+            </a:endParaRPr>
+          </a:p>
+        </p:txBody>
+      </p:sp>
+      <p:sp>
+        <p:nvSpPr>
+          <p:cNvPr id="45" name="Rectangle 4"/>
+          <p:cNvSpPr>
+            <a:spLocks noChangeArrowheads="1"/>
+          </p:cNvSpPr>
+          <p:nvPr/>
+        </p:nvSpPr>
+        <p:spPr bwMode="auto">
+          <a:xfrm>
+            <a:off x="6194619" y="4127033"/>
+            <a:ext cx="2162279" cy="415498"/>
+          </a:xfrm>
+          <a:prstGeom prst="rect">
+            <a:avLst/>
+          </a:prstGeom>
+          <a:solidFill>
+            <a:srgbClr val="FFFFFF"/>
+          </a:solidFill>
+          <a:ln>
+            <a:noFill/>
+          </a:ln>
+          <a:effectLst/>
+          <a:extLst>
+            <a:ext uri="{91240B29-F687-4F45-9708-019B960494DF}">
+              <a14:hiddenLine xmlns:a14="http://schemas.microsoft.com/office/drawing/2010/main" w="9525">
+                <a:solidFill>
+                  <a:schemeClr val="tx1"/>
+                </a:solidFill>
+                <a:miter lim="800000"/>
+                <a:headEnd/>
+                <a:tailEnd/>
+              </a14:hiddenLine>
+            </a:ext>
+            <a:ext uri="{AF507438-7753-43E0-B8FC-AC1667EBCBE1}">
+              <a14:hiddenEffects xmlns:a14="http://schemas.microsoft.com/office/drawing/2010/main">
+                <a:effectLst>
+                  <a:outerShdw dist="35921" dir="2700000" algn="ctr" rotWithShape="0">
+                    <a:schemeClr val="bg2"/>
+                  </a:outerShdw>
+                </a:effectLst>
+              </a14:hiddenEffects>
+            </a:ext>
+          </a:extLst>
+        </p:spPr>
+        <p:txBody>
+          <a:bodyPr vert="horz" wrap="square" lIns="91440" tIns="45720" rIns="91440" bIns="45720" numCol="1" anchor="ctr" anchorCtr="0" compatLnSpc="1">
+            <a:prstTxWarp prst="textNoShape">
+              <a:avLst/>
+            </a:prstTxWarp>
+            <a:spAutoFit/>
+          </a:bodyPr>
+          <a:lstStyle/>
+          <a:p>
+            <a:pPr marL="0" marR="0" lvl="0" indent="0" algn="l" defTabSz="914400" rtl="0" eaLnBrk="0" fontAlgn="base" latinLnBrk="0" hangingPunct="0">
+              <a:lnSpc>
+                <a:spcPct val="100000"/>
+              </a:lnSpc>
+              <a:spcBef>
+                <a:spcPct val="0"/>
+              </a:spcBef>
+              <a:spcAft>
+                <a:spcPct val="0"/>
+              </a:spcAft>
+              <a:buClrTx/>
+              <a:buSzTx/>
+              <a:buFontTx/>
+              <a:buNone/>
+              <a:tabLst/>
+            </a:pPr>
+            <a:r>
+              <a:rPr kumimoji="0" lang="ru-RU" altLang="ru-RU" sz="1050" b="1" i="0" u="none" strike="noStrike" cap="none" normalizeH="0" baseline="0" dirty="0" err="1" smtClean="0">
+                <a:ln>
+                  <a:noFill/>
+                </a:ln>
+                <a:solidFill>
+                  <a:srgbClr val="000080"/>
+                </a:solidFill>
+                <a:effectLst/>
+                <a:latin typeface="Courier New" panose="02070309020205020404" pitchFamily="49" charset="0"/>
+                <a:cs typeface="Courier New" panose="02070309020205020404" pitchFamily="49" charset="0"/>
+              </a:rPr>
+              <a:t>this</a:t>
+            </a:r>
+            <a:r>
+              <a:rPr kumimoji="0" lang="ru-RU" altLang="ru-RU" sz="1050" b="0" i="0" u="none" strike="noStrike" cap="none" normalizeH="0" baseline="0" dirty="0" err="1" smtClean="0">
+                <a:ln>
+                  <a:noFill/>
+                </a:ln>
+                <a:solidFill>
+                  <a:srgbClr val="000000"/>
+                </a:solidFill>
+                <a:effectLst/>
+                <a:latin typeface="Courier New" panose="02070309020205020404" pitchFamily="49" charset="0"/>
+                <a:cs typeface="Courier New" panose="02070309020205020404" pitchFamily="49" charset="0"/>
+              </a:rPr>
+              <a:t>.</a:t>
+            </a:r>
+            <a:r>
+              <a:rPr kumimoji="0" lang="ru-RU" altLang="ru-RU" sz="1050" b="1" i="0" u="none" strike="noStrike" cap="none" normalizeH="0" baseline="0" dirty="0" err="1" smtClean="0">
+                <a:ln>
+                  <a:noFill/>
+                </a:ln>
+                <a:solidFill>
+                  <a:srgbClr val="660E7A"/>
+                </a:solidFill>
+                <a:effectLst/>
+                <a:latin typeface="Courier New" panose="02070309020205020404" pitchFamily="49" charset="0"/>
+                <a:cs typeface="Courier New" panose="02070309020205020404" pitchFamily="49" charset="0"/>
+              </a:rPr>
+              <a:t>level</a:t>
+            </a:r>
+            <a:r>
+              <a:rPr kumimoji="0" lang="ru-RU" altLang="ru-RU" sz="1050" b="0" i="0" u="none" strike="noStrike" cap="none" normalizeH="0" baseline="0" dirty="0" err="1" smtClean="0">
+                <a:ln>
+                  <a:noFill/>
+                </a:ln>
+                <a:solidFill>
+                  <a:srgbClr val="000000"/>
+                </a:solidFill>
+                <a:effectLst/>
+                <a:latin typeface="Courier New" panose="02070309020205020404" pitchFamily="49" charset="0"/>
+                <a:cs typeface="Courier New" panose="02070309020205020404" pitchFamily="49" charset="0"/>
+              </a:rPr>
+              <a:t>.afterRender</a:t>
+            </a:r>
+            <a:r>
+              <a:rPr kumimoji="0" lang="ru-RU" altLang="ru-RU" sz="1050" b="0" i="0" u="none" strike="noStrike" cap="none" normalizeH="0" baseline="0" dirty="0" smtClean="0">
+                <a:ln>
+                  <a:noFill/>
+                </a:ln>
+                <a:solidFill>
+                  <a:srgbClr val="000000"/>
+                </a:solidFill>
+                <a:effectLst/>
+                <a:latin typeface="Courier New" panose="02070309020205020404" pitchFamily="49" charset="0"/>
+                <a:cs typeface="Courier New" panose="02070309020205020404" pitchFamily="49" charset="0"/>
+              </a:rPr>
+              <a:t>();</a:t>
+            </a:r>
+            <a:endParaRPr kumimoji="0" lang="ru-RU" altLang="ru-RU" sz="1400" b="0" i="0" u="none" strike="noStrike" cap="none" normalizeH="0" baseline="0" dirty="0" smtClean="0">
+              <a:ln>
+                <a:noFill/>
+              </a:ln>
+              <a:solidFill>
+                <a:schemeClr val="tx1"/>
+              </a:solidFill>
+              <a:effectLst/>
+              <a:latin typeface="Arial" panose="020B0604020202020204" pitchFamily="34" charset="0"/>
+            </a:endParaRPr>
+          </a:p>
+        </p:txBody>
+      </p:sp>
+      <p:sp>
+        <p:nvSpPr>
+          <p:cNvPr id="46" name="Rectangle 5"/>
+          <p:cNvSpPr>
+            <a:spLocks noChangeArrowheads="1"/>
+          </p:cNvSpPr>
+          <p:nvPr/>
+        </p:nvSpPr>
+        <p:spPr bwMode="auto">
+          <a:xfrm>
+            <a:off x="6194619" y="3523215"/>
+            <a:ext cx="2162279" cy="415498"/>
+          </a:xfrm>
+          <a:prstGeom prst="rect">
+            <a:avLst/>
+          </a:prstGeom>
+          <a:solidFill>
+            <a:srgbClr val="FFFFFF"/>
+          </a:solidFill>
+          <a:ln>
+            <a:noFill/>
+          </a:ln>
+          <a:effectLst/>
+          <a:extLst>
+            <a:ext uri="{91240B29-F687-4F45-9708-019B960494DF}">
+              <a14:hiddenLine xmlns:a14="http://schemas.microsoft.com/office/drawing/2010/main" w="9525">
+                <a:solidFill>
+                  <a:schemeClr val="tx1"/>
+                </a:solidFill>
+                <a:miter lim="800000"/>
+                <a:headEnd/>
+                <a:tailEnd/>
+              </a14:hiddenLine>
+            </a:ext>
+            <a:ext uri="{AF507438-7753-43E0-B8FC-AC1667EBCBE1}">
+              <a14:hiddenEffects xmlns:a14="http://schemas.microsoft.com/office/drawing/2010/main">
+                <a:effectLst>
+                  <a:outerShdw dist="35921" dir="2700000" algn="ctr" rotWithShape="0">
+                    <a:schemeClr val="bg2"/>
+                  </a:outerShdw>
+                </a:effectLst>
+              </a14:hiddenEffects>
+            </a:ext>
+          </a:extLst>
+        </p:spPr>
+        <p:txBody>
+          <a:bodyPr vert="horz" wrap="square" lIns="91440" tIns="45720" rIns="91440" bIns="45720" numCol="1" anchor="ctr" anchorCtr="0" compatLnSpc="1">
+            <a:prstTxWarp prst="textNoShape">
+              <a:avLst/>
+            </a:prstTxWarp>
+            <a:spAutoFit/>
+          </a:bodyPr>
+          <a:lstStyle/>
+          <a:p>
+            <a:pPr marL="0" marR="0" lvl="0" indent="0" algn="l" defTabSz="914400" rtl="0" eaLnBrk="0" fontAlgn="base" latinLnBrk="0" hangingPunct="0">
+              <a:lnSpc>
+                <a:spcPct val="100000"/>
+              </a:lnSpc>
+              <a:spcBef>
+                <a:spcPct val="0"/>
+              </a:spcBef>
+              <a:spcAft>
+                <a:spcPct val="0"/>
+              </a:spcAft>
+              <a:buClrTx/>
+              <a:buSzTx/>
+              <a:buFontTx/>
+              <a:buNone/>
+              <a:tabLst/>
+            </a:pPr>
+            <a:r>
+              <a:rPr kumimoji="0" lang="ru-RU" altLang="ru-RU" sz="1050" b="1" i="0" u="none" strike="noStrike" cap="none" normalizeH="0" baseline="0" dirty="0" err="1" smtClean="0">
+                <a:ln>
+                  <a:noFill/>
+                </a:ln>
+                <a:solidFill>
+                  <a:srgbClr val="000080"/>
+                </a:solidFill>
+                <a:effectLst/>
+                <a:latin typeface="Courier New" panose="02070309020205020404" pitchFamily="49" charset="0"/>
+                <a:cs typeface="Courier New" panose="02070309020205020404" pitchFamily="49" charset="0"/>
+              </a:rPr>
+              <a:t>this</a:t>
+            </a:r>
+            <a:r>
+              <a:rPr kumimoji="0" lang="ru-RU" altLang="ru-RU" sz="1050" b="0" i="0" u="none" strike="noStrike" cap="none" normalizeH="0" baseline="0" dirty="0" err="1" smtClean="0">
+                <a:ln>
+                  <a:noFill/>
+                </a:ln>
+                <a:solidFill>
+                  <a:srgbClr val="000000"/>
+                </a:solidFill>
+                <a:effectLst/>
+                <a:latin typeface="Courier New" panose="02070309020205020404" pitchFamily="49" charset="0"/>
+                <a:cs typeface="Courier New" panose="02070309020205020404" pitchFamily="49" charset="0"/>
+              </a:rPr>
+              <a:t>.level.render</a:t>
+            </a:r>
+            <a:r>
+              <a:rPr kumimoji="0" lang="ru-RU" altLang="ru-RU" sz="1050" b="0" i="0" u="none" strike="noStrike" cap="none" normalizeH="0" baseline="0" dirty="0" smtClean="0">
+                <a:ln>
+                  <a:noFill/>
+                </a:ln>
+                <a:solidFill>
+                  <a:srgbClr val="000000"/>
+                </a:solidFill>
+                <a:effectLst/>
+                <a:latin typeface="Courier New" panose="02070309020205020404" pitchFamily="49" charset="0"/>
+                <a:cs typeface="Courier New" panose="02070309020205020404" pitchFamily="49" charset="0"/>
+              </a:rPr>
+              <a:t>(</a:t>
+            </a:r>
+            <a:r>
+              <a:rPr kumimoji="0" lang="ru-RU" altLang="ru-RU" sz="1050" b="0" i="0" u="none" strike="noStrike" cap="none" normalizeH="0" baseline="0" dirty="0" err="1" smtClean="0">
+                <a:ln>
+                  <a:noFill/>
+                </a:ln>
+                <a:solidFill>
+                  <a:srgbClr val="000000"/>
+                </a:solidFill>
+                <a:effectLst/>
+                <a:latin typeface="Courier New" panose="02070309020205020404" pitchFamily="49" charset="0"/>
+                <a:cs typeface="Courier New" panose="02070309020205020404" pitchFamily="49" charset="0"/>
+              </a:rPr>
+              <a:t>delta</a:t>
+            </a:r>
+            <a:r>
+              <a:rPr kumimoji="0" lang="ru-RU" altLang="ru-RU" sz="1050" b="0" i="0" u="none" strike="noStrike" cap="none" normalizeH="0" baseline="0" dirty="0" smtClean="0">
+                <a:ln>
+                  <a:noFill/>
+                </a:ln>
+                <a:solidFill>
+                  <a:srgbClr val="000000"/>
+                </a:solidFill>
+                <a:effectLst/>
+                <a:latin typeface="Courier New" panose="02070309020205020404" pitchFamily="49" charset="0"/>
+                <a:cs typeface="Courier New" panose="02070309020205020404" pitchFamily="49" charset="0"/>
+              </a:rPr>
+              <a:t>);</a:t>
+            </a:r>
+            <a:endParaRPr kumimoji="0" lang="ru-RU" altLang="ru-RU" sz="1400" b="0" i="0" u="none" strike="noStrike" cap="none" normalizeH="0" baseline="0" dirty="0" smtClean="0">
+              <a:ln>
+                <a:noFill/>
+              </a:ln>
+              <a:solidFill>
+                <a:schemeClr val="tx1"/>
+              </a:solidFill>
+              <a:effectLst/>
+              <a:latin typeface="Arial" panose="020B0604020202020204" pitchFamily="34" charset="0"/>
+            </a:endParaRPr>
+          </a:p>
+        </p:txBody>
+      </p:sp>
+      <p:cxnSp>
+        <p:nvCxnSpPr>
+          <p:cNvPr id="48" name="Скругленная соединительная линия 47"/>
+          <p:cNvCxnSpPr>
+            <a:stCxn id="44" idx="2"/>
+            <a:endCxn id="46" idx="0"/>
+          </p:cNvCxnSpPr>
+          <p:nvPr/>
+        </p:nvCxnSpPr>
+        <p:spPr>
+          <a:xfrm rot="5400000">
+            <a:off x="7198663" y="3446118"/>
+            <a:ext cx="154193" cy="12700"/>
+          </a:xfrm>
+          <a:prstGeom prst="curvedConnector3">
+            <a:avLst>
+              <a:gd name="adj1" fmla="val 50000"/>
+            </a:avLst>
+          </a:prstGeom>
+          <a:ln>
+            <a:tailEnd type="triangle"/>
+          </a:ln>
+        </p:spPr>
+        <p:style>
+          <a:lnRef idx="3">
+            <a:schemeClr val="accent1"/>
+          </a:lnRef>
+          <a:fillRef idx="0">
+            <a:schemeClr val="accent1"/>
+          </a:fillRef>
+          <a:effectRef idx="2">
+            <a:schemeClr val="accent1"/>
+          </a:effectRef>
+          <a:fontRef idx="minor">
+            <a:schemeClr val="tx1"/>
+          </a:fontRef>
+        </p:style>
+      </p:cxnSp>
+      <p:cxnSp>
+        <p:nvCxnSpPr>
+          <p:cNvPr id="49" name="Скругленная соединительная линия 48"/>
+          <p:cNvCxnSpPr>
+            <a:stCxn id="46" idx="2"/>
+            <a:endCxn id="45" idx="0"/>
+          </p:cNvCxnSpPr>
+          <p:nvPr/>
+        </p:nvCxnSpPr>
+        <p:spPr>
+          <a:xfrm rot="5400000">
+            <a:off x="7181599" y="4032873"/>
+            <a:ext cx="188320" cy="12700"/>
+          </a:xfrm>
+          <a:prstGeom prst="curvedConnector3">
+            <a:avLst>
+              <a:gd name="adj1" fmla="val 50000"/>
+            </a:avLst>
+          </a:prstGeom>
+          <a:ln>
+            <a:tailEnd type="triangle"/>
+          </a:ln>
+        </p:spPr>
+        <p:style>
+          <a:lnRef idx="3">
+            <a:schemeClr val="accent1"/>
+          </a:lnRef>
+          <a:fillRef idx="0">
+            <a:schemeClr val="accent1"/>
+          </a:fillRef>
+          <a:effectRef idx="2">
+            <a:schemeClr val="accent1"/>
+          </a:effectRef>
+          <a:fontRef idx="minor">
+            <a:schemeClr val="tx1"/>
+          </a:fontRef>
+        </p:style>
+      </p:cxnSp>
+      <p:sp>
+        <p:nvSpPr>
+          <p:cNvPr id="73" name="Прямоугольник 72"/>
+          <p:cNvSpPr/>
+          <p:nvPr/>
+        </p:nvSpPr>
+        <p:spPr>
+          <a:xfrm rot="5400000">
+            <a:off x="8574126" y="2775170"/>
+            <a:ext cx="1012082" cy="289591"/>
+          </a:xfrm>
+          <a:prstGeom prst="rect">
+            <a:avLst/>
+          </a:prstGeom>
+        </p:spPr>
+        <p:style>
+          <a:lnRef idx="2">
+            <a:schemeClr val="accent2">
+              <a:shade val="50000"/>
+            </a:schemeClr>
+          </a:lnRef>
+          <a:fillRef idx="1">
+            <a:schemeClr val="accent2"/>
+          </a:fillRef>
+          <a:effectRef idx="0">
+            <a:schemeClr val="accent2"/>
+          </a:effectRef>
+          <a:fontRef idx="minor">
+            <a:schemeClr val="lt1"/>
+          </a:fontRef>
+        </p:style>
+        <p:txBody>
+          <a:bodyPr rtlCol="0" anchor="ctr"/>
+          <a:lstStyle/>
+          <a:p>
+            <a:pPr algn="ctr"/>
+            <a:r>
+              <a:rPr lang="en-US" sz="1200" dirty="0" err="1" smtClean="0"/>
+              <a:t>GDXGameGP</a:t>
+            </a:r>
+            <a:endParaRPr lang="ru-RU" dirty="0"/>
+          </a:p>
+        </p:txBody>
+      </p:sp>
+      <p:sp>
+        <p:nvSpPr>
+          <p:cNvPr id="83" name="Прямоугольник 82"/>
+          <p:cNvSpPr/>
+          <p:nvPr/>
+        </p:nvSpPr>
+        <p:spPr>
+          <a:xfrm rot="5400000">
+            <a:off x="8230635" y="2757408"/>
+            <a:ext cx="776567" cy="289592"/>
+          </a:xfrm>
+          <a:prstGeom prst="rect">
+            <a:avLst/>
+          </a:prstGeom>
+        </p:spPr>
+        <p:style>
+          <a:lnRef idx="2">
+            <a:schemeClr val="accent2">
+              <a:shade val="50000"/>
+            </a:schemeClr>
+          </a:lnRef>
+          <a:fillRef idx="1">
+            <a:schemeClr val="accent2"/>
+          </a:fillRef>
+          <a:effectRef idx="0">
+            <a:schemeClr val="accent2"/>
+          </a:effectRef>
+          <a:fontRef idx="minor">
+            <a:schemeClr val="lt1"/>
+          </a:fontRef>
+        </p:style>
+        <p:txBody>
+          <a:bodyPr rtlCol="0" anchor="ctr"/>
+          <a:lstStyle/>
+          <a:p>
+            <a:pPr algn="ctr"/>
+            <a:r>
+              <a:rPr lang="en-US" sz="1200" dirty="0" smtClean="0"/>
+              <a:t>render()</a:t>
+            </a:r>
+            <a:endParaRPr lang="ru-RU" dirty="0"/>
+          </a:p>
+        </p:txBody>
+      </p:sp>
+      <p:cxnSp>
+        <p:nvCxnSpPr>
+          <p:cNvPr id="84" name="Скругленная соединительная линия 83"/>
+          <p:cNvCxnSpPr>
+            <a:stCxn id="83" idx="2"/>
+            <a:endCxn id="44" idx="0"/>
+          </p:cNvCxnSpPr>
+          <p:nvPr/>
+        </p:nvCxnSpPr>
+        <p:spPr>
+          <a:xfrm rot="10800000" flipV="1">
+            <a:off x="7275759" y="2902204"/>
+            <a:ext cx="1198364" cy="205207"/>
+          </a:xfrm>
+          <a:prstGeom prst="curvedConnector2">
+            <a:avLst/>
+          </a:prstGeom>
+          <a:ln>
+            <a:tailEnd type="triangle"/>
+          </a:ln>
+        </p:spPr>
+        <p:style>
+          <a:lnRef idx="3">
+            <a:schemeClr val="accent1"/>
+          </a:lnRef>
+          <a:fillRef idx="0">
+            <a:schemeClr val="accent1"/>
+          </a:fillRef>
+          <a:effectRef idx="2">
+            <a:schemeClr val="accent1"/>
+          </a:effectRef>
+          <a:fontRef idx="minor">
+            <a:schemeClr val="tx1"/>
+          </a:fontRef>
+        </p:style>
+      </p:cxnSp>
+      <p:cxnSp>
+        <p:nvCxnSpPr>
+          <p:cNvPr id="85" name="Скругленная соединительная линия 84"/>
+          <p:cNvCxnSpPr>
+            <a:stCxn id="73" idx="2"/>
+            <a:endCxn id="83" idx="0"/>
+          </p:cNvCxnSpPr>
+          <p:nvPr/>
+        </p:nvCxnSpPr>
+        <p:spPr>
+          <a:xfrm rot="10800000">
+            <a:off x="8763716" y="2902206"/>
+            <a:ext cx="171657" cy="17761"/>
+          </a:xfrm>
+          <a:prstGeom prst="curvedConnector5">
+            <a:avLst>
+              <a:gd name="adj1" fmla="val -13509"/>
+              <a:gd name="adj2" fmla="val 1233"/>
+              <a:gd name="adj3" fmla="val -33173"/>
+            </a:avLst>
+          </a:prstGeom>
+          <a:ln>
+            <a:tailEnd type="triangle"/>
+          </a:ln>
+        </p:spPr>
+        <p:style>
+          <a:lnRef idx="3">
+            <a:schemeClr val="accent1"/>
+          </a:lnRef>
+          <a:fillRef idx="0">
+            <a:schemeClr val="accent1"/>
+          </a:fillRef>
+          <a:effectRef idx="2">
+            <a:schemeClr val="accent1"/>
+          </a:effectRef>
+          <a:fontRef idx="minor">
+            <a:schemeClr val="tx1"/>
+          </a:fontRef>
+        </p:style>
+      </p:cxnSp>
+    </p:spTree>
+  </p:cSld>
+  <p:clrMapOvr>
+    <a:masterClrMapping/>
+  </p:clrMapOvr>
+  <p:transition spd="slow">
+    <p:push dir="u"/>
+  </p:transition>
+  <p:timing>
+    <p:tnLst>
+      <p:par>
+        <p:cTn id="1" dur="indefinite" restart="never" nodeType="tmRoot">
+          <p:childTnLst>
+            <p:seq concurrent="1" nextAc="seek">
+              <p:cTn id="2" dur="indefinite" nodeType="mainSeq">
+                <p:childTnLst>
+                  <p:par>
+                    <p:cTn id="3" fill="hold">
+                      <p:stCondLst>
+                        <p:cond delay="indefinite"/>
+                        <p:cond evt="onBegin" delay="0">
+                          <p:tn val="2"/>
+                        </p:cond>
+                      </p:stCondLst>
+                      <p:childTnLst>
+                        <p:par>
+                          <p:cTn id="4" fill="hold">
+                            <p:stCondLst>
+                              <p:cond delay="0"/>
+                            </p:stCondLst>
+                            <p:childTnLst>
+                              <p:par>
+                                <p:cTn id="5" presetID="15" presetClass="entr" presetSubtype="0" fill="hold" grpId="0" nodeType="withEffect">
+                                  <p:stCondLst>
+                                    <p:cond delay="0"/>
+                                  </p:stCondLst>
+                                  <p:childTnLst>
+                                    <p:set>
+                                      <p:cBhvr>
+                                        <p:cTn id="6" dur="1" fill="hold">
+                                          <p:stCondLst>
+                                            <p:cond delay="0"/>
+                                          </p:stCondLst>
+                                        </p:cTn>
+                                        <p:tgtEl>
+                                          <p:spTgt spid="4"/>
+                                        </p:tgtEl>
+                                        <p:attrNameLst>
+                                          <p:attrName>style.visibility</p:attrName>
+                                        </p:attrNameLst>
+                                      </p:cBhvr>
+                                      <p:to>
+                                        <p:strVal val="visible"/>
+                                      </p:to>
+                                    </p:set>
+                                    <p:anim calcmode="lin" valueType="num">
+                                      <p:cBhvr>
+                                        <p:cTn id="7" dur="1000" fill="hold"/>
+                                        <p:tgtEl>
+                                          <p:spTgt spid="4"/>
+                                        </p:tgtEl>
+                                        <p:attrNameLst>
+                                          <p:attrName>ppt_w</p:attrName>
+                                        </p:attrNameLst>
+                                      </p:cBhvr>
+                                      <p:tavLst>
+                                        <p:tav tm="0">
+                                          <p:val>
+                                            <p:fltVal val="0"/>
+                                          </p:val>
+                                        </p:tav>
+                                        <p:tav tm="100000">
+                                          <p:val>
+                                            <p:strVal val="#ppt_w"/>
+                                          </p:val>
+                                        </p:tav>
+                                      </p:tavLst>
+                                    </p:anim>
+                                    <p:anim calcmode="lin" valueType="num">
+                                      <p:cBhvr>
+                                        <p:cTn id="8" dur="1000" fill="hold"/>
+                                        <p:tgtEl>
+                                          <p:spTgt spid="4"/>
+                                        </p:tgtEl>
+                                        <p:attrNameLst>
+                                          <p:attrName>ppt_h</p:attrName>
+                                        </p:attrNameLst>
+                                      </p:cBhvr>
+                                      <p:tavLst>
+                                        <p:tav tm="0">
+                                          <p:val>
+                                            <p:fltVal val="0"/>
+                                          </p:val>
+                                        </p:tav>
+                                        <p:tav tm="100000">
+                                          <p:val>
+                                            <p:strVal val="#ppt_h"/>
+                                          </p:val>
+                                        </p:tav>
+                                      </p:tavLst>
+                                    </p:anim>
+                                    <p:anim calcmode="lin" valueType="num">
+                                      <p:cBhvr>
+                                        <p:cTn id="9" dur="1000" fill="hold"/>
+                                        <p:tgtEl>
+                                          <p:spTgt spid="4"/>
+                                        </p:tgtEl>
+                                        <p:attrNameLst>
+                                          <p:attrName>ppt_x</p:attrName>
+                                        </p:attrNameLst>
+                                      </p:cBhvr>
+                                      <p:tavLst>
+                                        <p:tav tm="0" fmla="#ppt_x+(cos(-2*pi*(1-$))*-#ppt_x-sin(-2*pi*(1-$))*(1-#ppt_y))*(1-$)">
+                                          <p:val>
+                                            <p:fltVal val="0"/>
+                                          </p:val>
+                                        </p:tav>
+                                        <p:tav tm="100000">
+                                          <p:val>
+                                            <p:fltVal val="1"/>
+                                          </p:val>
+                                        </p:tav>
+                                      </p:tavLst>
+                                    </p:anim>
+                                    <p:anim calcmode="lin" valueType="num">
+                                      <p:cBhvr>
+                                        <p:cTn id="10" dur="1000" fill="hold"/>
+                                        <p:tgtEl>
+                                          <p:spTgt spid="4"/>
+                                        </p:tgtEl>
+                                        <p:attrNameLst>
+                                          <p:attrName>ppt_y</p:attrName>
+                                        </p:attrNameLst>
+                                      </p:cBhvr>
+                                      <p:tavLst>
+                                        <p:tav tm="0" fmla="#ppt_y+(sin(-2*pi*(1-$))*-#ppt_x+cos(-2*pi*(1-$))*(1-#ppt_y))*(1-$)">
+                                          <p:val>
+                                            <p:fltVal val="0"/>
+                                          </p:val>
+                                        </p:tav>
+                                        <p:tav tm="100000">
+                                          <p:val>
+                                            <p:fltVal val="1"/>
+                                          </p:val>
+                                        </p:tav>
+                                      </p:tavLst>
+                                    </p:anim>
+                                  </p:childTnLst>
+                                </p:cTn>
+                              </p:par>
+                              <p:par>
+                                <p:cTn id="11" presetID="15" presetClass="entr" presetSubtype="0" fill="hold" grpId="0" nodeType="withEffect">
+                                  <p:stCondLst>
+                                    <p:cond delay="0"/>
+                                  </p:stCondLst>
+                                  <p:childTnLst>
+                                    <p:set>
+                                      <p:cBhvr>
+                                        <p:cTn id="12" dur="1" fill="hold">
+                                          <p:stCondLst>
+                                            <p:cond delay="0"/>
+                                          </p:stCondLst>
+                                        </p:cTn>
+                                        <p:tgtEl>
+                                          <p:spTgt spid="3"/>
+                                        </p:tgtEl>
+                                        <p:attrNameLst>
+                                          <p:attrName>style.visibility</p:attrName>
+                                        </p:attrNameLst>
+                                      </p:cBhvr>
+                                      <p:to>
+                                        <p:strVal val="visible"/>
+                                      </p:to>
+                                    </p:set>
+                                    <p:anim calcmode="lin" valueType="num">
+                                      <p:cBhvr>
+                                        <p:cTn id="13" dur="1000" fill="hold"/>
+                                        <p:tgtEl>
+                                          <p:spTgt spid="3"/>
+                                        </p:tgtEl>
+                                        <p:attrNameLst>
+                                          <p:attrName>ppt_w</p:attrName>
+                                        </p:attrNameLst>
+                                      </p:cBhvr>
+                                      <p:tavLst>
+                                        <p:tav tm="0">
+                                          <p:val>
+                                            <p:fltVal val="0"/>
+                                          </p:val>
+                                        </p:tav>
+                                        <p:tav tm="100000">
+                                          <p:val>
+                                            <p:strVal val="#ppt_w"/>
+                                          </p:val>
+                                        </p:tav>
+                                      </p:tavLst>
+                                    </p:anim>
+                                    <p:anim calcmode="lin" valueType="num">
+                                      <p:cBhvr>
+                                        <p:cTn id="14" dur="1000" fill="hold"/>
+                                        <p:tgtEl>
+                                          <p:spTgt spid="3"/>
+                                        </p:tgtEl>
+                                        <p:attrNameLst>
+                                          <p:attrName>ppt_h</p:attrName>
+                                        </p:attrNameLst>
+                                      </p:cBhvr>
+                                      <p:tavLst>
+                                        <p:tav tm="0">
+                                          <p:val>
+                                            <p:fltVal val="0"/>
+                                          </p:val>
+                                        </p:tav>
+                                        <p:tav tm="100000">
+                                          <p:val>
+                                            <p:strVal val="#ppt_h"/>
+                                          </p:val>
+                                        </p:tav>
+                                      </p:tavLst>
+                                    </p:anim>
+                                    <p:anim calcmode="lin" valueType="num">
+                                      <p:cBhvr>
+                                        <p:cTn id="15" dur="1000" fill="hold"/>
+                                        <p:tgtEl>
+                                          <p:spTgt spid="3"/>
+                                        </p:tgtEl>
+                                        <p:attrNameLst>
+                                          <p:attrName>ppt_x</p:attrName>
+                                        </p:attrNameLst>
+                                      </p:cBhvr>
+                                      <p:tavLst>
+                                        <p:tav tm="0" fmla="#ppt_x+(cos(-2*pi*(1-$))*-#ppt_x-sin(-2*pi*(1-$))*(1-#ppt_y))*(1-$)">
+                                          <p:val>
+                                            <p:fltVal val="0"/>
+                                          </p:val>
+                                        </p:tav>
+                                        <p:tav tm="100000">
+                                          <p:val>
+                                            <p:fltVal val="1"/>
+                                          </p:val>
+                                        </p:tav>
+                                      </p:tavLst>
+                                    </p:anim>
+                                    <p:anim calcmode="lin" valueType="num">
+                                      <p:cBhvr>
+                                        <p:cTn id="16" dur="1000" fill="hold"/>
+                                        <p:tgtEl>
+                                          <p:spTgt spid="3"/>
+                                        </p:tgtEl>
+                                        <p:attrNameLst>
+                                          <p:attrName>ppt_y</p:attrName>
+                                        </p:attrNameLst>
+                                      </p:cBhvr>
+                                      <p:tavLst>
+                                        <p:tav tm="0" fmla="#ppt_y+(sin(-2*pi*(1-$))*-#ppt_x+cos(-2*pi*(1-$))*(1-#ppt_y))*(1-$)">
+                                          <p:val>
+                                            <p:fltVal val="0"/>
+                                          </p:val>
+                                        </p:tav>
+                                        <p:tav tm="100000">
+                                          <p:val>
+                                            <p:fltVal val="1"/>
+                                          </p:val>
+                                        </p:tav>
+                                      </p:tavLst>
+                                    </p:anim>
+                                  </p:childTnLst>
+                                </p:cTn>
+                              </p:par>
+                              <p:par>
+                                <p:cTn id="17" presetID="15" presetClass="entr" presetSubtype="0" fill="hold" grpId="0" nodeType="withEffect">
+                                  <p:stCondLst>
+                                    <p:cond delay="0"/>
+                                  </p:stCondLst>
+                                  <p:childTnLst>
+                                    <p:set>
+                                      <p:cBhvr>
+                                        <p:cTn id="18" dur="1" fill="hold">
+                                          <p:stCondLst>
+                                            <p:cond delay="0"/>
+                                          </p:stCondLst>
+                                        </p:cTn>
+                                        <p:tgtEl>
+                                          <p:spTgt spid="5"/>
+                                        </p:tgtEl>
+                                        <p:attrNameLst>
+                                          <p:attrName>style.visibility</p:attrName>
+                                        </p:attrNameLst>
+                                      </p:cBhvr>
+                                      <p:to>
+                                        <p:strVal val="visible"/>
+                                      </p:to>
+                                    </p:set>
+                                    <p:anim calcmode="lin" valueType="num">
+                                      <p:cBhvr>
+                                        <p:cTn id="19" dur="1000" fill="hold"/>
+                                        <p:tgtEl>
+                                          <p:spTgt spid="5"/>
+                                        </p:tgtEl>
+                                        <p:attrNameLst>
+                                          <p:attrName>ppt_w</p:attrName>
+                                        </p:attrNameLst>
+                                      </p:cBhvr>
+                                      <p:tavLst>
+                                        <p:tav tm="0">
+                                          <p:val>
+                                            <p:fltVal val="0"/>
+                                          </p:val>
+                                        </p:tav>
+                                        <p:tav tm="100000">
+                                          <p:val>
+                                            <p:strVal val="#ppt_w"/>
+                                          </p:val>
+                                        </p:tav>
+                                      </p:tavLst>
+                                    </p:anim>
+                                    <p:anim calcmode="lin" valueType="num">
+                                      <p:cBhvr>
+                                        <p:cTn id="20" dur="1000" fill="hold"/>
+                                        <p:tgtEl>
+                                          <p:spTgt spid="5"/>
+                                        </p:tgtEl>
+                                        <p:attrNameLst>
+                                          <p:attrName>ppt_h</p:attrName>
+                                        </p:attrNameLst>
+                                      </p:cBhvr>
+                                      <p:tavLst>
+                                        <p:tav tm="0">
+                                          <p:val>
+                                            <p:fltVal val="0"/>
+                                          </p:val>
+                                        </p:tav>
+                                        <p:tav tm="100000">
+                                          <p:val>
+                                            <p:strVal val="#ppt_h"/>
+                                          </p:val>
+                                        </p:tav>
+                                      </p:tavLst>
+                                    </p:anim>
+                                    <p:anim calcmode="lin" valueType="num">
+                                      <p:cBhvr>
+                                        <p:cTn id="21" dur="1000" fill="hold"/>
+                                        <p:tgtEl>
+                                          <p:spTgt spid="5"/>
+                                        </p:tgtEl>
+                                        <p:attrNameLst>
+                                          <p:attrName>ppt_x</p:attrName>
+                                        </p:attrNameLst>
+                                      </p:cBhvr>
+                                      <p:tavLst>
+                                        <p:tav tm="0" fmla="#ppt_x+(cos(-2*pi*(1-$))*-#ppt_x-sin(-2*pi*(1-$))*(1-#ppt_y))*(1-$)">
+                                          <p:val>
+                                            <p:fltVal val="0"/>
+                                          </p:val>
+                                        </p:tav>
+                                        <p:tav tm="100000">
+                                          <p:val>
+                                            <p:fltVal val="1"/>
+                                          </p:val>
+                                        </p:tav>
+                                      </p:tavLst>
+                                    </p:anim>
+                                    <p:anim calcmode="lin" valueType="num">
+                                      <p:cBhvr>
+                                        <p:cTn id="22" dur="1000" fill="hold"/>
+                                        <p:tgtEl>
+                                          <p:spTgt spid="5"/>
+                                        </p:tgtEl>
+                                        <p:attrNameLst>
+                                          <p:attrName>ppt_y</p:attrName>
+                                        </p:attrNameLst>
+                                      </p:cBhvr>
+                                      <p:tavLst>
+                                        <p:tav tm="0" fmla="#ppt_y+(sin(-2*pi*(1-$))*-#ppt_x+cos(-2*pi*(1-$))*(1-#ppt_y))*(1-$)">
+                                          <p:val>
+                                            <p:fltVal val="0"/>
+                                          </p:val>
+                                        </p:tav>
+                                        <p:tav tm="100000">
+                                          <p:val>
+                                            <p:fltVal val="1"/>
+                                          </p:val>
+                                        </p:tav>
+                                      </p:tavLst>
+                                    </p:anim>
+                                  </p:childTnLst>
+                                </p:cTn>
+                              </p:par>
+                              <p:par>
+                                <p:cTn id="23" presetID="15" presetClass="entr" presetSubtype="0" fill="hold" grpId="0" nodeType="withEffect">
+                                  <p:stCondLst>
+                                    <p:cond delay="0"/>
+                                  </p:stCondLst>
+                                  <p:childTnLst>
+                                    <p:set>
+                                      <p:cBhvr>
+                                        <p:cTn id="24" dur="1" fill="hold">
+                                          <p:stCondLst>
+                                            <p:cond delay="0"/>
+                                          </p:stCondLst>
+                                        </p:cTn>
+                                        <p:tgtEl>
+                                          <p:spTgt spid="6"/>
+                                        </p:tgtEl>
+                                        <p:attrNameLst>
+                                          <p:attrName>style.visibility</p:attrName>
+                                        </p:attrNameLst>
+                                      </p:cBhvr>
+                                      <p:to>
+                                        <p:strVal val="visible"/>
+                                      </p:to>
+                                    </p:set>
+                                    <p:anim calcmode="lin" valueType="num">
+                                      <p:cBhvr>
+                                        <p:cTn id="25" dur="1000" fill="hold"/>
+                                        <p:tgtEl>
+                                          <p:spTgt spid="6"/>
+                                        </p:tgtEl>
+                                        <p:attrNameLst>
+                                          <p:attrName>ppt_w</p:attrName>
+                                        </p:attrNameLst>
+                                      </p:cBhvr>
+                                      <p:tavLst>
+                                        <p:tav tm="0">
+                                          <p:val>
+                                            <p:fltVal val="0"/>
+                                          </p:val>
+                                        </p:tav>
+                                        <p:tav tm="100000">
+                                          <p:val>
+                                            <p:strVal val="#ppt_w"/>
+                                          </p:val>
+                                        </p:tav>
+                                      </p:tavLst>
+                                    </p:anim>
+                                    <p:anim calcmode="lin" valueType="num">
+                                      <p:cBhvr>
+                                        <p:cTn id="26" dur="1000" fill="hold"/>
+                                        <p:tgtEl>
+                                          <p:spTgt spid="6"/>
+                                        </p:tgtEl>
+                                        <p:attrNameLst>
+                                          <p:attrName>ppt_h</p:attrName>
+                                        </p:attrNameLst>
+                                      </p:cBhvr>
+                                      <p:tavLst>
+                                        <p:tav tm="0">
+                                          <p:val>
+                                            <p:fltVal val="0"/>
+                                          </p:val>
+                                        </p:tav>
+                                        <p:tav tm="100000">
+                                          <p:val>
+                                            <p:strVal val="#ppt_h"/>
+                                          </p:val>
+                                        </p:tav>
+                                      </p:tavLst>
+                                    </p:anim>
+                                    <p:anim calcmode="lin" valueType="num">
+                                      <p:cBhvr>
+                                        <p:cTn id="27" dur="1000" fill="hold"/>
+                                        <p:tgtEl>
+                                          <p:spTgt spid="6"/>
+                                        </p:tgtEl>
+                                        <p:attrNameLst>
+                                          <p:attrName>ppt_x</p:attrName>
+                                        </p:attrNameLst>
+                                      </p:cBhvr>
+                                      <p:tavLst>
+                                        <p:tav tm="0" fmla="#ppt_x+(cos(-2*pi*(1-$))*-#ppt_x-sin(-2*pi*(1-$))*(1-#ppt_y))*(1-$)">
+                                          <p:val>
+                                            <p:fltVal val="0"/>
+                                          </p:val>
+                                        </p:tav>
+                                        <p:tav tm="100000">
+                                          <p:val>
+                                            <p:fltVal val="1"/>
+                                          </p:val>
+                                        </p:tav>
+                                      </p:tavLst>
+                                    </p:anim>
+                                    <p:anim calcmode="lin" valueType="num">
+                                      <p:cBhvr>
+                                        <p:cTn id="28" dur="1000" fill="hold"/>
+                                        <p:tgtEl>
+                                          <p:spTgt spid="6"/>
+                                        </p:tgtEl>
+                                        <p:attrNameLst>
+                                          <p:attrName>ppt_y</p:attrName>
+                                        </p:attrNameLst>
+                                      </p:cBhvr>
+                                      <p:tavLst>
+                                        <p:tav tm="0" fmla="#ppt_y+(sin(-2*pi*(1-$))*-#ppt_x+cos(-2*pi*(1-$))*(1-#ppt_y))*(1-$)">
+                                          <p:val>
+                                            <p:fltVal val="0"/>
+                                          </p:val>
+                                        </p:tav>
+                                        <p:tav tm="100000">
+                                          <p:val>
+                                            <p:fltVal val="1"/>
+                                          </p:val>
+                                        </p:tav>
+                                      </p:tavLst>
+                                    </p:anim>
+                                  </p:childTnLst>
+                                </p:cTn>
+                              </p:par>
+                              <p:par>
+                                <p:cTn id="29" presetID="15" presetClass="entr" presetSubtype="0" fill="hold" grpId="0" nodeType="withEffect">
+                                  <p:stCondLst>
+                                    <p:cond delay="0"/>
+                                  </p:stCondLst>
+                                  <p:childTnLst>
+                                    <p:set>
+                                      <p:cBhvr>
+                                        <p:cTn id="30" dur="1" fill="hold">
+                                          <p:stCondLst>
+                                            <p:cond delay="0"/>
+                                          </p:stCondLst>
+                                        </p:cTn>
+                                        <p:tgtEl>
+                                          <p:spTgt spid="8"/>
+                                        </p:tgtEl>
+                                        <p:attrNameLst>
+                                          <p:attrName>style.visibility</p:attrName>
+                                        </p:attrNameLst>
+                                      </p:cBhvr>
+                                      <p:to>
+                                        <p:strVal val="visible"/>
+                                      </p:to>
+                                    </p:set>
+                                    <p:anim calcmode="lin" valueType="num">
+                                      <p:cBhvr>
+                                        <p:cTn id="31" dur="1000" fill="hold"/>
+                                        <p:tgtEl>
+                                          <p:spTgt spid="8"/>
+                                        </p:tgtEl>
+                                        <p:attrNameLst>
+                                          <p:attrName>ppt_w</p:attrName>
+                                        </p:attrNameLst>
+                                      </p:cBhvr>
+                                      <p:tavLst>
+                                        <p:tav tm="0">
+                                          <p:val>
+                                            <p:fltVal val="0"/>
+                                          </p:val>
+                                        </p:tav>
+                                        <p:tav tm="100000">
+                                          <p:val>
+                                            <p:strVal val="#ppt_w"/>
+                                          </p:val>
+                                        </p:tav>
+                                      </p:tavLst>
+                                    </p:anim>
+                                    <p:anim calcmode="lin" valueType="num">
+                                      <p:cBhvr>
+                                        <p:cTn id="32" dur="1000" fill="hold"/>
+                                        <p:tgtEl>
+                                          <p:spTgt spid="8"/>
+                                        </p:tgtEl>
+                                        <p:attrNameLst>
+                                          <p:attrName>ppt_h</p:attrName>
+                                        </p:attrNameLst>
+                                      </p:cBhvr>
+                                      <p:tavLst>
+                                        <p:tav tm="0">
+                                          <p:val>
+                                            <p:fltVal val="0"/>
+                                          </p:val>
+                                        </p:tav>
+                                        <p:tav tm="100000">
+                                          <p:val>
+                                            <p:strVal val="#ppt_h"/>
+                                          </p:val>
+                                        </p:tav>
+                                      </p:tavLst>
+                                    </p:anim>
+                                    <p:anim calcmode="lin" valueType="num">
+                                      <p:cBhvr>
+                                        <p:cTn id="33" dur="1000" fill="hold"/>
+                                        <p:tgtEl>
+                                          <p:spTgt spid="8"/>
+                                        </p:tgtEl>
+                                        <p:attrNameLst>
+                                          <p:attrName>ppt_x</p:attrName>
+                                        </p:attrNameLst>
+                                      </p:cBhvr>
+                                      <p:tavLst>
+                                        <p:tav tm="0" fmla="#ppt_x+(cos(-2*pi*(1-$))*-#ppt_x-sin(-2*pi*(1-$))*(1-#ppt_y))*(1-$)">
+                                          <p:val>
+                                            <p:fltVal val="0"/>
+                                          </p:val>
+                                        </p:tav>
+                                        <p:tav tm="100000">
+                                          <p:val>
+                                            <p:fltVal val="1"/>
+                                          </p:val>
+                                        </p:tav>
+                                      </p:tavLst>
+                                    </p:anim>
+                                    <p:anim calcmode="lin" valueType="num">
+                                      <p:cBhvr>
+                                        <p:cTn id="34" dur="1000" fill="hold"/>
+                                        <p:tgtEl>
+                                          <p:spTgt spid="8"/>
+                                        </p:tgtEl>
+                                        <p:attrNameLst>
+                                          <p:attrName>ppt_y</p:attrName>
+                                        </p:attrNameLst>
+                                      </p:cBhvr>
+                                      <p:tavLst>
+                                        <p:tav tm="0" fmla="#ppt_y+(sin(-2*pi*(1-$))*-#ppt_x+cos(-2*pi*(1-$))*(1-#ppt_y))*(1-$)">
+                                          <p:val>
+                                            <p:fltVal val="0"/>
+                                          </p:val>
+                                        </p:tav>
+                                        <p:tav tm="100000">
+                                          <p:val>
+                                            <p:fltVal val="1"/>
+                                          </p:val>
+                                        </p:tav>
+                                      </p:tavLst>
+                                    </p:anim>
+                                  </p:childTnLst>
+                                </p:cTn>
+                              </p:par>
+                              <p:par>
+                                <p:cTn id="35" presetID="15" presetClass="entr" presetSubtype="0" fill="hold" grpId="0" nodeType="withEffect">
+                                  <p:stCondLst>
+                                    <p:cond delay="0"/>
+                                  </p:stCondLst>
+                                  <p:childTnLst>
+                                    <p:set>
+                                      <p:cBhvr>
+                                        <p:cTn id="36" dur="1" fill="hold">
+                                          <p:stCondLst>
+                                            <p:cond delay="0"/>
+                                          </p:stCondLst>
+                                        </p:cTn>
+                                        <p:tgtEl>
+                                          <p:spTgt spid="10"/>
+                                        </p:tgtEl>
+                                        <p:attrNameLst>
+                                          <p:attrName>style.visibility</p:attrName>
+                                        </p:attrNameLst>
+                                      </p:cBhvr>
+                                      <p:to>
+                                        <p:strVal val="visible"/>
+                                      </p:to>
+                                    </p:set>
+                                    <p:anim calcmode="lin" valueType="num">
+                                      <p:cBhvr>
+                                        <p:cTn id="37" dur="1000" fill="hold"/>
+                                        <p:tgtEl>
+                                          <p:spTgt spid="10"/>
+                                        </p:tgtEl>
+                                        <p:attrNameLst>
+                                          <p:attrName>ppt_w</p:attrName>
+                                        </p:attrNameLst>
+                                      </p:cBhvr>
+                                      <p:tavLst>
+                                        <p:tav tm="0">
+                                          <p:val>
+                                            <p:fltVal val="0"/>
+                                          </p:val>
+                                        </p:tav>
+                                        <p:tav tm="100000">
+                                          <p:val>
+                                            <p:strVal val="#ppt_w"/>
+                                          </p:val>
+                                        </p:tav>
+                                      </p:tavLst>
+                                    </p:anim>
+                                    <p:anim calcmode="lin" valueType="num">
+                                      <p:cBhvr>
+                                        <p:cTn id="38" dur="1000" fill="hold"/>
+                                        <p:tgtEl>
+                                          <p:spTgt spid="10"/>
+                                        </p:tgtEl>
+                                        <p:attrNameLst>
+                                          <p:attrName>ppt_h</p:attrName>
+                                        </p:attrNameLst>
+                                      </p:cBhvr>
+                                      <p:tavLst>
+                                        <p:tav tm="0">
+                                          <p:val>
+                                            <p:fltVal val="0"/>
+                                          </p:val>
+                                        </p:tav>
+                                        <p:tav tm="100000">
+                                          <p:val>
+                                            <p:strVal val="#ppt_h"/>
+                                          </p:val>
+                                        </p:tav>
+                                      </p:tavLst>
+                                    </p:anim>
+                                    <p:anim calcmode="lin" valueType="num">
+                                      <p:cBhvr>
+                                        <p:cTn id="39" dur="1000" fill="hold"/>
+                                        <p:tgtEl>
+                                          <p:spTgt spid="10"/>
+                                        </p:tgtEl>
+                                        <p:attrNameLst>
+                                          <p:attrName>ppt_x</p:attrName>
+                                        </p:attrNameLst>
+                                      </p:cBhvr>
+                                      <p:tavLst>
+                                        <p:tav tm="0" fmla="#ppt_x+(cos(-2*pi*(1-$))*-#ppt_x-sin(-2*pi*(1-$))*(1-#ppt_y))*(1-$)">
+                                          <p:val>
+                                            <p:fltVal val="0"/>
+                                          </p:val>
+                                        </p:tav>
+                                        <p:tav tm="100000">
+                                          <p:val>
+                                            <p:fltVal val="1"/>
+                                          </p:val>
+                                        </p:tav>
+                                      </p:tavLst>
+                                    </p:anim>
+                                    <p:anim calcmode="lin" valueType="num">
+                                      <p:cBhvr>
+                                        <p:cTn id="40" dur="1000" fill="hold"/>
+                                        <p:tgtEl>
+                                          <p:spTgt spid="10"/>
+                                        </p:tgtEl>
+                                        <p:attrNameLst>
+                                          <p:attrName>ppt_y</p:attrName>
+                                        </p:attrNameLst>
+                                      </p:cBhvr>
+                                      <p:tavLst>
+                                        <p:tav tm="0" fmla="#ppt_y+(sin(-2*pi*(1-$))*-#ppt_x+cos(-2*pi*(1-$))*(1-#ppt_y))*(1-$)">
+                                          <p:val>
+                                            <p:fltVal val="0"/>
+                                          </p:val>
+                                        </p:tav>
+                                        <p:tav tm="100000">
+                                          <p:val>
+                                            <p:fltVal val="1"/>
+                                          </p:val>
+                                        </p:tav>
+                                      </p:tavLst>
+                                    </p:anim>
+                                  </p:childTnLst>
+                                </p:cTn>
+                              </p:par>
+                              <p:par>
+                                <p:cTn id="41" presetID="15" presetClass="entr" presetSubtype="0" fill="hold" grpId="0" nodeType="withEffect">
+                                  <p:stCondLst>
+                                    <p:cond delay="0"/>
+                                  </p:stCondLst>
+                                  <p:childTnLst>
+                                    <p:set>
+                                      <p:cBhvr>
+                                        <p:cTn id="42" dur="1" fill="hold">
+                                          <p:stCondLst>
+                                            <p:cond delay="0"/>
+                                          </p:stCondLst>
+                                        </p:cTn>
+                                        <p:tgtEl>
+                                          <p:spTgt spid="11"/>
+                                        </p:tgtEl>
+                                        <p:attrNameLst>
+                                          <p:attrName>style.visibility</p:attrName>
+                                        </p:attrNameLst>
+                                      </p:cBhvr>
+                                      <p:to>
+                                        <p:strVal val="visible"/>
+                                      </p:to>
+                                    </p:set>
+                                    <p:anim calcmode="lin" valueType="num">
+                                      <p:cBhvr>
+                                        <p:cTn id="43" dur="1000" fill="hold"/>
+                                        <p:tgtEl>
+                                          <p:spTgt spid="11"/>
+                                        </p:tgtEl>
+                                        <p:attrNameLst>
+                                          <p:attrName>ppt_w</p:attrName>
+                                        </p:attrNameLst>
+                                      </p:cBhvr>
+                                      <p:tavLst>
+                                        <p:tav tm="0">
+                                          <p:val>
+                                            <p:fltVal val="0"/>
+                                          </p:val>
+                                        </p:tav>
+                                        <p:tav tm="100000">
+                                          <p:val>
+                                            <p:strVal val="#ppt_w"/>
+                                          </p:val>
+                                        </p:tav>
+                                      </p:tavLst>
+                                    </p:anim>
+                                    <p:anim calcmode="lin" valueType="num">
+                                      <p:cBhvr>
+                                        <p:cTn id="44" dur="1000" fill="hold"/>
+                                        <p:tgtEl>
+                                          <p:spTgt spid="11"/>
+                                        </p:tgtEl>
+                                        <p:attrNameLst>
+                                          <p:attrName>ppt_h</p:attrName>
+                                        </p:attrNameLst>
+                                      </p:cBhvr>
+                                      <p:tavLst>
+                                        <p:tav tm="0">
+                                          <p:val>
+                                            <p:fltVal val="0"/>
+                                          </p:val>
+                                        </p:tav>
+                                        <p:tav tm="100000">
+                                          <p:val>
+                                            <p:strVal val="#ppt_h"/>
+                                          </p:val>
+                                        </p:tav>
+                                      </p:tavLst>
+                                    </p:anim>
+                                    <p:anim calcmode="lin" valueType="num">
+                                      <p:cBhvr>
+                                        <p:cTn id="45" dur="1000" fill="hold"/>
+                                        <p:tgtEl>
+                                          <p:spTgt spid="11"/>
+                                        </p:tgtEl>
+                                        <p:attrNameLst>
+                                          <p:attrName>ppt_x</p:attrName>
+                                        </p:attrNameLst>
+                                      </p:cBhvr>
+                                      <p:tavLst>
+                                        <p:tav tm="0" fmla="#ppt_x+(cos(-2*pi*(1-$))*-#ppt_x-sin(-2*pi*(1-$))*(1-#ppt_y))*(1-$)">
+                                          <p:val>
+                                            <p:fltVal val="0"/>
+                                          </p:val>
+                                        </p:tav>
+                                        <p:tav tm="100000">
+                                          <p:val>
+                                            <p:fltVal val="1"/>
+                                          </p:val>
+                                        </p:tav>
+                                      </p:tavLst>
+                                    </p:anim>
+                                    <p:anim calcmode="lin" valueType="num">
+                                      <p:cBhvr>
+                                        <p:cTn id="46" dur="1000" fill="hold"/>
+                                        <p:tgtEl>
+                                          <p:spTgt spid="11"/>
+                                        </p:tgtEl>
+                                        <p:attrNameLst>
+                                          <p:attrName>ppt_y</p:attrName>
+                                        </p:attrNameLst>
+                                      </p:cBhvr>
+                                      <p:tavLst>
+                                        <p:tav tm="0" fmla="#ppt_y+(sin(-2*pi*(1-$))*-#ppt_x+cos(-2*pi*(1-$))*(1-#ppt_y))*(1-$)">
+                                          <p:val>
+                                            <p:fltVal val="0"/>
+                                          </p:val>
+                                        </p:tav>
+                                        <p:tav tm="100000">
+                                          <p:val>
+                                            <p:fltVal val="1"/>
+                                          </p:val>
+                                        </p:tav>
+                                      </p:tavLst>
+                                    </p:anim>
+                                  </p:childTnLst>
+                                </p:cTn>
+                              </p:par>
+                              <p:par>
+                                <p:cTn id="47" presetID="15" presetClass="entr" presetSubtype="0" fill="hold" nodeType="withEffect">
+                                  <p:stCondLst>
+                                    <p:cond delay="0"/>
+                                  </p:stCondLst>
+                                  <p:childTnLst>
+                                    <p:set>
+                                      <p:cBhvr>
+                                        <p:cTn id="48" dur="1" fill="hold">
+                                          <p:stCondLst>
+                                            <p:cond delay="0"/>
+                                          </p:stCondLst>
+                                        </p:cTn>
+                                        <p:tgtEl>
+                                          <p:spTgt spid="13"/>
+                                        </p:tgtEl>
+                                        <p:attrNameLst>
+                                          <p:attrName>style.visibility</p:attrName>
+                                        </p:attrNameLst>
+                                      </p:cBhvr>
+                                      <p:to>
+                                        <p:strVal val="visible"/>
+                                      </p:to>
+                                    </p:set>
+                                    <p:anim calcmode="lin" valueType="num">
+                                      <p:cBhvr>
+                                        <p:cTn id="49" dur="1000" fill="hold"/>
+                                        <p:tgtEl>
+                                          <p:spTgt spid="13"/>
+                                        </p:tgtEl>
+                                        <p:attrNameLst>
+                                          <p:attrName>ppt_w</p:attrName>
+                                        </p:attrNameLst>
+                                      </p:cBhvr>
+                                      <p:tavLst>
+                                        <p:tav tm="0">
+                                          <p:val>
+                                            <p:fltVal val="0"/>
+                                          </p:val>
+                                        </p:tav>
+                                        <p:tav tm="100000">
+                                          <p:val>
+                                            <p:strVal val="#ppt_w"/>
+                                          </p:val>
+                                        </p:tav>
+                                      </p:tavLst>
+                                    </p:anim>
+                                    <p:anim calcmode="lin" valueType="num">
+                                      <p:cBhvr>
+                                        <p:cTn id="50" dur="1000" fill="hold"/>
+                                        <p:tgtEl>
+                                          <p:spTgt spid="13"/>
+                                        </p:tgtEl>
+                                        <p:attrNameLst>
+                                          <p:attrName>ppt_h</p:attrName>
+                                        </p:attrNameLst>
+                                      </p:cBhvr>
+                                      <p:tavLst>
+                                        <p:tav tm="0">
+                                          <p:val>
+                                            <p:fltVal val="0"/>
+                                          </p:val>
+                                        </p:tav>
+                                        <p:tav tm="100000">
+                                          <p:val>
+                                            <p:strVal val="#ppt_h"/>
+                                          </p:val>
+                                        </p:tav>
+                                      </p:tavLst>
+                                    </p:anim>
+                                    <p:anim calcmode="lin" valueType="num">
+                                      <p:cBhvr>
+                                        <p:cTn id="51" dur="1000" fill="hold"/>
+                                        <p:tgtEl>
+                                          <p:spTgt spid="13"/>
+                                        </p:tgtEl>
+                                        <p:attrNameLst>
+                                          <p:attrName>ppt_x</p:attrName>
+                                        </p:attrNameLst>
+                                      </p:cBhvr>
+                                      <p:tavLst>
+                                        <p:tav tm="0" fmla="#ppt_x+(cos(-2*pi*(1-$))*-#ppt_x-sin(-2*pi*(1-$))*(1-#ppt_y))*(1-$)">
+                                          <p:val>
+                                            <p:fltVal val="0"/>
+                                          </p:val>
+                                        </p:tav>
+                                        <p:tav tm="100000">
+                                          <p:val>
+                                            <p:fltVal val="1"/>
+                                          </p:val>
+                                        </p:tav>
+                                      </p:tavLst>
+                                    </p:anim>
+                                    <p:anim calcmode="lin" valueType="num">
+                                      <p:cBhvr>
+                                        <p:cTn id="52" dur="1000" fill="hold"/>
+                                        <p:tgtEl>
+                                          <p:spTgt spid="13"/>
+                                        </p:tgtEl>
+                                        <p:attrNameLst>
+                                          <p:attrName>ppt_y</p:attrName>
+                                        </p:attrNameLst>
+                                      </p:cBhvr>
+                                      <p:tavLst>
+                                        <p:tav tm="0" fmla="#ppt_y+(sin(-2*pi*(1-$))*-#ppt_x+cos(-2*pi*(1-$))*(1-#ppt_y))*(1-$)">
+                                          <p:val>
+                                            <p:fltVal val="0"/>
+                                          </p:val>
+                                        </p:tav>
+                                        <p:tav tm="100000">
+                                          <p:val>
+                                            <p:fltVal val="1"/>
+                                          </p:val>
+                                        </p:tav>
+                                      </p:tavLst>
+                                    </p:anim>
+                                  </p:childTnLst>
+                                </p:cTn>
+                              </p:par>
+                              <p:par>
+                                <p:cTn id="53" presetID="15" presetClass="entr" presetSubtype="0" fill="hold" grpId="0" nodeType="withEffect">
+                                  <p:stCondLst>
+                                    <p:cond delay="0"/>
+                                  </p:stCondLst>
+                                  <p:childTnLst>
+                                    <p:set>
+                                      <p:cBhvr>
+                                        <p:cTn id="54" dur="1" fill="hold">
+                                          <p:stCondLst>
+                                            <p:cond delay="0"/>
+                                          </p:stCondLst>
+                                        </p:cTn>
+                                        <p:tgtEl>
+                                          <p:spTgt spid="61"/>
+                                        </p:tgtEl>
+                                        <p:attrNameLst>
+                                          <p:attrName>style.visibility</p:attrName>
+                                        </p:attrNameLst>
+                                      </p:cBhvr>
+                                      <p:to>
+                                        <p:strVal val="visible"/>
+                                      </p:to>
+                                    </p:set>
+                                    <p:anim calcmode="lin" valueType="num">
+                                      <p:cBhvr>
+                                        <p:cTn id="55" dur="1000" fill="hold"/>
+                                        <p:tgtEl>
+                                          <p:spTgt spid="61"/>
+                                        </p:tgtEl>
+                                        <p:attrNameLst>
+                                          <p:attrName>ppt_w</p:attrName>
+                                        </p:attrNameLst>
+                                      </p:cBhvr>
+                                      <p:tavLst>
+                                        <p:tav tm="0">
+                                          <p:val>
+                                            <p:fltVal val="0"/>
+                                          </p:val>
+                                        </p:tav>
+                                        <p:tav tm="100000">
+                                          <p:val>
+                                            <p:strVal val="#ppt_w"/>
+                                          </p:val>
+                                        </p:tav>
+                                      </p:tavLst>
+                                    </p:anim>
+                                    <p:anim calcmode="lin" valueType="num">
+                                      <p:cBhvr>
+                                        <p:cTn id="56" dur="1000" fill="hold"/>
+                                        <p:tgtEl>
+                                          <p:spTgt spid="61"/>
+                                        </p:tgtEl>
+                                        <p:attrNameLst>
+                                          <p:attrName>ppt_h</p:attrName>
+                                        </p:attrNameLst>
+                                      </p:cBhvr>
+                                      <p:tavLst>
+                                        <p:tav tm="0">
+                                          <p:val>
+                                            <p:fltVal val="0"/>
+                                          </p:val>
+                                        </p:tav>
+                                        <p:tav tm="100000">
+                                          <p:val>
+                                            <p:strVal val="#ppt_h"/>
+                                          </p:val>
+                                        </p:tav>
+                                      </p:tavLst>
+                                    </p:anim>
+                                    <p:anim calcmode="lin" valueType="num">
+                                      <p:cBhvr>
+                                        <p:cTn id="57" dur="1000" fill="hold"/>
+                                        <p:tgtEl>
+                                          <p:spTgt spid="61"/>
+                                        </p:tgtEl>
+                                        <p:attrNameLst>
+                                          <p:attrName>ppt_x</p:attrName>
+                                        </p:attrNameLst>
+                                      </p:cBhvr>
+                                      <p:tavLst>
+                                        <p:tav tm="0" fmla="#ppt_x+(cos(-2*pi*(1-$))*-#ppt_x-sin(-2*pi*(1-$))*(1-#ppt_y))*(1-$)">
+                                          <p:val>
+                                            <p:fltVal val="0"/>
+                                          </p:val>
+                                        </p:tav>
+                                        <p:tav tm="100000">
+                                          <p:val>
+                                            <p:fltVal val="1"/>
+                                          </p:val>
+                                        </p:tav>
+                                      </p:tavLst>
+                                    </p:anim>
+                                    <p:anim calcmode="lin" valueType="num">
+                                      <p:cBhvr>
+                                        <p:cTn id="58" dur="1000" fill="hold"/>
+                                        <p:tgtEl>
+                                          <p:spTgt spid="61"/>
+                                        </p:tgtEl>
+                                        <p:attrNameLst>
+                                          <p:attrName>ppt_y</p:attrName>
+                                        </p:attrNameLst>
+                                      </p:cBhvr>
+                                      <p:tavLst>
+                                        <p:tav tm="0" fmla="#ppt_y+(sin(-2*pi*(1-$))*-#ppt_x+cos(-2*pi*(1-$))*(1-#ppt_y))*(1-$)">
+                                          <p:val>
+                                            <p:fltVal val="0"/>
+                                          </p:val>
+                                        </p:tav>
+                                        <p:tav tm="100000">
+                                          <p:val>
+                                            <p:fltVal val="1"/>
+                                          </p:val>
+                                        </p:tav>
+                                      </p:tavLst>
+                                    </p:anim>
+                                  </p:childTnLst>
+                                </p:cTn>
+                              </p:par>
+                              <p:par>
+                                <p:cTn id="59" presetID="15" presetClass="entr" presetSubtype="0" fill="hold" nodeType="withEffect">
+                                  <p:stCondLst>
+                                    <p:cond delay="0"/>
+                                  </p:stCondLst>
+                                  <p:childTnLst>
+                                    <p:set>
+                                      <p:cBhvr>
+                                        <p:cTn id="60" dur="1" fill="hold">
+                                          <p:stCondLst>
+                                            <p:cond delay="0"/>
+                                          </p:stCondLst>
+                                        </p:cTn>
+                                        <p:tgtEl>
+                                          <p:spTgt spid="24"/>
+                                        </p:tgtEl>
+                                        <p:attrNameLst>
+                                          <p:attrName>style.visibility</p:attrName>
+                                        </p:attrNameLst>
+                                      </p:cBhvr>
+                                      <p:to>
+                                        <p:strVal val="visible"/>
+                                      </p:to>
+                                    </p:set>
+                                    <p:anim calcmode="lin" valueType="num">
+                                      <p:cBhvr>
+                                        <p:cTn id="61" dur="1000" fill="hold"/>
+                                        <p:tgtEl>
+                                          <p:spTgt spid="24"/>
+                                        </p:tgtEl>
+                                        <p:attrNameLst>
+                                          <p:attrName>ppt_w</p:attrName>
+                                        </p:attrNameLst>
+                                      </p:cBhvr>
+                                      <p:tavLst>
+                                        <p:tav tm="0">
+                                          <p:val>
+                                            <p:fltVal val="0"/>
+                                          </p:val>
+                                        </p:tav>
+                                        <p:tav tm="100000">
+                                          <p:val>
+                                            <p:strVal val="#ppt_w"/>
+                                          </p:val>
+                                        </p:tav>
+                                      </p:tavLst>
+                                    </p:anim>
+                                    <p:anim calcmode="lin" valueType="num">
+                                      <p:cBhvr>
+                                        <p:cTn id="62" dur="1000" fill="hold"/>
+                                        <p:tgtEl>
+                                          <p:spTgt spid="24"/>
+                                        </p:tgtEl>
+                                        <p:attrNameLst>
+                                          <p:attrName>ppt_h</p:attrName>
+                                        </p:attrNameLst>
+                                      </p:cBhvr>
+                                      <p:tavLst>
+                                        <p:tav tm="0">
+                                          <p:val>
+                                            <p:fltVal val="0"/>
+                                          </p:val>
+                                        </p:tav>
+                                        <p:tav tm="100000">
+                                          <p:val>
+                                            <p:strVal val="#ppt_h"/>
+                                          </p:val>
+                                        </p:tav>
+                                      </p:tavLst>
+                                    </p:anim>
+                                    <p:anim calcmode="lin" valueType="num">
+                                      <p:cBhvr>
+                                        <p:cTn id="63" dur="1000" fill="hold"/>
+                                        <p:tgtEl>
+                                          <p:spTgt spid="24"/>
+                                        </p:tgtEl>
+                                        <p:attrNameLst>
+                                          <p:attrName>ppt_x</p:attrName>
+                                        </p:attrNameLst>
+                                      </p:cBhvr>
+                                      <p:tavLst>
+                                        <p:tav tm="0" fmla="#ppt_x+(cos(-2*pi*(1-$))*-#ppt_x-sin(-2*pi*(1-$))*(1-#ppt_y))*(1-$)">
+                                          <p:val>
+                                            <p:fltVal val="0"/>
+                                          </p:val>
+                                        </p:tav>
+                                        <p:tav tm="100000">
+                                          <p:val>
+                                            <p:fltVal val="1"/>
+                                          </p:val>
+                                        </p:tav>
+                                      </p:tavLst>
+                                    </p:anim>
+                                    <p:anim calcmode="lin" valueType="num">
+                                      <p:cBhvr>
+                                        <p:cTn id="64" dur="1000" fill="hold"/>
+                                        <p:tgtEl>
+                                          <p:spTgt spid="24"/>
+                                        </p:tgtEl>
+                                        <p:attrNameLst>
+                                          <p:attrName>ppt_y</p:attrName>
+                                        </p:attrNameLst>
+                                      </p:cBhvr>
+                                      <p:tavLst>
+                                        <p:tav tm="0" fmla="#ppt_y+(sin(-2*pi*(1-$))*-#ppt_x+cos(-2*pi*(1-$))*(1-#ppt_y))*(1-$)">
+                                          <p:val>
+                                            <p:fltVal val="0"/>
+                                          </p:val>
+                                        </p:tav>
+                                        <p:tav tm="100000">
+                                          <p:val>
+                                            <p:fltVal val="1"/>
+                                          </p:val>
+                                        </p:tav>
+                                      </p:tavLst>
+                                    </p:anim>
+                                  </p:childTnLst>
+                                </p:cTn>
+                              </p:par>
+                              <p:par>
+                                <p:cTn id="65" presetID="15" presetClass="entr" presetSubtype="0" fill="hold" grpId="0" nodeType="withEffect">
+                                  <p:stCondLst>
+                                    <p:cond delay="0"/>
+                                  </p:stCondLst>
+                                  <p:childTnLst>
+                                    <p:set>
+                                      <p:cBhvr>
+                                        <p:cTn id="66" dur="1" fill="hold">
+                                          <p:stCondLst>
+                                            <p:cond delay="0"/>
+                                          </p:stCondLst>
+                                        </p:cTn>
+                                        <p:tgtEl>
+                                          <p:spTgt spid="33"/>
+                                        </p:tgtEl>
+                                        <p:attrNameLst>
+                                          <p:attrName>style.visibility</p:attrName>
+                                        </p:attrNameLst>
+                                      </p:cBhvr>
+                                      <p:to>
+                                        <p:strVal val="visible"/>
+                                      </p:to>
+                                    </p:set>
+                                    <p:anim calcmode="lin" valueType="num">
+                                      <p:cBhvr>
+                                        <p:cTn id="67" dur="1000" fill="hold"/>
+                                        <p:tgtEl>
+                                          <p:spTgt spid="33"/>
+                                        </p:tgtEl>
+                                        <p:attrNameLst>
+                                          <p:attrName>ppt_w</p:attrName>
+                                        </p:attrNameLst>
+                                      </p:cBhvr>
+                                      <p:tavLst>
+                                        <p:tav tm="0">
+                                          <p:val>
+                                            <p:fltVal val="0"/>
+                                          </p:val>
+                                        </p:tav>
+                                        <p:tav tm="100000">
+                                          <p:val>
+                                            <p:strVal val="#ppt_w"/>
+                                          </p:val>
+                                        </p:tav>
+                                      </p:tavLst>
+                                    </p:anim>
+                                    <p:anim calcmode="lin" valueType="num">
+                                      <p:cBhvr>
+                                        <p:cTn id="68" dur="1000" fill="hold"/>
+                                        <p:tgtEl>
+                                          <p:spTgt spid="33"/>
+                                        </p:tgtEl>
+                                        <p:attrNameLst>
+                                          <p:attrName>ppt_h</p:attrName>
+                                        </p:attrNameLst>
+                                      </p:cBhvr>
+                                      <p:tavLst>
+                                        <p:tav tm="0">
+                                          <p:val>
+                                            <p:fltVal val="0"/>
+                                          </p:val>
+                                        </p:tav>
+                                        <p:tav tm="100000">
+                                          <p:val>
+                                            <p:strVal val="#ppt_h"/>
+                                          </p:val>
+                                        </p:tav>
+                                      </p:tavLst>
+                                    </p:anim>
+                                    <p:anim calcmode="lin" valueType="num">
+                                      <p:cBhvr>
+                                        <p:cTn id="69" dur="1000" fill="hold"/>
+                                        <p:tgtEl>
+                                          <p:spTgt spid="33"/>
+                                        </p:tgtEl>
+                                        <p:attrNameLst>
+                                          <p:attrName>ppt_x</p:attrName>
+                                        </p:attrNameLst>
+                                      </p:cBhvr>
+                                      <p:tavLst>
+                                        <p:tav tm="0" fmla="#ppt_x+(cos(-2*pi*(1-$))*-#ppt_x-sin(-2*pi*(1-$))*(1-#ppt_y))*(1-$)">
+                                          <p:val>
+                                            <p:fltVal val="0"/>
+                                          </p:val>
+                                        </p:tav>
+                                        <p:tav tm="100000">
+                                          <p:val>
+                                            <p:fltVal val="1"/>
+                                          </p:val>
+                                        </p:tav>
+                                      </p:tavLst>
+                                    </p:anim>
+                                    <p:anim calcmode="lin" valueType="num">
+                                      <p:cBhvr>
+                                        <p:cTn id="70" dur="1000" fill="hold"/>
+                                        <p:tgtEl>
+                                          <p:spTgt spid="33"/>
+                                        </p:tgtEl>
+                                        <p:attrNameLst>
+                                          <p:attrName>ppt_y</p:attrName>
+                                        </p:attrNameLst>
+                                      </p:cBhvr>
+                                      <p:tavLst>
+                                        <p:tav tm="0" fmla="#ppt_y+(sin(-2*pi*(1-$))*-#ppt_x+cos(-2*pi*(1-$))*(1-#ppt_y))*(1-$)">
+                                          <p:val>
+                                            <p:fltVal val="0"/>
+                                          </p:val>
+                                        </p:tav>
+                                        <p:tav tm="100000">
+                                          <p:val>
+                                            <p:fltVal val="1"/>
+                                          </p:val>
+                                        </p:tav>
+                                      </p:tavLst>
+                                    </p:anim>
+                                  </p:childTnLst>
+                                </p:cTn>
+                              </p:par>
+                              <p:par>
+                                <p:cTn id="71" presetID="15" presetClass="entr" presetSubtype="0" fill="hold" grpId="0" nodeType="withEffect">
+                                  <p:stCondLst>
+                                    <p:cond delay="0"/>
+                                  </p:stCondLst>
+                                  <p:childTnLst>
+                                    <p:set>
+                                      <p:cBhvr>
+                                        <p:cTn id="72" dur="1" fill="hold">
+                                          <p:stCondLst>
+                                            <p:cond delay="0"/>
+                                          </p:stCondLst>
+                                        </p:cTn>
+                                        <p:tgtEl>
+                                          <p:spTgt spid="44"/>
+                                        </p:tgtEl>
+                                        <p:attrNameLst>
+                                          <p:attrName>style.visibility</p:attrName>
+                                        </p:attrNameLst>
+                                      </p:cBhvr>
+                                      <p:to>
+                                        <p:strVal val="visible"/>
+                                      </p:to>
+                                    </p:set>
+                                    <p:anim calcmode="lin" valueType="num">
+                                      <p:cBhvr>
+                                        <p:cTn id="73" dur="1000" fill="hold"/>
+                                        <p:tgtEl>
+                                          <p:spTgt spid="44"/>
+                                        </p:tgtEl>
+                                        <p:attrNameLst>
+                                          <p:attrName>ppt_w</p:attrName>
+                                        </p:attrNameLst>
+                                      </p:cBhvr>
+                                      <p:tavLst>
+                                        <p:tav tm="0">
+                                          <p:val>
+                                            <p:fltVal val="0"/>
+                                          </p:val>
+                                        </p:tav>
+                                        <p:tav tm="100000">
+                                          <p:val>
+                                            <p:strVal val="#ppt_w"/>
+                                          </p:val>
+                                        </p:tav>
+                                      </p:tavLst>
+                                    </p:anim>
+                                    <p:anim calcmode="lin" valueType="num">
+                                      <p:cBhvr>
+                                        <p:cTn id="74" dur="1000" fill="hold"/>
+                                        <p:tgtEl>
+                                          <p:spTgt spid="44"/>
+                                        </p:tgtEl>
+                                        <p:attrNameLst>
+                                          <p:attrName>ppt_h</p:attrName>
+                                        </p:attrNameLst>
+                                      </p:cBhvr>
+                                      <p:tavLst>
+                                        <p:tav tm="0">
+                                          <p:val>
+                                            <p:fltVal val="0"/>
+                                          </p:val>
+                                        </p:tav>
+                                        <p:tav tm="100000">
+                                          <p:val>
+                                            <p:strVal val="#ppt_h"/>
+                                          </p:val>
+                                        </p:tav>
+                                      </p:tavLst>
+                                    </p:anim>
+                                    <p:anim calcmode="lin" valueType="num">
+                                      <p:cBhvr>
+                                        <p:cTn id="75" dur="1000" fill="hold"/>
+                                        <p:tgtEl>
+                                          <p:spTgt spid="44"/>
+                                        </p:tgtEl>
+                                        <p:attrNameLst>
+                                          <p:attrName>ppt_x</p:attrName>
+                                        </p:attrNameLst>
+                                      </p:cBhvr>
+                                      <p:tavLst>
+                                        <p:tav tm="0" fmla="#ppt_x+(cos(-2*pi*(1-$))*-#ppt_x-sin(-2*pi*(1-$))*(1-#ppt_y))*(1-$)">
+                                          <p:val>
+                                            <p:fltVal val="0"/>
+                                          </p:val>
+                                        </p:tav>
+                                        <p:tav tm="100000">
+                                          <p:val>
+                                            <p:fltVal val="1"/>
+                                          </p:val>
+                                        </p:tav>
+                                      </p:tavLst>
+                                    </p:anim>
+                                    <p:anim calcmode="lin" valueType="num">
+                                      <p:cBhvr>
+                                        <p:cTn id="76" dur="1000" fill="hold"/>
+                                        <p:tgtEl>
+                                          <p:spTgt spid="44"/>
+                                        </p:tgtEl>
+                                        <p:attrNameLst>
+                                          <p:attrName>ppt_y</p:attrName>
+                                        </p:attrNameLst>
+                                      </p:cBhvr>
+                                      <p:tavLst>
+                                        <p:tav tm="0" fmla="#ppt_y+(sin(-2*pi*(1-$))*-#ppt_x+cos(-2*pi*(1-$))*(1-#ppt_y))*(1-$)">
+                                          <p:val>
+                                            <p:fltVal val="0"/>
+                                          </p:val>
+                                        </p:tav>
+                                        <p:tav tm="100000">
+                                          <p:val>
+                                            <p:fltVal val="1"/>
+                                          </p:val>
+                                        </p:tav>
+                                      </p:tavLst>
+                                    </p:anim>
+                                  </p:childTnLst>
+                                </p:cTn>
+                              </p:par>
+                              <p:par>
+                                <p:cTn id="77" presetID="15" presetClass="entr" presetSubtype="0" fill="hold" grpId="0" nodeType="withEffect">
+                                  <p:stCondLst>
+                                    <p:cond delay="0"/>
+                                  </p:stCondLst>
+                                  <p:childTnLst>
+                                    <p:set>
+                                      <p:cBhvr>
+                                        <p:cTn id="78" dur="1" fill="hold">
+                                          <p:stCondLst>
+                                            <p:cond delay="0"/>
+                                          </p:stCondLst>
+                                        </p:cTn>
+                                        <p:tgtEl>
+                                          <p:spTgt spid="45"/>
+                                        </p:tgtEl>
+                                        <p:attrNameLst>
+                                          <p:attrName>style.visibility</p:attrName>
+                                        </p:attrNameLst>
+                                      </p:cBhvr>
+                                      <p:to>
+                                        <p:strVal val="visible"/>
+                                      </p:to>
+                                    </p:set>
+                                    <p:anim calcmode="lin" valueType="num">
+                                      <p:cBhvr>
+                                        <p:cTn id="79" dur="1000" fill="hold"/>
+                                        <p:tgtEl>
+                                          <p:spTgt spid="45"/>
+                                        </p:tgtEl>
+                                        <p:attrNameLst>
+                                          <p:attrName>ppt_w</p:attrName>
+                                        </p:attrNameLst>
+                                      </p:cBhvr>
+                                      <p:tavLst>
+                                        <p:tav tm="0">
+                                          <p:val>
+                                            <p:fltVal val="0"/>
+                                          </p:val>
+                                        </p:tav>
+                                        <p:tav tm="100000">
+                                          <p:val>
+                                            <p:strVal val="#ppt_w"/>
+                                          </p:val>
+                                        </p:tav>
+                                      </p:tavLst>
+                                    </p:anim>
+                                    <p:anim calcmode="lin" valueType="num">
+                                      <p:cBhvr>
+                                        <p:cTn id="80" dur="1000" fill="hold"/>
+                                        <p:tgtEl>
+                                          <p:spTgt spid="45"/>
+                                        </p:tgtEl>
+                                        <p:attrNameLst>
+                                          <p:attrName>ppt_h</p:attrName>
+                                        </p:attrNameLst>
+                                      </p:cBhvr>
+                                      <p:tavLst>
+                                        <p:tav tm="0">
+                                          <p:val>
+                                            <p:fltVal val="0"/>
+                                          </p:val>
+                                        </p:tav>
+                                        <p:tav tm="100000">
+                                          <p:val>
+                                            <p:strVal val="#ppt_h"/>
+                                          </p:val>
+                                        </p:tav>
+                                      </p:tavLst>
+                                    </p:anim>
+                                    <p:anim calcmode="lin" valueType="num">
+                                      <p:cBhvr>
+                                        <p:cTn id="81" dur="1000" fill="hold"/>
+                                        <p:tgtEl>
+                                          <p:spTgt spid="45"/>
+                                        </p:tgtEl>
+                                        <p:attrNameLst>
+                                          <p:attrName>ppt_x</p:attrName>
+                                        </p:attrNameLst>
+                                      </p:cBhvr>
+                                      <p:tavLst>
+                                        <p:tav tm="0" fmla="#ppt_x+(cos(-2*pi*(1-$))*-#ppt_x-sin(-2*pi*(1-$))*(1-#ppt_y))*(1-$)">
+                                          <p:val>
+                                            <p:fltVal val="0"/>
+                                          </p:val>
+                                        </p:tav>
+                                        <p:tav tm="100000">
+                                          <p:val>
+                                            <p:fltVal val="1"/>
+                                          </p:val>
+                                        </p:tav>
+                                      </p:tavLst>
+                                    </p:anim>
+                                    <p:anim calcmode="lin" valueType="num">
+                                      <p:cBhvr>
+                                        <p:cTn id="82" dur="1000" fill="hold"/>
+                                        <p:tgtEl>
+                                          <p:spTgt spid="45"/>
+                                        </p:tgtEl>
+                                        <p:attrNameLst>
+                                          <p:attrName>ppt_y</p:attrName>
+                                        </p:attrNameLst>
+                                      </p:cBhvr>
+                                      <p:tavLst>
+                                        <p:tav tm="0" fmla="#ppt_y+(sin(-2*pi*(1-$))*-#ppt_x+cos(-2*pi*(1-$))*(1-#ppt_y))*(1-$)">
+                                          <p:val>
+                                            <p:fltVal val="0"/>
+                                          </p:val>
+                                        </p:tav>
+                                        <p:tav tm="100000">
+                                          <p:val>
+                                            <p:fltVal val="1"/>
+                                          </p:val>
+                                        </p:tav>
+                                      </p:tavLst>
+                                    </p:anim>
+                                  </p:childTnLst>
+                                </p:cTn>
+                              </p:par>
+                              <p:par>
+                                <p:cTn id="83" presetID="15" presetClass="entr" presetSubtype="0" fill="hold" grpId="0" nodeType="withEffect">
+                                  <p:stCondLst>
+                                    <p:cond delay="0"/>
+                                  </p:stCondLst>
+                                  <p:childTnLst>
+                                    <p:set>
+                                      <p:cBhvr>
+                                        <p:cTn id="84" dur="1" fill="hold">
+                                          <p:stCondLst>
+                                            <p:cond delay="0"/>
+                                          </p:stCondLst>
+                                        </p:cTn>
+                                        <p:tgtEl>
+                                          <p:spTgt spid="46"/>
+                                        </p:tgtEl>
+                                        <p:attrNameLst>
+                                          <p:attrName>style.visibility</p:attrName>
+                                        </p:attrNameLst>
+                                      </p:cBhvr>
+                                      <p:to>
+                                        <p:strVal val="visible"/>
+                                      </p:to>
+                                    </p:set>
+                                    <p:anim calcmode="lin" valueType="num">
+                                      <p:cBhvr>
+                                        <p:cTn id="85" dur="1000" fill="hold"/>
+                                        <p:tgtEl>
+                                          <p:spTgt spid="46"/>
+                                        </p:tgtEl>
+                                        <p:attrNameLst>
+                                          <p:attrName>ppt_w</p:attrName>
+                                        </p:attrNameLst>
+                                      </p:cBhvr>
+                                      <p:tavLst>
+                                        <p:tav tm="0">
+                                          <p:val>
+                                            <p:fltVal val="0"/>
+                                          </p:val>
+                                        </p:tav>
+                                        <p:tav tm="100000">
+                                          <p:val>
+                                            <p:strVal val="#ppt_w"/>
+                                          </p:val>
+                                        </p:tav>
+                                      </p:tavLst>
+                                    </p:anim>
+                                    <p:anim calcmode="lin" valueType="num">
+                                      <p:cBhvr>
+                                        <p:cTn id="86" dur="1000" fill="hold"/>
+                                        <p:tgtEl>
+                                          <p:spTgt spid="46"/>
+                                        </p:tgtEl>
+                                        <p:attrNameLst>
+                                          <p:attrName>ppt_h</p:attrName>
+                                        </p:attrNameLst>
+                                      </p:cBhvr>
+                                      <p:tavLst>
+                                        <p:tav tm="0">
+                                          <p:val>
+                                            <p:fltVal val="0"/>
+                                          </p:val>
+                                        </p:tav>
+                                        <p:tav tm="100000">
+                                          <p:val>
+                                            <p:strVal val="#ppt_h"/>
+                                          </p:val>
+                                        </p:tav>
+                                      </p:tavLst>
+                                    </p:anim>
+                                    <p:anim calcmode="lin" valueType="num">
+                                      <p:cBhvr>
+                                        <p:cTn id="87" dur="1000" fill="hold"/>
+                                        <p:tgtEl>
+                                          <p:spTgt spid="46"/>
+                                        </p:tgtEl>
+                                        <p:attrNameLst>
+                                          <p:attrName>ppt_x</p:attrName>
+                                        </p:attrNameLst>
+                                      </p:cBhvr>
+                                      <p:tavLst>
+                                        <p:tav tm="0" fmla="#ppt_x+(cos(-2*pi*(1-$))*-#ppt_x-sin(-2*pi*(1-$))*(1-#ppt_y))*(1-$)">
+                                          <p:val>
+                                            <p:fltVal val="0"/>
+                                          </p:val>
+                                        </p:tav>
+                                        <p:tav tm="100000">
+                                          <p:val>
+                                            <p:fltVal val="1"/>
+                                          </p:val>
+                                        </p:tav>
+                                      </p:tavLst>
+                                    </p:anim>
+                                    <p:anim calcmode="lin" valueType="num">
+                                      <p:cBhvr>
+                                        <p:cTn id="88" dur="1000" fill="hold"/>
+                                        <p:tgtEl>
+                                          <p:spTgt spid="46"/>
+                                        </p:tgtEl>
+                                        <p:attrNameLst>
+                                          <p:attrName>ppt_y</p:attrName>
+                                        </p:attrNameLst>
+                                      </p:cBhvr>
+                                      <p:tavLst>
+                                        <p:tav tm="0" fmla="#ppt_y+(sin(-2*pi*(1-$))*-#ppt_x+cos(-2*pi*(1-$))*(1-#ppt_y))*(1-$)">
+                                          <p:val>
+                                            <p:fltVal val="0"/>
+                                          </p:val>
+                                        </p:tav>
+                                        <p:tav tm="100000">
+                                          <p:val>
+                                            <p:fltVal val="1"/>
+                                          </p:val>
+                                        </p:tav>
+                                      </p:tavLst>
+                                    </p:anim>
+                                  </p:childTnLst>
+                                </p:cTn>
+                              </p:par>
+                              <p:par>
+                                <p:cTn id="89" presetID="15" presetClass="entr" presetSubtype="0" fill="hold" nodeType="withEffect">
+                                  <p:stCondLst>
+                                    <p:cond delay="0"/>
+                                  </p:stCondLst>
+                                  <p:childTnLst>
+                                    <p:set>
+                                      <p:cBhvr>
+                                        <p:cTn id="90" dur="1" fill="hold">
+                                          <p:stCondLst>
+                                            <p:cond delay="0"/>
+                                          </p:stCondLst>
+                                        </p:cTn>
+                                        <p:tgtEl>
+                                          <p:spTgt spid="48"/>
+                                        </p:tgtEl>
+                                        <p:attrNameLst>
+                                          <p:attrName>style.visibility</p:attrName>
+                                        </p:attrNameLst>
+                                      </p:cBhvr>
+                                      <p:to>
+                                        <p:strVal val="visible"/>
+                                      </p:to>
+                                    </p:set>
+                                    <p:anim calcmode="lin" valueType="num">
+                                      <p:cBhvr>
+                                        <p:cTn id="91" dur="1000" fill="hold"/>
+                                        <p:tgtEl>
+                                          <p:spTgt spid="48"/>
+                                        </p:tgtEl>
+                                        <p:attrNameLst>
+                                          <p:attrName>ppt_w</p:attrName>
+                                        </p:attrNameLst>
+                                      </p:cBhvr>
+                                      <p:tavLst>
+                                        <p:tav tm="0">
+                                          <p:val>
+                                            <p:fltVal val="0"/>
+                                          </p:val>
+                                        </p:tav>
+                                        <p:tav tm="100000">
+                                          <p:val>
+                                            <p:strVal val="#ppt_w"/>
+                                          </p:val>
+                                        </p:tav>
+                                      </p:tavLst>
+                                    </p:anim>
+                                    <p:anim calcmode="lin" valueType="num">
+                                      <p:cBhvr>
+                                        <p:cTn id="92" dur="1000" fill="hold"/>
+                                        <p:tgtEl>
+                                          <p:spTgt spid="48"/>
+                                        </p:tgtEl>
+                                        <p:attrNameLst>
+                                          <p:attrName>ppt_h</p:attrName>
+                                        </p:attrNameLst>
+                                      </p:cBhvr>
+                                      <p:tavLst>
+                                        <p:tav tm="0">
+                                          <p:val>
+                                            <p:fltVal val="0"/>
+                                          </p:val>
+                                        </p:tav>
+                                        <p:tav tm="100000">
+                                          <p:val>
+                                            <p:strVal val="#ppt_h"/>
+                                          </p:val>
+                                        </p:tav>
+                                      </p:tavLst>
+                                    </p:anim>
+                                    <p:anim calcmode="lin" valueType="num">
+                                      <p:cBhvr>
+                                        <p:cTn id="93" dur="1000" fill="hold"/>
+                                        <p:tgtEl>
+                                          <p:spTgt spid="48"/>
+                                        </p:tgtEl>
+                                        <p:attrNameLst>
+                                          <p:attrName>ppt_x</p:attrName>
+                                        </p:attrNameLst>
+                                      </p:cBhvr>
+                                      <p:tavLst>
+                                        <p:tav tm="0" fmla="#ppt_x+(cos(-2*pi*(1-$))*-#ppt_x-sin(-2*pi*(1-$))*(1-#ppt_y))*(1-$)">
+                                          <p:val>
+                                            <p:fltVal val="0"/>
+                                          </p:val>
+                                        </p:tav>
+                                        <p:tav tm="100000">
+                                          <p:val>
+                                            <p:fltVal val="1"/>
+                                          </p:val>
+                                        </p:tav>
+                                      </p:tavLst>
+                                    </p:anim>
+                                    <p:anim calcmode="lin" valueType="num">
+                                      <p:cBhvr>
+                                        <p:cTn id="94" dur="1000" fill="hold"/>
+                                        <p:tgtEl>
+                                          <p:spTgt spid="48"/>
+                                        </p:tgtEl>
+                                        <p:attrNameLst>
+                                          <p:attrName>ppt_y</p:attrName>
+                                        </p:attrNameLst>
+                                      </p:cBhvr>
+                                      <p:tavLst>
+                                        <p:tav tm="0" fmla="#ppt_y+(sin(-2*pi*(1-$))*-#ppt_x+cos(-2*pi*(1-$))*(1-#ppt_y))*(1-$)">
+                                          <p:val>
+                                            <p:fltVal val="0"/>
+                                          </p:val>
+                                        </p:tav>
+                                        <p:tav tm="100000">
+                                          <p:val>
+                                            <p:fltVal val="1"/>
+                                          </p:val>
+                                        </p:tav>
+                                      </p:tavLst>
+                                    </p:anim>
+                                  </p:childTnLst>
+                                </p:cTn>
+                              </p:par>
+                              <p:par>
+                                <p:cTn id="95" presetID="15" presetClass="entr" presetSubtype="0" fill="hold" nodeType="withEffect">
+                                  <p:stCondLst>
+                                    <p:cond delay="0"/>
+                                  </p:stCondLst>
+                                  <p:childTnLst>
+                                    <p:set>
+                                      <p:cBhvr>
+                                        <p:cTn id="96" dur="1" fill="hold">
+                                          <p:stCondLst>
+                                            <p:cond delay="0"/>
+                                          </p:stCondLst>
+                                        </p:cTn>
+                                        <p:tgtEl>
+                                          <p:spTgt spid="49"/>
+                                        </p:tgtEl>
+                                        <p:attrNameLst>
+                                          <p:attrName>style.visibility</p:attrName>
+                                        </p:attrNameLst>
+                                      </p:cBhvr>
+                                      <p:to>
+                                        <p:strVal val="visible"/>
+                                      </p:to>
+                                    </p:set>
+                                    <p:anim calcmode="lin" valueType="num">
+                                      <p:cBhvr>
+                                        <p:cTn id="97" dur="1000" fill="hold"/>
+                                        <p:tgtEl>
+                                          <p:spTgt spid="49"/>
+                                        </p:tgtEl>
+                                        <p:attrNameLst>
+                                          <p:attrName>ppt_w</p:attrName>
+                                        </p:attrNameLst>
+                                      </p:cBhvr>
+                                      <p:tavLst>
+                                        <p:tav tm="0">
+                                          <p:val>
+                                            <p:fltVal val="0"/>
+                                          </p:val>
+                                        </p:tav>
+                                        <p:tav tm="100000">
+                                          <p:val>
+                                            <p:strVal val="#ppt_w"/>
+                                          </p:val>
+                                        </p:tav>
+                                      </p:tavLst>
+                                    </p:anim>
+                                    <p:anim calcmode="lin" valueType="num">
+                                      <p:cBhvr>
+                                        <p:cTn id="98" dur="1000" fill="hold"/>
+                                        <p:tgtEl>
+                                          <p:spTgt spid="49"/>
+                                        </p:tgtEl>
+                                        <p:attrNameLst>
+                                          <p:attrName>ppt_h</p:attrName>
+                                        </p:attrNameLst>
+                                      </p:cBhvr>
+                                      <p:tavLst>
+                                        <p:tav tm="0">
+                                          <p:val>
+                                            <p:fltVal val="0"/>
+                                          </p:val>
+                                        </p:tav>
+                                        <p:tav tm="100000">
+                                          <p:val>
+                                            <p:strVal val="#ppt_h"/>
+                                          </p:val>
+                                        </p:tav>
+                                      </p:tavLst>
+                                    </p:anim>
+                                    <p:anim calcmode="lin" valueType="num">
+                                      <p:cBhvr>
+                                        <p:cTn id="99" dur="1000" fill="hold"/>
+                                        <p:tgtEl>
+                                          <p:spTgt spid="49"/>
+                                        </p:tgtEl>
+                                        <p:attrNameLst>
+                                          <p:attrName>ppt_x</p:attrName>
+                                        </p:attrNameLst>
+                                      </p:cBhvr>
+                                      <p:tavLst>
+                                        <p:tav tm="0" fmla="#ppt_x+(cos(-2*pi*(1-$))*-#ppt_x-sin(-2*pi*(1-$))*(1-#ppt_y))*(1-$)">
+                                          <p:val>
+                                            <p:fltVal val="0"/>
+                                          </p:val>
+                                        </p:tav>
+                                        <p:tav tm="100000">
+                                          <p:val>
+                                            <p:fltVal val="1"/>
+                                          </p:val>
+                                        </p:tav>
+                                      </p:tavLst>
+                                    </p:anim>
+                                    <p:anim calcmode="lin" valueType="num">
+                                      <p:cBhvr>
+                                        <p:cTn id="100" dur="1000" fill="hold"/>
+                                        <p:tgtEl>
+                                          <p:spTgt spid="49"/>
+                                        </p:tgtEl>
+                                        <p:attrNameLst>
+                                          <p:attrName>ppt_y</p:attrName>
+                                        </p:attrNameLst>
+                                      </p:cBhvr>
+                                      <p:tavLst>
+                                        <p:tav tm="0" fmla="#ppt_y+(sin(-2*pi*(1-$))*-#ppt_x+cos(-2*pi*(1-$))*(1-#ppt_y))*(1-$)">
+                                          <p:val>
+                                            <p:fltVal val="0"/>
+                                          </p:val>
+                                        </p:tav>
+                                        <p:tav tm="100000">
+                                          <p:val>
+                                            <p:fltVal val="1"/>
+                                          </p:val>
+                                        </p:tav>
+                                      </p:tavLst>
+                                    </p:anim>
+                                  </p:childTnLst>
+                                </p:cTn>
+                              </p:par>
+                              <p:par>
+                                <p:cTn id="101" presetID="15" presetClass="entr" presetSubtype="0" fill="hold" grpId="0" nodeType="withEffect">
+                                  <p:stCondLst>
+                                    <p:cond delay="0"/>
+                                  </p:stCondLst>
+                                  <p:childTnLst>
+                                    <p:set>
+                                      <p:cBhvr>
+                                        <p:cTn id="102" dur="1" fill="hold">
+                                          <p:stCondLst>
+                                            <p:cond delay="0"/>
+                                          </p:stCondLst>
+                                        </p:cTn>
+                                        <p:tgtEl>
+                                          <p:spTgt spid="73"/>
+                                        </p:tgtEl>
+                                        <p:attrNameLst>
+                                          <p:attrName>style.visibility</p:attrName>
+                                        </p:attrNameLst>
+                                      </p:cBhvr>
+                                      <p:to>
+                                        <p:strVal val="visible"/>
+                                      </p:to>
+                                    </p:set>
+                                    <p:anim calcmode="lin" valueType="num">
+                                      <p:cBhvr>
+                                        <p:cTn id="103" dur="1000" fill="hold"/>
+                                        <p:tgtEl>
+                                          <p:spTgt spid="73"/>
+                                        </p:tgtEl>
+                                        <p:attrNameLst>
+                                          <p:attrName>ppt_w</p:attrName>
+                                        </p:attrNameLst>
+                                      </p:cBhvr>
+                                      <p:tavLst>
+                                        <p:tav tm="0">
+                                          <p:val>
+                                            <p:fltVal val="0"/>
+                                          </p:val>
+                                        </p:tav>
+                                        <p:tav tm="100000">
+                                          <p:val>
+                                            <p:strVal val="#ppt_w"/>
+                                          </p:val>
+                                        </p:tav>
+                                      </p:tavLst>
+                                    </p:anim>
+                                    <p:anim calcmode="lin" valueType="num">
+                                      <p:cBhvr>
+                                        <p:cTn id="104" dur="1000" fill="hold"/>
+                                        <p:tgtEl>
+                                          <p:spTgt spid="73"/>
+                                        </p:tgtEl>
+                                        <p:attrNameLst>
+                                          <p:attrName>ppt_h</p:attrName>
+                                        </p:attrNameLst>
+                                      </p:cBhvr>
+                                      <p:tavLst>
+                                        <p:tav tm="0">
+                                          <p:val>
+                                            <p:fltVal val="0"/>
+                                          </p:val>
+                                        </p:tav>
+                                        <p:tav tm="100000">
+                                          <p:val>
+                                            <p:strVal val="#ppt_h"/>
+                                          </p:val>
+                                        </p:tav>
+                                      </p:tavLst>
+                                    </p:anim>
+                                    <p:anim calcmode="lin" valueType="num">
+                                      <p:cBhvr>
+                                        <p:cTn id="105" dur="1000" fill="hold"/>
+                                        <p:tgtEl>
+                                          <p:spTgt spid="73"/>
+                                        </p:tgtEl>
+                                        <p:attrNameLst>
+                                          <p:attrName>ppt_x</p:attrName>
+                                        </p:attrNameLst>
+                                      </p:cBhvr>
+                                      <p:tavLst>
+                                        <p:tav tm="0" fmla="#ppt_x+(cos(-2*pi*(1-$))*-#ppt_x-sin(-2*pi*(1-$))*(1-#ppt_y))*(1-$)">
+                                          <p:val>
+                                            <p:fltVal val="0"/>
+                                          </p:val>
+                                        </p:tav>
+                                        <p:tav tm="100000">
+                                          <p:val>
+                                            <p:fltVal val="1"/>
+                                          </p:val>
+                                        </p:tav>
+                                      </p:tavLst>
+                                    </p:anim>
+                                    <p:anim calcmode="lin" valueType="num">
+                                      <p:cBhvr>
+                                        <p:cTn id="106" dur="1000" fill="hold"/>
+                                        <p:tgtEl>
+                                          <p:spTgt spid="73"/>
+                                        </p:tgtEl>
+                                        <p:attrNameLst>
+                                          <p:attrName>ppt_y</p:attrName>
+                                        </p:attrNameLst>
+                                      </p:cBhvr>
+                                      <p:tavLst>
+                                        <p:tav tm="0" fmla="#ppt_y+(sin(-2*pi*(1-$))*-#ppt_x+cos(-2*pi*(1-$))*(1-#ppt_y))*(1-$)">
+                                          <p:val>
+                                            <p:fltVal val="0"/>
+                                          </p:val>
+                                        </p:tav>
+                                        <p:tav tm="100000">
+                                          <p:val>
+                                            <p:fltVal val="1"/>
+                                          </p:val>
+                                        </p:tav>
+                                      </p:tavLst>
+                                    </p:anim>
+                                  </p:childTnLst>
+                                </p:cTn>
+                              </p:par>
+                              <p:par>
+                                <p:cTn id="107" presetID="15" presetClass="entr" presetSubtype="0" fill="hold" grpId="0" nodeType="withEffect">
+                                  <p:stCondLst>
+                                    <p:cond delay="0"/>
+                                  </p:stCondLst>
+                                  <p:childTnLst>
+                                    <p:set>
+                                      <p:cBhvr>
+                                        <p:cTn id="108" dur="1" fill="hold">
+                                          <p:stCondLst>
+                                            <p:cond delay="0"/>
+                                          </p:stCondLst>
+                                        </p:cTn>
+                                        <p:tgtEl>
+                                          <p:spTgt spid="83"/>
+                                        </p:tgtEl>
+                                        <p:attrNameLst>
+                                          <p:attrName>style.visibility</p:attrName>
+                                        </p:attrNameLst>
+                                      </p:cBhvr>
+                                      <p:to>
+                                        <p:strVal val="visible"/>
+                                      </p:to>
+                                    </p:set>
+                                    <p:anim calcmode="lin" valueType="num">
+                                      <p:cBhvr>
+                                        <p:cTn id="109" dur="1000" fill="hold"/>
+                                        <p:tgtEl>
+                                          <p:spTgt spid="83"/>
+                                        </p:tgtEl>
+                                        <p:attrNameLst>
+                                          <p:attrName>ppt_w</p:attrName>
+                                        </p:attrNameLst>
+                                      </p:cBhvr>
+                                      <p:tavLst>
+                                        <p:tav tm="0">
+                                          <p:val>
+                                            <p:fltVal val="0"/>
+                                          </p:val>
+                                        </p:tav>
+                                        <p:tav tm="100000">
+                                          <p:val>
+                                            <p:strVal val="#ppt_w"/>
+                                          </p:val>
+                                        </p:tav>
+                                      </p:tavLst>
+                                    </p:anim>
+                                    <p:anim calcmode="lin" valueType="num">
+                                      <p:cBhvr>
+                                        <p:cTn id="110" dur="1000" fill="hold"/>
+                                        <p:tgtEl>
+                                          <p:spTgt spid="83"/>
+                                        </p:tgtEl>
+                                        <p:attrNameLst>
+                                          <p:attrName>ppt_h</p:attrName>
+                                        </p:attrNameLst>
+                                      </p:cBhvr>
+                                      <p:tavLst>
+                                        <p:tav tm="0">
+                                          <p:val>
+                                            <p:fltVal val="0"/>
+                                          </p:val>
+                                        </p:tav>
+                                        <p:tav tm="100000">
+                                          <p:val>
+                                            <p:strVal val="#ppt_h"/>
+                                          </p:val>
+                                        </p:tav>
+                                      </p:tavLst>
+                                    </p:anim>
+                                    <p:anim calcmode="lin" valueType="num">
+                                      <p:cBhvr>
+                                        <p:cTn id="111" dur="1000" fill="hold"/>
+                                        <p:tgtEl>
+                                          <p:spTgt spid="83"/>
+                                        </p:tgtEl>
+                                        <p:attrNameLst>
+                                          <p:attrName>ppt_x</p:attrName>
+                                        </p:attrNameLst>
+                                      </p:cBhvr>
+                                      <p:tavLst>
+                                        <p:tav tm="0" fmla="#ppt_x+(cos(-2*pi*(1-$))*-#ppt_x-sin(-2*pi*(1-$))*(1-#ppt_y))*(1-$)">
+                                          <p:val>
+                                            <p:fltVal val="0"/>
+                                          </p:val>
+                                        </p:tav>
+                                        <p:tav tm="100000">
+                                          <p:val>
+                                            <p:fltVal val="1"/>
+                                          </p:val>
+                                        </p:tav>
+                                      </p:tavLst>
+                                    </p:anim>
+                                    <p:anim calcmode="lin" valueType="num">
+                                      <p:cBhvr>
+                                        <p:cTn id="112" dur="1000" fill="hold"/>
+                                        <p:tgtEl>
+                                          <p:spTgt spid="83"/>
+                                        </p:tgtEl>
+                                        <p:attrNameLst>
+                                          <p:attrName>ppt_y</p:attrName>
+                                        </p:attrNameLst>
+                                      </p:cBhvr>
+                                      <p:tavLst>
+                                        <p:tav tm="0" fmla="#ppt_y+(sin(-2*pi*(1-$))*-#ppt_x+cos(-2*pi*(1-$))*(1-#ppt_y))*(1-$)">
+                                          <p:val>
+                                            <p:fltVal val="0"/>
+                                          </p:val>
+                                        </p:tav>
+                                        <p:tav tm="100000">
+                                          <p:val>
+                                            <p:fltVal val="1"/>
+                                          </p:val>
+                                        </p:tav>
+                                      </p:tavLst>
+                                    </p:anim>
+                                  </p:childTnLst>
+                                </p:cTn>
+                              </p:par>
+                              <p:par>
+                                <p:cTn id="113" presetID="15" presetClass="entr" presetSubtype="0" fill="hold" nodeType="withEffect">
+                                  <p:stCondLst>
+                                    <p:cond delay="0"/>
+                                  </p:stCondLst>
+                                  <p:childTnLst>
+                                    <p:set>
+                                      <p:cBhvr>
+                                        <p:cTn id="114" dur="1" fill="hold">
+                                          <p:stCondLst>
+                                            <p:cond delay="0"/>
+                                          </p:stCondLst>
+                                        </p:cTn>
+                                        <p:tgtEl>
+                                          <p:spTgt spid="84"/>
+                                        </p:tgtEl>
+                                        <p:attrNameLst>
+                                          <p:attrName>style.visibility</p:attrName>
+                                        </p:attrNameLst>
+                                      </p:cBhvr>
+                                      <p:to>
+                                        <p:strVal val="visible"/>
+                                      </p:to>
+                                    </p:set>
+                                    <p:anim calcmode="lin" valueType="num">
+                                      <p:cBhvr>
+                                        <p:cTn id="115" dur="1000" fill="hold"/>
+                                        <p:tgtEl>
+                                          <p:spTgt spid="84"/>
+                                        </p:tgtEl>
+                                        <p:attrNameLst>
+                                          <p:attrName>ppt_w</p:attrName>
+                                        </p:attrNameLst>
+                                      </p:cBhvr>
+                                      <p:tavLst>
+                                        <p:tav tm="0">
+                                          <p:val>
+                                            <p:fltVal val="0"/>
+                                          </p:val>
+                                        </p:tav>
+                                        <p:tav tm="100000">
+                                          <p:val>
+                                            <p:strVal val="#ppt_w"/>
+                                          </p:val>
+                                        </p:tav>
+                                      </p:tavLst>
+                                    </p:anim>
+                                    <p:anim calcmode="lin" valueType="num">
+                                      <p:cBhvr>
+                                        <p:cTn id="116" dur="1000" fill="hold"/>
+                                        <p:tgtEl>
+                                          <p:spTgt spid="84"/>
+                                        </p:tgtEl>
+                                        <p:attrNameLst>
+                                          <p:attrName>ppt_h</p:attrName>
+                                        </p:attrNameLst>
+                                      </p:cBhvr>
+                                      <p:tavLst>
+                                        <p:tav tm="0">
+                                          <p:val>
+                                            <p:fltVal val="0"/>
+                                          </p:val>
+                                        </p:tav>
+                                        <p:tav tm="100000">
+                                          <p:val>
+                                            <p:strVal val="#ppt_h"/>
+                                          </p:val>
+                                        </p:tav>
+                                      </p:tavLst>
+                                    </p:anim>
+                                    <p:anim calcmode="lin" valueType="num">
+                                      <p:cBhvr>
+                                        <p:cTn id="117" dur="1000" fill="hold"/>
+                                        <p:tgtEl>
+                                          <p:spTgt spid="84"/>
+                                        </p:tgtEl>
+                                        <p:attrNameLst>
+                                          <p:attrName>ppt_x</p:attrName>
+                                        </p:attrNameLst>
+                                      </p:cBhvr>
+                                      <p:tavLst>
+                                        <p:tav tm="0" fmla="#ppt_x+(cos(-2*pi*(1-$))*-#ppt_x-sin(-2*pi*(1-$))*(1-#ppt_y))*(1-$)">
+                                          <p:val>
+                                            <p:fltVal val="0"/>
+                                          </p:val>
+                                        </p:tav>
+                                        <p:tav tm="100000">
+                                          <p:val>
+                                            <p:fltVal val="1"/>
+                                          </p:val>
+                                        </p:tav>
+                                      </p:tavLst>
+                                    </p:anim>
+                                    <p:anim calcmode="lin" valueType="num">
+                                      <p:cBhvr>
+                                        <p:cTn id="118" dur="1000" fill="hold"/>
+                                        <p:tgtEl>
+                                          <p:spTgt spid="84"/>
+                                        </p:tgtEl>
+                                        <p:attrNameLst>
+                                          <p:attrName>ppt_y</p:attrName>
+                                        </p:attrNameLst>
+                                      </p:cBhvr>
+                                      <p:tavLst>
+                                        <p:tav tm="0" fmla="#ppt_y+(sin(-2*pi*(1-$))*-#ppt_x+cos(-2*pi*(1-$))*(1-#ppt_y))*(1-$)">
+                                          <p:val>
+                                            <p:fltVal val="0"/>
+                                          </p:val>
+                                        </p:tav>
+                                        <p:tav tm="100000">
+                                          <p:val>
+                                            <p:fltVal val="1"/>
+                                          </p:val>
+                                        </p:tav>
+                                      </p:tavLst>
+                                    </p:anim>
+                                  </p:childTnLst>
+                                </p:cTn>
+                              </p:par>
+                              <p:par>
+                                <p:cTn id="119" presetID="15" presetClass="entr" presetSubtype="0" fill="hold" nodeType="withEffect">
+                                  <p:stCondLst>
+                                    <p:cond delay="0"/>
+                                  </p:stCondLst>
+                                  <p:childTnLst>
+                                    <p:set>
+                                      <p:cBhvr>
+                                        <p:cTn id="120" dur="1" fill="hold">
+                                          <p:stCondLst>
+                                            <p:cond delay="0"/>
+                                          </p:stCondLst>
+                                        </p:cTn>
+                                        <p:tgtEl>
+                                          <p:spTgt spid="85"/>
+                                        </p:tgtEl>
+                                        <p:attrNameLst>
+                                          <p:attrName>style.visibility</p:attrName>
+                                        </p:attrNameLst>
+                                      </p:cBhvr>
+                                      <p:to>
+                                        <p:strVal val="visible"/>
+                                      </p:to>
+                                    </p:set>
+                                    <p:anim calcmode="lin" valueType="num">
+                                      <p:cBhvr>
+                                        <p:cTn id="121" dur="1000" fill="hold"/>
+                                        <p:tgtEl>
+                                          <p:spTgt spid="85"/>
+                                        </p:tgtEl>
+                                        <p:attrNameLst>
+                                          <p:attrName>ppt_w</p:attrName>
+                                        </p:attrNameLst>
+                                      </p:cBhvr>
+                                      <p:tavLst>
+                                        <p:tav tm="0">
+                                          <p:val>
+                                            <p:fltVal val="0"/>
+                                          </p:val>
+                                        </p:tav>
+                                        <p:tav tm="100000">
+                                          <p:val>
+                                            <p:strVal val="#ppt_w"/>
+                                          </p:val>
+                                        </p:tav>
+                                      </p:tavLst>
+                                    </p:anim>
+                                    <p:anim calcmode="lin" valueType="num">
+                                      <p:cBhvr>
+                                        <p:cTn id="122" dur="1000" fill="hold"/>
+                                        <p:tgtEl>
+                                          <p:spTgt spid="85"/>
+                                        </p:tgtEl>
+                                        <p:attrNameLst>
+                                          <p:attrName>ppt_h</p:attrName>
+                                        </p:attrNameLst>
+                                      </p:cBhvr>
+                                      <p:tavLst>
+                                        <p:tav tm="0">
+                                          <p:val>
+                                            <p:fltVal val="0"/>
+                                          </p:val>
+                                        </p:tav>
+                                        <p:tav tm="100000">
+                                          <p:val>
+                                            <p:strVal val="#ppt_h"/>
+                                          </p:val>
+                                        </p:tav>
+                                      </p:tavLst>
+                                    </p:anim>
+                                    <p:anim calcmode="lin" valueType="num">
+                                      <p:cBhvr>
+                                        <p:cTn id="123" dur="1000" fill="hold"/>
+                                        <p:tgtEl>
+                                          <p:spTgt spid="85"/>
+                                        </p:tgtEl>
+                                        <p:attrNameLst>
+                                          <p:attrName>ppt_x</p:attrName>
+                                        </p:attrNameLst>
+                                      </p:cBhvr>
+                                      <p:tavLst>
+                                        <p:tav tm="0" fmla="#ppt_x+(cos(-2*pi*(1-$))*-#ppt_x-sin(-2*pi*(1-$))*(1-#ppt_y))*(1-$)">
+                                          <p:val>
+                                            <p:fltVal val="0"/>
+                                          </p:val>
+                                        </p:tav>
+                                        <p:tav tm="100000">
+                                          <p:val>
+                                            <p:fltVal val="1"/>
+                                          </p:val>
+                                        </p:tav>
+                                      </p:tavLst>
+                                    </p:anim>
+                                    <p:anim calcmode="lin" valueType="num">
+                                      <p:cBhvr>
+                                        <p:cTn id="124" dur="1000" fill="hold"/>
+                                        <p:tgtEl>
+                                          <p:spTgt spid="85"/>
+                                        </p:tgtEl>
+                                        <p:attrNameLst>
+                                          <p:attrName>ppt_y</p:attrName>
+                                        </p:attrNameLst>
+                                      </p:cBhvr>
+                                      <p:tavLst>
+                                        <p:tav tm="0" fmla="#ppt_y+(sin(-2*pi*(1-$))*-#ppt_x+cos(-2*pi*(1-$))*(1-#ppt_y))*(1-$)">
+                                          <p:val>
+                                            <p:fltVal val="0"/>
+                                          </p:val>
+                                        </p:tav>
+                                        <p:tav tm="100000">
+                                          <p:val>
+                                            <p:fltVal val="1"/>
+                                          </p:val>
+                                        </p:tav>
+                                      </p:tavLst>
+                                    </p:anim>
+                                  </p:childTnLst>
+                                </p:cTn>
+                              </p:par>
+                            </p:childTnLst>
+                          </p:cTn>
+                        </p:par>
+                      </p:childTnLst>
+                    </p:cTn>
+                  </p:par>
+                </p:childTnLst>
+              </p:cTn>
+              <p:prevCondLst>
+                <p:cond evt="onPrev" delay="0">
+                  <p:tgtEl>
+                    <p:sldTgt/>
+                  </p:tgtEl>
+                </p:cond>
+              </p:prevCondLst>
+              <p:nextCondLst>
+                <p:cond evt="onNext" delay="0">
+                  <p:tgtEl>
+                    <p:sldTgt/>
+                  </p:tgtEl>
+                </p:cond>
+              </p:nextCondLst>
+            </p:seq>
+          </p:childTnLst>
+        </p:cTn>
+      </p:par>
+    </p:tnLst>
+    <p:bldLst>
+      <p:bldP spid="4" grpId="0" animBg="1"/>
+      <p:bldP spid="3" grpId="0" animBg="1"/>
+      <p:bldP spid="5" grpId="0" animBg="1"/>
+      <p:bldP spid="6" grpId="0" animBg="1"/>
+      <p:bldP spid="8" grpId="0" animBg="1"/>
+      <p:bldP spid="10" grpId="0" animBg="1"/>
+      <p:bldP spid="11" grpId="0" animBg="1"/>
+      <p:bldP spid="61" grpId="0" animBg="1"/>
+      <p:bldP spid="33" grpId="0" animBg="1"/>
+      <p:bldP spid="44" grpId="0" animBg="1"/>
+      <p:bldP spid="45" grpId="0" animBg="1"/>
+      <p:bldP spid="46" grpId="0" animBg="1"/>
+      <p:bldP spid="73" grpId="0" animBg="1"/>
+      <p:bldP spid="83" grpId="0" animBg="1"/>
+    </p:bldLst>
+  </p:timing>
+</p:sld>
+</file>
+
+<file path=ppt/slides/slide8.xml><?xml version="1.0" encoding="utf-8"?>
 <p:sld xmlns:a="http://schemas.openxmlformats.org/drawingml/2006/main" xmlns:r="http://schemas.openxmlformats.org/officeDocument/2006/relationships" xmlns:p="http://schemas.openxmlformats.org/presentationml/2006/main">
   <p:cSld>
     <p:spTree>
@@ -5545,8 +9254,8 @@
   <p:clrMapOvr>
     <a:masterClrMapping/>
   </p:clrMapOvr>
-  <p:transition>
-    <p:wipe dir="d"/>
+  <p:transition spd="slow">
+    <p:push dir="u"/>
   </p:transition>
   <p:timing>
     <p:tnLst>
@@ -5903,120 +9612,6 @@
             </p:seq>
           </p:childTnLst>
         </p:cTn>
-      </p:par>
-    </p:tnLst>
-  </p:timing>
-</p:sld>
-</file>
-
-<file path=ppt/slides/slide8.xml><?xml version="1.0" encoding="utf-8"?>
-<p:sld xmlns:a="http://schemas.openxmlformats.org/drawingml/2006/main" xmlns:r="http://schemas.openxmlformats.org/officeDocument/2006/relationships" xmlns:p="http://schemas.openxmlformats.org/presentationml/2006/main">
-  <p:cSld>
-    <p:spTree>
-      <p:nvGrpSpPr>
-        <p:cNvPr id="1" name=""/>
-        <p:cNvGrpSpPr/>
-        <p:nvPr/>
-      </p:nvGrpSpPr>
-      <p:grpSpPr>
-        <a:xfrm>
-          <a:off x="0" y="0"/>
-          <a:ext cx="0" cy="0"/>
-          <a:chOff x="0" y="0"/>
-          <a:chExt cx="0" cy="0"/>
-        </a:xfrm>
-      </p:grpSpPr>
-      <p:sp>
-        <p:nvSpPr>
-          <p:cNvPr id="2" name="Заголовок 1"/>
-          <p:cNvSpPr>
-            <a:spLocks noGrp="1"/>
-          </p:cNvSpPr>
-          <p:nvPr>
-            <p:ph type="title"/>
-          </p:nvPr>
-        </p:nvSpPr>
-        <p:spPr/>
-        <p:style>
-          <a:lnRef idx="2">
-            <a:schemeClr val="accent3">
-              <a:shade val="50000"/>
-            </a:schemeClr>
-          </a:lnRef>
-          <a:fillRef idx="1">
-            <a:schemeClr val="accent3"/>
-          </a:fillRef>
-          <a:effectRef idx="0">
-            <a:schemeClr val="accent3"/>
-          </a:effectRef>
-          <a:fontRef idx="minor">
-            <a:schemeClr val="lt1"/>
-          </a:fontRef>
-        </p:style>
-        <p:txBody>
-          <a:bodyPr/>
-          <a:lstStyle/>
-          <a:p>
-            <a:r>
-              <a:rPr lang="ru-RU" dirty="0" smtClean="0"/>
-              <a:t>Структура уровня</a:t>
-            </a:r>
-            <a:endParaRPr lang="ru-RU" dirty="0"/>
-          </a:p>
-        </p:txBody>
-      </p:sp>
-      <p:sp>
-        <p:nvSpPr>
-          <p:cNvPr id="4" name="Прямоугольник 3"/>
-          <p:cNvSpPr/>
-          <p:nvPr/>
-        </p:nvSpPr>
-        <p:spPr>
-          <a:xfrm>
-            <a:off x="868065" y="1247254"/>
-            <a:ext cx="1440160" cy="648072"/>
-          </a:xfrm>
-          <a:prstGeom prst="rect">
-            <a:avLst/>
-          </a:prstGeom>
-        </p:spPr>
-        <p:style>
-          <a:lnRef idx="2">
-            <a:schemeClr val="accent1">
-              <a:shade val="50000"/>
-            </a:schemeClr>
-          </a:lnRef>
-          <a:fillRef idx="1">
-            <a:schemeClr val="accent1"/>
-          </a:fillRef>
-          <a:effectRef idx="0">
-            <a:schemeClr val="accent1"/>
-          </a:effectRef>
-          <a:fontRef idx="minor">
-            <a:schemeClr val="lt1"/>
-          </a:fontRef>
-        </p:style>
-        <p:txBody>
-          <a:bodyPr rtlCol="0" anchor="ctr"/>
-          <a:lstStyle/>
-          <a:p>
-            <a:pPr algn="ctr"/>
-            <a:endParaRPr lang="ru-RU"/>
-          </a:p>
-        </p:txBody>
-      </p:sp>
-    </p:spTree>
-  </p:cSld>
-  <p:clrMapOvr>
-    <a:masterClrMapping/>
-  </p:clrMapOvr>
-  <p:transition>
-    <p:wipe dir="d"/>
-  </p:transition>
-  <p:timing>
-    <p:tnLst>
-      <p:par>
-        <p:cTn id="1" dur="indefinite" restart="never" nodeType="tmRoot"/>
       </p:par>
     </p:tnLst>
   </p:timing>
@@ -6073,7 +9668,7 @@
           <a:p>
             <a:r>
               <a:rPr lang="ru-RU" dirty="0" smtClean="0"/>
-              <a:t>Класс уровня</a:t>
+              <a:t>Уровни</a:t>
             </a:r>
             <a:endParaRPr lang="ru-RU" dirty="0"/>
           </a:p>
@@ -6179,8 +9774,8 @@
   <p:clrMapOvr>
     <a:masterClrMapping/>
   </p:clrMapOvr>
-  <p:transition>
-    <p:wipe dir="d"/>
+  <p:transition spd="slow">
+    <p:push dir="u"/>
   </p:transition>
   <p:timing>
     <p:tnLst>

</xml_diff>